<commit_message>
Unit 4 part 1 uploaded. Blanks haven't been filled since I haven't watched the vids yet.
</commit_message>
<xml_diff>
--- a/Unit 3-4 Theorems.pptx
+++ b/Unit 3-4 Theorems.pptx
@@ -24,6 +24,13 @@
     <p:sldId id="269" r:id="rId21"/>
     <p:sldId id="270" r:id="rId22"/>
     <p:sldId id="271" r:id="rId23"/>
+    <p:sldId id="276" r:id="rId24"/>
+    <p:sldId id="277" r:id="rId25"/>
+    <p:sldId id="278" r:id="rId26"/>
+    <p:sldId id="279" r:id="rId27"/>
+    <p:sldId id="280" r:id="rId28"/>
+    <p:sldId id="281" r:id="rId29"/>
+    <p:sldId id="282" r:id="rId30"/>
   </p:sldIdLst>
   <p:sldSz cx="12192000" cy="6858000"/>
   <p:notesSz cx="6858000" cy="9144000"/>
@@ -122,7 +129,32 @@
       </a:defRPr>
     </a:lvl9pPr>
   </p:defaultTextStyle>
+  <p:extLst>
+    <p:ext uri="{EFAFB233-063F-42B5-8137-9DF3F51BA10A}">
+      <p15:sldGuideLst xmlns:p15="http://schemas.microsoft.com/office/powerpoint/2012/main"/>
+    </p:ext>
+  </p:extLst>
 </p:presentation>
+</file>
+
+<file path=ppt/commentAuthors.xml><?xml version="1.0" encoding="utf-8"?>
+<p:cmAuthorLst xmlns:a="http://schemas.openxmlformats.org/drawingml/2006/main" xmlns:r="http://schemas.openxmlformats.org/officeDocument/2006/relationships" xmlns:p="http://schemas.openxmlformats.org/presentationml/2006/main">
+  <p:cmAuthor id="1" name="Chen, Jeff" initials="CJ" lastIdx="1" clrIdx="0">
+    <p:extLst>
+      <p:ext uri="{19B8F6BF-5375-455C-9EA6-DF929625EA0E}">
+        <p15:presenceInfo xmlns:p15="http://schemas.microsoft.com/office/powerpoint/2012/main" userId="Chen, Jeff" providerId="None"/>
+      </p:ext>
+    </p:extLst>
+  </p:cmAuthor>
+</p:cmAuthorLst>
+</file>
+
+<file path=ppt/revisionInfo.xml><?xml version="1.0" encoding="utf-8"?>
+<p1510:revInfo xmlns:a="http://schemas.openxmlformats.org/drawingml/2006/main" xmlns:r="http://schemas.openxmlformats.org/officeDocument/2006/relationships" xmlns:p1510="http://schemas.microsoft.com/office/powerpoint/2015/10/main">
+  <p1510:revLst>
+    <p1510:client id="{80965980-7CDF-4379-9A6F-B1F09123E494}" v="1" dt="2021-03-09T18:25:33.936"/>
+  </p1510:revLst>
+</p1510:revInfo>
 </file>
 
 <file path=ppt/changesInfos/changesInfo1.xml><?xml version="1.0" encoding="utf-8"?>
@@ -130,10 +162,49 @@
   <pc:docChgLst>
     <pc:chgData name="Chen, Jeff" userId="9a3224f5-9893-4468-acd0-6d03119f890b" providerId="ADAL" clId="{80965980-7CDF-4379-9A6F-B1F09123E494}"/>
     <pc:docChg chg="custSel addSld delSld modSld">
-      <pc:chgData name="Chen, Jeff" userId="9a3224f5-9893-4468-acd0-6d03119f890b" providerId="ADAL" clId="{80965980-7CDF-4379-9A6F-B1F09123E494}" dt="2021-03-08T22:43:12.505" v="43" actId="1076"/>
+      <pc:chgData name="Chen, Jeff" userId="9a3224f5-9893-4468-acd0-6d03119f890b" providerId="ADAL" clId="{80965980-7CDF-4379-9A6F-B1F09123E494}" dt="2021-03-09T18:25:33.935" v="221"/>
       <pc:docMkLst>
         <pc:docMk/>
       </pc:docMkLst>
+      <pc:sldChg chg="addSp modSp mod setBg">
+        <pc:chgData name="Chen, Jeff" userId="9a3224f5-9893-4468-acd0-6d03119f890b" providerId="ADAL" clId="{80965980-7CDF-4379-9A6F-B1F09123E494}" dt="2021-03-09T18:18:22.418" v="60" actId="26606"/>
+        <pc:sldMkLst>
+          <pc:docMk/>
+          <pc:sldMk cId="1612242428" sldId="271"/>
+        </pc:sldMkLst>
+        <pc:spChg chg="mod">
+          <ac:chgData name="Chen, Jeff" userId="9a3224f5-9893-4468-acd0-6d03119f890b" providerId="ADAL" clId="{80965980-7CDF-4379-9A6F-B1F09123E494}" dt="2021-03-09T18:18:22.418" v="60" actId="26606"/>
+          <ac:spMkLst>
+            <pc:docMk/>
+            <pc:sldMk cId="1612242428" sldId="271"/>
+            <ac:spMk id="2" creationId="{72FB57F0-9EAD-452E-BB40-52AE41C56EF7}"/>
+          </ac:spMkLst>
+        </pc:spChg>
+        <pc:spChg chg="add">
+          <ac:chgData name="Chen, Jeff" userId="9a3224f5-9893-4468-acd0-6d03119f890b" providerId="ADAL" clId="{80965980-7CDF-4379-9A6F-B1F09123E494}" dt="2021-03-09T18:18:22.418" v="60" actId="26606"/>
+          <ac:spMkLst>
+            <pc:docMk/>
+            <pc:sldMk cId="1612242428" sldId="271"/>
+            <ac:spMk id="9" creationId="{EB270761-CC40-4F3F-A916-7E3BC3989348}"/>
+          </ac:spMkLst>
+        </pc:spChg>
+        <pc:spChg chg="add">
+          <ac:chgData name="Chen, Jeff" userId="9a3224f5-9893-4468-acd0-6d03119f890b" providerId="ADAL" clId="{80965980-7CDF-4379-9A6F-B1F09123E494}" dt="2021-03-09T18:18:22.418" v="60" actId="26606"/>
+          <ac:spMkLst>
+            <pc:docMk/>
+            <pc:sldMk cId="1612242428" sldId="271"/>
+            <ac:spMk id="11" creationId="{A2555B16-BE1D-4C33-A27C-FF0671B6C94C}"/>
+          </ac:spMkLst>
+        </pc:spChg>
+        <pc:picChg chg="add mod">
+          <ac:chgData name="Chen, Jeff" userId="9a3224f5-9893-4468-acd0-6d03119f890b" providerId="ADAL" clId="{80965980-7CDF-4379-9A6F-B1F09123E494}" dt="2021-03-09T18:18:22.418" v="60" actId="26606"/>
+          <ac:picMkLst>
+            <pc:docMk/>
+            <pc:sldMk cId="1612242428" sldId="271"/>
+            <ac:picMk id="4" creationId="{4FB498DD-189C-4050-86A0-F81D2616E3D8}"/>
+          </ac:picMkLst>
+        </pc:picChg>
+      </pc:sldChg>
       <pc:sldChg chg="addSp modSp new del mod">
         <pc:chgData name="Chen, Jeff" userId="9a3224f5-9893-4468-acd0-6d03119f890b" providerId="ADAL" clId="{80965980-7CDF-4379-9A6F-B1F09123E494}" dt="2021-03-08T22:43:01.690" v="23" actId="2696"/>
         <pc:sldMkLst>
@@ -188,9 +259,184 @@
           </ac:picMkLst>
         </pc:picChg>
       </pc:sldChg>
+      <pc:sldChg chg="addSp modSp new mod setBg">
+        <pc:chgData name="Chen, Jeff" userId="9a3224f5-9893-4468-acd0-6d03119f890b" providerId="ADAL" clId="{80965980-7CDF-4379-9A6F-B1F09123E494}" dt="2021-03-09T18:19:54.353" v="109" actId="26606"/>
+        <pc:sldMkLst>
+          <pc:docMk/>
+          <pc:sldMk cId="1594308202" sldId="276"/>
+        </pc:sldMkLst>
+        <pc:spChg chg="mod">
+          <ac:chgData name="Chen, Jeff" userId="9a3224f5-9893-4468-acd0-6d03119f890b" providerId="ADAL" clId="{80965980-7CDF-4379-9A6F-B1F09123E494}" dt="2021-03-09T18:19:54.353" v="109" actId="26606"/>
+          <ac:spMkLst>
+            <pc:docMk/>
+            <pc:sldMk cId="1594308202" sldId="276"/>
+            <ac:spMk id="2" creationId="{3ED66A6E-D5D5-46CF-9374-C69149E57A1C}"/>
+          </ac:spMkLst>
+        </pc:spChg>
+        <pc:spChg chg="add">
+          <ac:chgData name="Chen, Jeff" userId="9a3224f5-9893-4468-acd0-6d03119f890b" providerId="ADAL" clId="{80965980-7CDF-4379-9A6F-B1F09123E494}" dt="2021-03-09T18:19:54.353" v="109" actId="26606"/>
+          <ac:spMkLst>
+            <pc:docMk/>
+            <pc:sldMk cId="1594308202" sldId="276"/>
+            <ac:spMk id="9" creationId="{EB270761-CC40-4F3F-A916-7E3BC3989348}"/>
+          </ac:spMkLst>
+        </pc:spChg>
+        <pc:spChg chg="add">
+          <ac:chgData name="Chen, Jeff" userId="9a3224f5-9893-4468-acd0-6d03119f890b" providerId="ADAL" clId="{80965980-7CDF-4379-9A6F-B1F09123E494}" dt="2021-03-09T18:19:54.353" v="109" actId="26606"/>
+          <ac:spMkLst>
+            <pc:docMk/>
+            <pc:sldMk cId="1594308202" sldId="276"/>
+            <ac:spMk id="11" creationId="{A2555B16-BE1D-4C33-A27C-FF0671B6C94C}"/>
+          </ac:spMkLst>
+        </pc:spChg>
+        <pc:picChg chg="add mod">
+          <ac:chgData name="Chen, Jeff" userId="9a3224f5-9893-4468-acd0-6d03119f890b" providerId="ADAL" clId="{80965980-7CDF-4379-9A6F-B1F09123E494}" dt="2021-03-09T18:19:54.353" v="109" actId="26606"/>
+          <ac:picMkLst>
+            <pc:docMk/>
+            <pc:sldMk cId="1594308202" sldId="276"/>
+            <ac:picMk id="4" creationId="{177343F9-AD92-4E54-BF99-E754D618E9E7}"/>
+          </ac:picMkLst>
+        </pc:picChg>
+      </pc:sldChg>
+      <pc:sldChg chg="addSp delSp modSp new mod setBg">
+        <pc:chgData name="Chen, Jeff" userId="9a3224f5-9893-4468-acd0-6d03119f890b" providerId="ADAL" clId="{80965980-7CDF-4379-9A6F-B1F09123E494}" dt="2021-03-09T18:22:57.569" v="140" actId="478"/>
+        <pc:sldMkLst>
+          <pc:docMk/>
+          <pc:sldMk cId="955675857" sldId="277"/>
+        </pc:sldMkLst>
+        <pc:spChg chg="mod">
+          <ac:chgData name="Chen, Jeff" userId="9a3224f5-9893-4468-acd0-6d03119f890b" providerId="ADAL" clId="{80965980-7CDF-4379-9A6F-B1F09123E494}" dt="2021-03-09T18:22:31.668" v="137" actId="20577"/>
+          <ac:spMkLst>
+            <pc:docMk/>
+            <pc:sldMk cId="955675857" sldId="277"/>
+            <ac:spMk id="2" creationId="{2850A7ED-96D2-417C-B903-C6CAE2CE7669}"/>
+          </ac:spMkLst>
+        </pc:spChg>
+        <pc:spChg chg="add">
+          <ac:chgData name="Chen, Jeff" userId="9a3224f5-9893-4468-acd0-6d03119f890b" providerId="ADAL" clId="{80965980-7CDF-4379-9A6F-B1F09123E494}" dt="2021-03-09T18:22:03.014" v="124" actId="26606"/>
+          <ac:spMkLst>
+            <pc:docMk/>
+            <pc:sldMk cId="955675857" sldId="277"/>
+            <ac:spMk id="11" creationId="{EB270761-CC40-4F3F-A916-7E3BC3989348}"/>
+          </ac:spMkLst>
+        </pc:spChg>
+        <pc:spChg chg="add">
+          <ac:chgData name="Chen, Jeff" userId="9a3224f5-9893-4468-acd0-6d03119f890b" providerId="ADAL" clId="{80965980-7CDF-4379-9A6F-B1F09123E494}" dt="2021-03-09T18:22:03.014" v="124" actId="26606"/>
+          <ac:spMkLst>
+            <pc:docMk/>
+            <pc:sldMk cId="955675857" sldId="277"/>
+            <ac:spMk id="13" creationId="{A2555B16-BE1D-4C33-A27C-FF0671B6C94C}"/>
+          </ac:spMkLst>
+        </pc:spChg>
+        <pc:picChg chg="add del">
+          <ac:chgData name="Chen, Jeff" userId="9a3224f5-9893-4468-acd0-6d03119f890b" providerId="ADAL" clId="{80965980-7CDF-4379-9A6F-B1F09123E494}" dt="2021-03-09T18:21:09.358" v="111" actId="478"/>
+          <ac:picMkLst>
+            <pc:docMk/>
+            <pc:sldMk cId="955675857" sldId="277"/>
+            <ac:picMk id="4" creationId="{FFCD01C9-E1F8-45A5-8001-C2449A484DE0}"/>
+          </ac:picMkLst>
+        </pc:picChg>
+        <pc:picChg chg="add mod">
+          <ac:chgData name="Chen, Jeff" userId="9a3224f5-9893-4468-acd0-6d03119f890b" providerId="ADAL" clId="{80965980-7CDF-4379-9A6F-B1F09123E494}" dt="2021-03-09T18:22:03.014" v="124" actId="26606"/>
+          <ac:picMkLst>
+            <pc:docMk/>
+            <pc:sldMk cId="955675857" sldId="277"/>
+            <ac:picMk id="6" creationId="{7AE99F1D-800D-4B83-B3BD-6D467FF33D0C}"/>
+          </ac:picMkLst>
+        </pc:picChg>
+        <pc:picChg chg="add del mod">
+          <ac:chgData name="Chen, Jeff" userId="9a3224f5-9893-4468-acd0-6d03119f890b" providerId="ADAL" clId="{80965980-7CDF-4379-9A6F-B1F09123E494}" dt="2021-03-09T18:22:57.569" v="140" actId="478"/>
+          <ac:picMkLst>
+            <pc:docMk/>
+            <pc:sldMk cId="955675857" sldId="277"/>
+            <ac:picMk id="8" creationId="{F8C8425B-6131-4A5C-AD39-F6446D3AAA8E}"/>
+          </ac:picMkLst>
+        </pc:picChg>
+      </pc:sldChg>
+      <pc:sldChg chg="addSp modSp new mod setBg addCm modCm">
+        <pc:chgData name="Chen, Jeff" userId="9a3224f5-9893-4468-acd0-6d03119f890b" providerId="ADAL" clId="{80965980-7CDF-4379-9A6F-B1F09123E494}" dt="2021-03-09T18:25:33.935" v="221"/>
+        <pc:sldMkLst>
+          <pc:docMk/>
+          <pc:sldMk cId="1125068611" sldId="278"/>
+        </pc:sldMkLst>
+        <pc:spChg chg="mod">
+          <ac:chgData name="Chen, Jeff" userId="9a3224f5-9893-4468-acd0-6d03119f890b" providerId="ADAL" clId="{80965980-7CDF-4379-9A6F-B1F09123E494}" dt="2021-03-09T18:24:20.529" v="219" actId="20577"/>
+          <ac:spMkLst>
+            <pc:docMk/>
+            <pc:sldMk cId="1125068611" sldId="278"/>
+            <ac:spMk id="2" creationId="{55C4CDE4-E951-449C-A932-89AA243A481C}"/>
+          </ac:spMkLst>
+        </pc:spChg>
+        <pc:spChg chg="add">
+          <ac:chgData name="Chen, Jeff" userId="9a3224f5-9893-4468-acd0-6d03119f890b" providerId="ADAL" clId="{80965980-7CDF-4379-9A6F-B1F09123E494}" dt="2021-03-09T18:24:08.478" v="211" actId="26606"/>
+          <ac:spMkLst>
+            <pc:docMk/>
+            <pc:sldMk cId="1125068611" sldId="278"/>
+            <ac:spMk id="9" creationId="{EB270761-CC40-4F3F-A916-7E3BC3989348}"/>
+          </ac:spMkLst>
+        </pc:spChg>
+        <pc:spChg chg="add">
+          <ac:chgData name="Chen, Jeff" userId="9a3224f5-9893-4468-acd0-6d03119f890b" providerId="ADAL" clId="{80965980-7CDF-4379-9A6F-B1F09123E494}" dt="2021-03-09T18:24:08.478" v="211" actId="26606"/>
+          <ac:spMkLst>
+            <pc:docMk/>
+            <pc:sldMk cId="1125068611" sldId="278"/>
+            <ac:spMk id="11" creationId="{A2555B16-BE1D-4C33-A27C-FF0671B6C94C}"/>
+          </ac:spMkLst>
+        </pc:spChg>
+        <pc:picChg chg="add mod">
+          <ac:chgData name="Chen, Jeff" userId="9a3224f5-9893-4468-acd0-6d03119f890b" providerId="ADAL" clId="{80965980-7CDF-4379-9A6F-B1F09123E494}" dt="2021-03-09T18:24:08.478" v="211" actId="26606"/>
+          <ac:picMkLst>
+            <pc:docMk/>
+            <pc:sldMk cId="1125068611" sldId="278"/>
+            <ac:picMk id="4" creationId="{71397B19-8B36-4F9A-837A-8B9638FAEAC6}"/>
+          </ac:picMkLst>
+        </pc:picChg>
+      </pc:sldChg>
+      <pc:sldChg chg="new">
+        <pc:chgData name="Chen, Jeff" userId="9a3224f5-9893-4468-acd0-6d03119f890b" providerId="ADAL" clId="{80965980-7CDF-4379-9A6F-B1F09123E494}" dt="2021-03-09T18:18:30.494" v="64" actId="680"/>
+        <pc:sldMkLst>
+          <pc:docMk/>
+          <pc:sldMk cId="1070451020" sldId="279"/>
+        </pc:sldMkLst>
+      </pc:sldChg>
+      <pc:sldChg chg="new">
+        <pc:chgData name="Chen, Jeff" userId="9a3224f5-9893-4468-acd0-6d03119f890b" providerId="ADAL" clId="{80965980-7CDF-4379-9A6F-B1F09123E494}" dt="2021-03-09T18:18:30.884" v="65" actId="680"/>
+        <pc:sldMkLst>
+          <pc:docMk/>
+          <pc:sldMk cId="3924658005" sldId="280"/>
+        </pc:sldMkLst>
+      </pc:sldChg>
+      <pc:sldChg chg="new">
+        <pc:chgData name="Chen, Jeff" userId="9a3224f5-9893-4468-acd0-6d03119f890b" providerId="ADAL" clId="{80965980-7CDF-4379-9A6F-B1F09123E494}" dt="2021-03-09T18:18:30.895" v="66" actId="680"/>
+        <pc:sldMkLst>
+          <pc:docMk/>
+          <pc:sldMk cId="2308443354" sldId="281"/>
+        </pc:sldMkLst>
+      </pc:sldChg>
+      <pc:sldChg chg="new">
+        <pc:chgData name="Chen, Jeff" userId="9a3224f5-9893-4468-acd0-6d03119f890b" providerId="ADAL" clId="{80965980-7CDF-4379-9A6F-B1F09123E494}" dt="2021-03-09T18:18:30.913" v="67" actId="680"/>
+        <pc:sldMkLst>
+          <pc:docMk/>
+          <pc:sldMk cId="2063718745" sldId="282"/>
+        </pc:sldMkLst>
+      </pc:sldChg>
     </pc:docChg>
   </pc:docChgLst>
 </pc:chgInfo>
+</file>
+
+<file path=ppt/comments/comment1.xml><?xml version="1.0" encoding="utf-8"?>
+<p:cmLst xmlns:a="http://schemas.openxmlformats.org/drawingml/2006/main" xmlns:r="http://schemas.openxmlformats.org/officeDocument/2006/relationships" xmlns:p="http://schemas.openxmlformats.org/presentationml/2006/main">
+  <p:cm authorId="1" dt="2021-03-09T13:25:20.796" idx="1">
+    <p:pos x="10" y="10"/>
+    <p:text>Stopped before Eigenvalues</p:text>
+    <p:extLst>
+      <p:ext uri="{C676402C-5697-4E1C-873F-D02D1690AC5C}">
+        <p15:threadingInfo xmlns:p15="http://schemas.microsoft.com/office/powerpoint/2012/main" timeZoneBias="300"/>
+      </p:ext>
+    </p:extLst>
+  </p:cm>
+</p:cmLst>
 </file>
 
 <file path=ppt/slideLayouts/slideLayout1.xml><?xml version="1.0" encoding="utf-8"?>
@@ -340,7 +586,7 @@
           <a:p>
             <a:fld id="{C868AB9E-4FA6-4C7D-A415-A317424E55FE}" type="datetimeFigureOut">
               <a:rPr lang="en-US" smtClean="0"/>
-              <a:t>3/8/2021</a:t>
+              <a:t>3/9/2021</a:t>
             </a:fld>
             <a:endParaRPr lang="en-US"/>
           </a:p>
@@ -538,7 +784,7 @@
           <a:p>
             <a:fld id="{C868AB9E-4FA6-4C7D-A415-A317424E55FE}" type="datetimeFigureOut">
               <a:rPr lang="en-US" smtClean="0"/>
-              <a:t>3/8/2021</a:t>
+              <a:t>3/9/2021</a:t>
             </a:fld>
             <a:endParaRPr lang="en-US"/>
           </a:p>
@@ -746,7 +992,7 @@
           <a:p>
             <a:fld id="{C868AB9E-4FA6-4C7D-A415-A317424E55FE}" type="datetimeFigureOut">
               <a:rPr lang="en-US" smtClean="0"/>
-              <a:t>3/8/2021</a:t>
+              <a:t>3/9/2021</a:t>
             </a:fld>
             <a:endParaRPr lang="en-US"/>
           </a:p>
@@ -944,7 +1190,7 @@
           <a:p>
             <a:fld id="{C868AB9E-4FA6-4C7D-A415-A317424E55FE}" type="datetimeFigureOut">
               <a:rPr lang="en-US" smtClean="0"/>
-              <a:t>3/8/2021</a:t>
+              <a:t>3/9/2021</a:t>
             </a:fld>
             <a:endParaRPr lang="en-US"/>
           </a:p>
@@ -1219,7 +1465,7 @@
           <a:p>
             <a:fld id="{C868AB9E-4FA6-4C7D-A415-A317424E55FE}" type="datetimeFigureOut">
               <a:rPr lang="en-US" smtClean="0"/>
-              <a:t>3/8/2021</a:t>
+              <a:t>3/9/2021</a:t>
             </a:fld>
             <a:endParaRPr lang="en-US"/>
           </a:p>
@@ -1484,7 +1730,7 @@
           <a:p>
             <a:fld id="{C868AB9E-4FA6-4C7D-A415-A317424E55FE}" type="datetimeFigureOut">
               <a:rPr lang="en-US" smtClean="0"/>
-              <a:t>3/8/2021</a:t>
+              <a:t>3/9/2021</a:t>
             </a:fld>
             <a:endParaRPr lang="en-US"/>
           </a:p>
@@ -1896,7 +2142,7 @@
           <a:p>
             <a:fld id="{C868AB9E-4FA6-4C7D-A415-A317424E55FE}" type="datetimeFigureOut">
               <a:rPr lang="en-US" smtClean="0"/>
-              <a:t>3/8/2021</a:t>
+              <a:t>3/9/2021</a:t>
             </a:fld>
             <a:endParaRPr lang="en-US"/>
           </a:p>
@@ -2037,7 +2283,7 @@
           <a:p>
             <a:fld id="{C868AB9E-4FA6-4C7D-A415-A317424E55FE}" type="datetimeFigureOut">
               <a:rPr lang="en-US" smtClean="0"/>
-              <a:t>3/8/2021</a:t>
+              <a:t>3/9/2021</a:t>
             </a:fld>
             <a:endParaRPr lang="en-US"/>
           </a:p>
@@ -2150,7 +2396,7 @@
           <a:p>
             <a:fld id="{C868AB9E-4FA6-4C7D-A415-A317424E55FE}" type="datetimeFigureOut">
               <a:rPr lang="en-US" smtClean="0"/>
-              <a:t>3/8/2021</a:t>
+              <a:t>3/9/2021</a:t>
             </a:fld>
             <a:endParaRPr lang="en-US"/>
           </a:p>
@@ -2461,7 +2707,7 @@
           <a:p>
             <a:fld id="{C868AB9E-4FA6-4C7D-A415-A317424E55FE}" type="datetimeFigureOut">
               <a:rPr lang="en-US" smtClean="0"/>
-              <a:t>3/8/2021</a:t>
+              <a:t>3/9/2021</a:t>
             </a:fld>
             <a:endParaRPr lang="en-US"/>
           </a:p>
@@ -2749,7 +2995,7 @@
           <a:p>
             <a:fld id="{C868AB9E-4FA6-4C7D-A415-A317424E55FE}" type="datetimeFigureOut">
               <a:rPr lang="en-US" smtClean="0"/>
-              <a:t>3/8/2021</a:t>
+              <a:t>3/9/2021</a:t>
             </a:fld>
             <a:endParaRPr lang="en-US"/>
           </a:p>
@@ -2990,7 +3236,7 @@
           <a:p>
             <a:fld id="{C868AB9E-4FA6-4C7D-A415-A317424E55FE}" type="datetimeFigureOut">
               <a:rPr lang="en-US" smtClean="0"/>
-              <a:t>3/8/2021</a:t>
+              <a:t>3/9/2021</a:t>
             </a:fld>
             <a:endParaRPr lang="en-US"/>
           </a:p>
@@ -6443,6 +6689,14 @@
 <file path=ppt/slides/slide19.xml><?xml version="1.0" encoding="utf-8"?>
 <p:sld xmlns:a="http://schemas.openxmlformats.org/drawingml/2006/main" xmlns:r="http://schemas.openxmlformats.org/officeDocument/2006/relationships" xmlns:p="http://schemas.openxmlformats.org/presentationml/2006/main">
   <p:cSld>
+    <p:bg>
+      <p:bgPr>
+        <a:solidFill>
+          <a:schemeClr val="bg1"/>
+        </a:solidFill>
+        <a:effectLst/>
+      </p:bgPr>
+    </p:bg>
     <p:spTree>
       <p:nvGrpSpPr>
         <p:cNvPr id="1" name=""/>
@@ -6457,6 +6711,66 @@
           <a:chExt cx="0" cy="0"/>
         </a:xfrm>
       </p:grpSpPr>
+      <p:sp useBgFill="1">
+        <p:nvSpPr>
+          <p:cNvPr id="9" name="Rectangle 8">
+            <a:extLst>
+              <a:ext uri="{FF2B5EF4-FFF2-40B4-BE49-F238E27FC236}">
+                <a16:creationId xmlns:a16="http://schemas.microsoft.com/office/drawing/2014/main" id="{EB270761-CC40-4F3F-A916-7E3BC3989348}"/>
+              </a:ext>
+              <a:ext uri="{C183D7F6-B498-43B3-948B-1728B52AA6E4}">
+                <adec:decorative xmlns:adec="http://schemas.microsoft.com/office/drawing/2017/decorative" val="1"/>
+              </a:ext>
+            </a:extLst>
+          </p:cNvPr>
+          <p:cNvSpPr>
+            <a:spLocks noGrp="1" noRot="1" noChangeAspect="1" noMove="1" noResize="1" noEditPoints="1" noAdjustHandles="1" noChangeArrowheads="1" noChangeShapeType="1" noTextEdit="1"/>
+          </p:cNvSpPr>
+          <p:nvPr>
+            <p:extLst>
+              <p:ext uri="{386F3935-93C4-4BCD-93E2-E3B085C9AB24}">
+                <p16:designElem xmlns:p16="http://schemas.microsoft.com/office/powerpoint/2015/main" val="1"/>
+              </p:ext>
+            </p:extLst>
+          </p:nvPr>
+        </p:nvSpPr>
+        <p:spPr>
+          <a:xfrm>
+            <a:off x="-1" y="0"/>
+            <a:ext cx="12191695" cy="6858000"/>
+          </a:xfrm>
+          <a:prstGeom prst="rect">
+            <a:avLst/>
+          </a:prstGeom>
+          <a:ln>
+            <a:noFill/>
+          </a:ln>
+        </p:spPr>
+        <p:style>
+          <a:lnRef idx="2">
+            <a:schemeClr val="accent1">
+              <a:shade val="50000"/>
+            </a:schemeClr>
+          </a:lnRef>
+          <a:fillRef idx="1">
+            <a:schemeClr val="accent1"/>
+          </a:fillRef>
+          <a:effectRef idx="0">
+            <a:schemeClr val="accent1"/>
+          </a:effectRef>
+          <a:fontRef idx="minor">
+            <a:schemeClr val="lt1"/>
+          </a:fontRef>
+        </p:style>
+        <p:txBody>
+          <a:bodyPr rtlCol="0" anchor="ctr"/>
+          <a:lstStyle/>
+          <a:p>
+            <a:pPr algn="ctr"/>
+            <a:endParaRPr lang="en-US"/>
+          </a:p>
+        </p:txBody>
+      </p:sp>
       <p:sp>
         <p:nvSpPr>
           <p:cNvPr id="2" name="Title 1">
@@ -6473,15 +6787,132 @@
             <p:ph type="title"/>
           </p:nvPr>
         </p:nvSpPr>
-        <p:spPr/>
-        <p:txBody>
-          <a:bodyPr/>
-          <a:lstStyle/>
-          <a:p>
+        <p:spPr>
+          <a:xfrm>
+            <a:off x="1366160" y="4376508"/>
+            <a:ext cx="9623404" cy="1257202"/>
+          </a:xfrm>
+        </p:spPr>
+        <p:txBody>
+          <a:bodyPr vert="horz" lIns="91440" tIns="45720" rIns="91440" bIns="45720" rtlCol="0" anchor="b">
+            <a:normAutofit/>
+          </a:bodyPr>
+          <a:lstStyle/>
+          <a:p>
+            <a:r>
+              <a:rPr lang="en-US" sz="6600" kern="1200">
+                <a:solidFill>
+                  <a:schemeClr val="tx1"/>
+                </a:solidFill>
+                <a:latin typeface="+mj-lt"/>
+                <a:ea typeface="+mj-ea"/>
+                <a:cs typeface="+mj-cs"/>
+              </a:rPr>
+              <a:t>Standard Matrix</a:t>
+            </a:r>
+          </a:p>
+        </p:txBody>
+      </p:sp>
+      <p:sp>
+        <p:nvSpPr>
+          <p:cNvPr id="11" name="Rectangle 10">
+            <a:extLst>
+              <a:ext uri="{FF2B5EF4-FFF2-40B4-BE49-F238E27FC236}">
+                <a16:creationId xmlns:a16="http://schemas.microsoft.com/office/drawing/2014/main" id="{A2555B16-BE1D-4C33-A27C-FF0671B6C94C}"/>
+              </a:ext>
+              <a:ext uri="{C183D7F6-B498-43B3-948B-1728B52AA6E4}">
+                <adec:decorative xmlns:adec="http://schemas.microsoft.com/office/drawing/2017/decorative" val="1"/>
+              </a:ext>
+            </a:extLst>
+          </p:cNvPr>
+          <p:cNvSpPr>
+            <a:spLocks noGrp="1" noRot="1" noChangeAspect="1" noMove="1" noResize="1" noEditPoints="1" noAdjustHandles="1" noChangeArrowheads="1" noChangeShapeType="1" noTextEdit="1"/>
+          </p:cNvSpPr>
+          <p:nvPr>
+            <p:extLst>
+              <p:ext uri="{386F3935-93C4-4BCD-93E2-E3B085C9AB24}">
+                <p16:designElem xmlns:p16="http://schemas.microsoft.com/office/powerpoint/2015/main" val="1"/>
+              </p:ext>
+            </p:extLst>
+          </p:nvPr>
+        </p:nvSpPr>
+        <p:spPr>
+          <a:xfrm>
+            <a:off x="0" y="891540"/>
+            <a:ext cx="722376" cy="5071110"/>
+          </a:xfrm>
+          <a:prstGeom prst="rect">
+            <a:avLst/>
+          </a:prstGeom>
+          <a:solidFill>
+            <a:srgbClr val="4C5254"/>
+          </a:solidFill>
+          <a:ln>
+            <a:noFill/>
+          </a:ln>
+        </p:spPr>
+        <p:style>
+          <a:lnRef idx="2">
+            <a:schemeClr val="accent1">
+              <a:shade val="50000"/>
+            </a:schemeClr>
+          </a:lnRef>
+          <a:fillRef idx="1">
+            <a:schemeClr val="accent1"/>
+          </a:fillRef>
+          <a:effectRef idx="0">
+            <a:schemeClr val="accent1"/>
+          </a:effectRef>
+          <a:fontRef idx="minor">
+            <a:schemeClr val="lt1"/>
+          </a:fontRef>
+        </p:style>
+        <p:txBody>
+          <a:bodyPr rtlCol="0" anchor="ctr"/>
+          <a:lstStyle/>
+          <a:p>
+            <a:pPr algn="ctr"/>
             <a:endParaRPr lang="en-US"/>
           </a:p>
         </p:txBody>
       </p:sp>
+      <p:pic>
+        <p:nvPicPr>
+          <p:cNvPr id="4" name="Picture 3">
+            <a:extLst>
+              <a:ext uri="{FF2B5EF4-FFF2-40B4-BE49-F238E27FC236}">
+                <a16:creationId xmlns:a16="http://schemas.microsoft.com/office/drawing/2014/main" id="{4FB498DD-189C-4050-86A0-F81D2616E3D8}"/>
+              </a:ext>
+            </a:extLst>
+          </p:cNvPr>
+          <p:cNvPicPr>
+            <a:picLocks noChangeAspect="1"/>
+          </p:cNvPicPr>
+          <p:nvPr/>
+        </p:nvPicPr>
+        <p:blipFill>
+          <a:blip r:embed="rId2"/>
+          <a:stretch>
+            <a:fillRect/>
+          </a:stretch>
+        </p:blipFill>
+        <p:spPr>
+          <a:xfrm>
+            <a:off x="1365855" y="1469492"/>
+            <a:ext cx="9934606" cy="2061429"/>
+          </a:xfrm>
+          <a:prstGeom prst="rect">
+            <a:avLst/>
+          </a:prstGeom>
+          <a:effectLst>
+            <a:outerShdw blurRad="406400" dist="317500" dir="5400000" sx="89000" sy="89000" rotWithShape="0">
+              <a:prstClr val="black">
+                <a:alpha val="15000"/>
+              </a:prstClr>
+            </a:outerShdw>
+          </a:effectLst>
+        </p:spPr>
+      </p:pic>
     </p:spTree>
     <p:extLst>
       <p:ext uri="{BB962C8B-B14F-4D97-AF65-F5344CB8AC3E}">
@@ -6804,6 +7235,961 @@
     <p:extLst>
       <p:ext uri="{BB962C8B-B14F-4D97-AF65-F5344CB8AC3E}">
         <p14:creationId xmlns:p14="http://schemas.microsoft.com/office/powerpoint/2010/main" val="2593938880"/>
+      </p:ext>
+    </p:extLst>
+  </p:cSld>
+  <p:clrMapOvr>
+    <a:masterClrMapping/>
+  </p:clrMapOvr>
+</p:sld>
+</file>
+
+<file path=ppt/slides/slide20.xml><?xml version="1.0" encoding="utf-8"?>
+<p:sld xmlns:a="http://schemas.openxmlformats.org/drawingml/2006/main" xmlns:r="http://schemas.openxmlformats.org/officeDocument/2006/relationships" xmlns:p="http://schemas.openxmlformats.org/presentationml/2006/main">
+  <p:cSld>
+    <p:bg>
+      <p:bgPr>
+        <a:solidFill>
+          <a:schemeClr val="bg1"/>
+        </a:solidFill>
+        <a:effectLst/>
+      </p:bgPr>
+    </p:bg>
+    <p:spTree>
+      <p:nvGrpSpPr>
+        <p:cNvPr id="1" name=""/>
+        <p:cNvGrpSpPr/>
+        <p:nvPr/>
+      </p:nvGrpSpPr>
+      <p:grpSpPr>
+        <a:xfrm>
+          <a:off x="0" y="0"/>
+          <a:ext cx="0" cy="0"/>
+          <a:chOff x="0" y="0"/>
+          <a:chExt cx="0" cy="0"/>
+        </a:xfrm>
+      </p:grpSpPr>
+      <p:sp useBgFill="1">
+        <p:nvSpPr>
+          <p:cNvPr id="9" name="Rectangle 8">
+            <a:extLst>
+              <a:ext uri="{FF2B5EF4-FFF2-40B4-BE49-F238E27FC236}">
+                <a16:creationId xmlns:a16="http://schemas.microsoft.com/office/drawing/2014/main" id="{EB270761-CC40-4F3F-A916-7E3BC3989348}"/>
+              </a:ext>
+              <a:ext uri="{C183D7F6-B498-43B3-948B-1728B52AA6E4}">
+                <adec:decorative xmlns:adec="http://schemas.microsoft.com/office/drawing/2017/decorative" val="1"/>
+              </a:ext>
+            </a:extLst>
+          </p:cNvPr>
+          <p:cNvSpPr>
+            <a:spLocks noGrp="1" noRot="1" noChangeAspect="1" noMove="1" noResize="1" noEditPoints="1" noAdjustHandles="1" noChangeArrowheads="1" noChangeShapeType="1" noTextEdit="1"/>
+          </p:cNvSpPr>
+          <p:nvPr>
+            <p:extLst>
+              <p:ext uri="{386F3935-93C4-4BCD-93E2-E3B085C9AB24}">
+                <p16:designElem xmlns:p16="http://schemas.microsoft.com/office/powerpoint/2015/main" val="1"/>
+              </p:ext>
+            </p:extLst>
+          </p:nvPr>
+        </p:nvSpPr>
+        <p:spPr>
+          <a:xfrm>
+            <a:off x="-1" y="0"/>
+            <a:ext cx="12191695" cy="6858000"/>
+          </a:xfrm>
+          <a:prstGeom prst="rect">
+            <a:avLst/>
+          </a:prstGeom>
+          <a:ln>
+            <a:noFill/>
+          </a:ln>
+        </p:spPr>
+        <p:style>
+          <a:lnRef idx="2">
+            <a:schemeClr val="accent1">
+              <a:shade val="50000"/>
+            </a:schemeClr>
+          </a:lnRef>
+          <a:fillRef idx="1">
+            <a:schemeClr val="accent1"/>
+          </a:fillRef>
+          <a:effectRef idx="0">
+            <a:schemeClr val="accent1"/>
+          </a:effectRef>
+          <a:fontRef idx="minor">
+            <a:schemeClr val="lt1"/>
+          </a:fontRef>
+        </p:style>
+        <p:txBody>
+          <a:bodyPr rtlCol="0" anchor="ctr"/>
+          <a:lstStyle/>
+          <a:p>
+            <a:pPr algn="ctr"/>
+            <a:endParaRPr lang="en-US"/>
+          </a:p>
+        </p:txBody>
+      </p:sp>
+      <p:sp>
+        <p:nvSpPr>
+          <p:cNvPr id="2" name="Title 1">
+            <a:extLst>
+              <a:ext uri="{FF2B5EF4-FFF2-40B4-BE49-F238E27FC236}">
+                <a16:creationId xmlns:a16="http://schemas.microsoft.com/office/drawing/2014/main" id="{3ED66A6E-D5D5-46CF-9374-C69149E57A1C}"/>
+              </a:ext>
+            </a:extLst>
+          </p:cNvPr>
+          <p:cNvSpPr>
+            <a:spLocks noGrp="1"/>
+          </p:cNvSpPr>
+          <p:nvPr>
+            <p:ph type="title"/>
+          </p:nvPr>
+        </p:nvSpPr>
+        <p:spPr>
+          <a:xfrm>
+            <a:off x="1366160" y="4376508"/>
+            <a:ext cx="9623404" cy="1257202"/>
+          </a:xfrm>
+        </p:spPr>
+        <p:txBody>
+          <a:bodyPr vert="horz" lIns="91440" tIns="45720" rIns="91440" bIns="45720" rtlCol="0" anchor="b">
+            <a:normAutofit/>
+          </a:bodyPr>
+          <a:lstStyle/>
+          <a:p>
+            <a:r>
+              <a:rPr lang="en-US" sz="5100" kern="1200">
+                <a:solidFill>
+                  <a:schemeClr val="tx1"/>
+                </a:solidFill>
+                <a:latin typeface="+mj-lt"/>
+                <a:ea typeface="+mj-ea"/>
+                <a:cs typeface="+mj-cs"/>
+              </a:rPr>
+              <a:t>Standard Matrix Multiplication????</a:t>
+            </a:r>
+          </a:p>
+        </p:txBody>
+      </p:sp>
+      <p:sp>
+        <p:nvSpPr>
+          <p:cNvPr id="11" name="Rectangle 10">
+            <a:extLst>
+              <a:ext uri="{FF2B5EF4-FFF2-40B4-BE49-F238E27FC236}">
+                <a16:creationId xmlns:a16="http://schemas.microsoft.com/office/drawing/2014/main" id="{A2555B16-BE1D-4C33-A27C-FF0671B6C94C}"/>
+              </a:ext>
+              <a:ext uri="{C183D7F6-B498-43B3-948B-1728B52AA6E4}">
+                <adec:decorative xmlns:adec="http://schemas.microsoft.com/office/drawing/2017/decorative" val="1"/>
+              </a:ext>
+            </a:extLst>
+          </p:cNvPr>
+          <p:cNvSpPr>
+            <a:spLocks noGrp="1" noRot="1" noChangeAspect="1" noMove="1" noResize="1" noEditPoints="1" noAdjustHandles="1" noChangeArrowheads="1" noChangeShapeType="1" noTextEdit="1"/>
+          </p:cNvSpPr>
+          <p:nvPr>
+            <p:extLst>
+              <p:ext uri="{386F3935-93C4-4BCD-93E2-E3B085C9AB24}">
+                <p16:designElem xmlns:p16="http://schemas.microsoft.com/office/powerpoint/2015/main" val="1"/>
+              </p:ext>
+            </p:extLst>
+          </p:nvPr>
+        </p:nvSpPr>
+        <p:spPr>
+          <a:xfrm>
+            <a:off x="0" y="891540"/>
+            <a:ext cx="722376" cy="5071110"/>
+          </a:xfrm>
+          <a:prstGeom prst="rect">
+            <a:avLst/>
+          </a:prstGeom>
+          <a:solidFill>
+            <a:srgbClr val="4C5254"/>
+          </a:solidFill>
+          <a:ln>
+            <a:noFill/>
+          </a:ln>
+        </p:spPr>
+        <p:style>
+          <a:lnRef idx="2">
+            <a:schemeClr val="accent1">
+              <a:shade val="50000"/>
+            </a:schemeClr>
+          </a:lnRef>
+          <a:fillRef idx="1">
+            <a:schemeClr val="accent1"/>
+          </a:fillRef>
+          <a:effectRef idx="0">
+            <a:schemeClr val="accent1"/>
+          </a:effectRef>
+          <a:fontRef idx="minor">
+            <a:schemeClr val="lt1"/>
+          </a:fontRef>
+        </p:style>
+        <p:txBody>
+          <a:bodyPr rtlCol="0" anchor="ctr"/>
+          <a:lstStyle/>
+          <a:p>
+            <a:pPr algn="ctr"/>
+            <a:endParaRPr lang="en-US"/>
+          </a:p>
+        </p:txBody>
+      </p:sp>
+      <p:pic>
+        <p:nvPicPr>
+          <p:cNvPr id="4" name="Picture 3">
+            <a:extLst>
+              <a:ext uri="{FF2B5EF4-FFF2-40B4-BE49-F238E27FC236}">
+                <a16:creationId xmlns:a16="http://schemas.microsoft.com/office/drawing/2014/main" id="{177343F9-AD92-4E54-BF99-E754D618E9E7}"/>
+              </a:ext>
+            </a:extLst>
+          </p:cNvPr>
+          <p:cNvPicPr>
+            <a:picLocks noChangeAspect="1"/>
+          </p:cNvPicPr>
+          <p:nvPr/>
+        </p:nvPicPr>
+        <p:blipFill>
+          <a:blip r:embed="rId2"/>
+          <a:stretch>
+            <a:fillRect/>
+          </a:stretch>
+        </p:blipFill>
+        <p:spPr>
+          <a:xfrm>
+            <a:off x="1365855" y="1668183"/>
+            <a:ext cx="9934606" cy="1664046"/>
+          </a:xfrm>
+          <a:prstGeom prst="rect">
+            <a:avLst/>
+          </a:prstGeom>
+          <a:effectLst>
+            <a:outerShdw blurRad="406400" dist="317500" dir="5400000" sx="89000" sy="89000" rotWithShape="0">
+              <a:prstClr val="black">
+                <a:alpha val="15000"/>
+              </a:prstClr>
+            </a:outerShdw>
+          </a:effectLst>
+        </p:spPr>
+      </p:pic>
+    </p:spTree>
+    <p:extLst>
+      <p:ext uri="{BB962C8B-B14F-4D97-AF65-F5344CB8AC3E}">
+        <p14:creationId xmlns:p14="http://schemas.microsoft.com/office/powerpoint/2010/main" val="1594308202"/>
+      </p:ext>
+    </p:extLst>
+  </p:cSld>
+  <p:clrMapOvr>
+    <a:masterClrMapping/>
+  </p:clrMapOvr>
+</p:sld>
+</file>
+
+<file path=ppt/slides/slide21.xml><?xml version="1.0" encoding="utf-8"?>
+<p:sld xmlns:a="http://schemas.openxmlformats.org/drawingml/2006/main" xmlns:r="http://schemas.openxmlformats.org/officeDocument/2006/relationships" xmlns:p="http://schemas.openxmlformats.org/presentationml/2006/main">
+  <p:cSld>
+    <p:bg>
+      <p:bgPr>
+        <a:solidFill>
+          <a:schemeClr val="bg1"/>
+        </a:solidFill>
+        <a:effectLst/>
+      </p:bgPr>
+    </p:bg>
+    <p:spTree>
+      <p:nvGrpSpPr>
+        <p:cNvPr id="1" name=""/>
+        <p:cNvGrpSpPr/>
+        <p:nvPr/>
+      </p:nvGrpSpPr>
+      <p:grpSpPr>
+        <a:xfrm>
+          <a:off x="0" y="0"/>
+          <a:ext cx="0" cy="0"/>
+          <a:chOff x="0" y="0"/>
+          <a:chExt cx="0" cy="0"/>
+        </a:xfrm>
+      </p:grpSpPr>
+      <p:sp useBgFill="1">
+        <p:nvSpPr>
+          <p:cNvPr id="11" name="Rectangle 10">
+            <a:extLst>
+              <a:ext uri="{FF2B5EF4-FFF2-40B4-BE49-F238E27FC236}">
+                <a16:creationId xmlns:a16="http://schemas.microsoft.com/office/drawing/2014/main" id="{EB270761-CC40-4F3F-A916-7E3BC3989348}"/>
+              </a:ext>
+              <a:ext uri="{C183D7F6-B498-43B3-948B-1728B52AA6E4}">
+                <adec:decorative xmlns:adec="http://schemas.microsoft.com/office/drawing/2017/decorative" val="1"/>
+              </a:ext>
+            </a:extLst>
+          </p:cNvPr>
+          <p:cNvSpPr>
+            <a:spLocks noGrp="1" noRot="1" noChangeAspect="1" noMove="1" noResize="1" noEditPoints="1" noAdjustHandles="1" noChangeArrowheads="1" noChangeShapeType="1" noTextEdit="1"/>
+          </p:cNvSpPr>
+          <p:nvPr>
+            <p:extLst>
+              <p:ext uri="{386F3935-93C4-4BCD-93E2-E3B085C9AB24}">
+                <p16:designElem xmlns:p16="http://schemas.microsoft.com/office/powerpoint/2015/main" val="1"/>
+              </p:ext>
+            </p:extLst>
+          </p:nvPr>
+        </p:nvSpPr>
+        <p:spPr>
+          <a:xfrm>
+            <a:off x="-1" y="0"/>
+            <a:ext cx="12191695" cy="6858000"/>
+          </a:xfrm>
+          <a:prstGeom prst="rect">
+            <a:avLst/>
+          </a:prstGeom>
+          <a:ln>
+            <a:noFill/>
+          </a:ln>
+        </p:spPr>
+        <p:style>
+          <a:lnRef idx="2">
+            <a:schemeClr val="accent1">
+              <a:shade val="50000"/>
+            </a:schemeClr>
+          </a:lnRef>
+          <a:fillRef idx="1">
+            <a:schemeClr val="accent1"/>
+          </a:fillRef>
+          <a:effectRef idx="0">
+            <a:schemeClr val="accent1"/>
+          </a:effectRef>
+          <a:fontRef idx="minor">
+            <a:schemeClr val="lt1"/>
+          </a:fontRef>
+        </p:style>
+        <p:txBody>
+          <a:bodyPr rtlCol="0" anchor="ctr"/>
+          <a:lstStyle/>
+          <a:p>
+            <a:pPr algn="ctr"/>
+            <a:endParaRPr lang="en-US"/>
+          </a:p>
+        </p:txBody>
+      </p:sp>
+      <p:sp>
+        <p:nvSpPr>
+          <p:cNvPr id="2" name="Title 1">
+            <a:extLst>
+              <a:ext uri="{FF2B5EF4-FFF2-40B4-BE49-F238E27FC236}">
+                <a16:creationId xmlns:a16="http://schemas.microsoft.com/office/drawing/2014/main" id="{2850A7ED-96D2-417C-B903-C6CAE2CE7669}"/>
+              </a:ext>
+            </a:extLst>
+          </p:cNvPr>
+          <p:cNvSpPr>
+            <a:spLocks noGrp="1"/>
+          </p:cNvSpPr>
+          <p:nvPr>
+            <p:ph type="title"/>
+          </p:nvPr>
+        </p:nvSpPr>
+        <p:spPr>
+          <a:xfrm>
+            <a:off x="1366160" y="4376508"/>
+            <a:ext cx="9623404" cy="1257202"/>
+          </a:xfrm>
+        </p:spPr>
+        <p:txBody>
+          <a:bodyPr vert="horz" lIns="91440" tIns="45720" rIns="91440" bIns="45720" rtlCol="0" anchor="b">
+            <a:normAutofit/>
+          </a:bodyPr>
+          <a:lstStyle/>
+          <a:p>
+            <a:r>
+              <a:rPr lang="en-US" sz="6600" kern="1200" dirty="0">
+                <a:solidFill>
+                  <a:schemeClr val="tx1"/>
+                </a:solidFill>
+                <a:latin typeface="+mj-lt"/>
+                <a:ea typeface="+mj-ea"/>
+                <a:cs typeface="+mj-cs"/>
+              </a:rPr>
+              <a:t>Isomorphism</a:t>
+            </a:r>
+          </a:p>
+        </p:txBody>
+      </p:sp>
+      <p:sp>
+        <p:nvSpPr>
+          <p:cNvPr id="13" name="Rectangle 12">
+            <a:extLst>
+              <a:ext uri="{FF2B5EF4-FFF2-40B4-BE49-F238E27FC236}">
+                <a16:creationId xmlns:a16="http://schemas.microsoft.com/office/drawing/2014/main" id="{A2555B16-BE1D-4C33-A27C-FF0671B6C94C}"/>
+              </a:ext>
+              <a:ext uri="{C183D7F6-B498-43B3-948B-1728B52AA6E4}">
+                <adec:decorative xmlns:adec="http://schemas.microsoft.com/office/drawing/2017/decorative" val="1"/>
+              </a:ext>
+            </a:extLst>
+          </p:cNvPr>
+          <p:cNvSpPr>
+            <a:spLocks noGrp="1" noRot="1" noChangeAspect="1" noMove="1" noResize="1" noEditPoints="1" noAdjustHandles="1" noChangeArrowheads="1" noChangeShapeType="1" noTextEdit="1"/>
+          </p:cNvSpPr>
+          <p:nvPr>
+            <p:extLst>
+              <p:ext uri="{386F3935-93C4-4BCD-93E2-E3B085C9AB24}">
+                <p16:designElem xmlns:p16="http://schemas.microsoft.com/office/powerpoint/2015/main" val="1"/>
+              </p:ext>
+            </p:extLst>
+          </p:nvPr>
+        </p:nvSpPr>
+        <p:spPr>
+          <a:xfrm>
+            <a:off x="0" y="891540"/>
+            <a:ext cx="722376" cy="5071110"/>
+          </a:xfrm>
+          <a:prstGeom prst="rect">
+            <a:avLst/>
+          </a:prstGeom>
+          <a:solidFill>
+            <a:srgbClr val="4C5254"/>
+          </a:solidFill>
+          <a:ln>
+            <a:noFill/>
+          </a:ln>
+        </p:spPr>
+        <p:style>
+          <a:lnRef idx="2">
+            <a:schemeClr val="accent1">
+              <a:shade val="50000"/>
+            </a:schemeClr>
+          </a:lnRef>
+          <a:fillRef idx="1">
+            <a:schemeClr val="accent1"/>
+          </a:fillRef>
+          <a:effectRef idx="0">
+            <a:schemeClr val="accent1"/>
+          </a:effectRef>
+          <a:fontRef idx="minor">
+            <a:schemeClr val="lt1"/>
+          </a:fontRef>
+        </p:style>
+        <p:txBody>
+          <a:bodyPr rtlCol="0" anchor="ctr"/>
+          <a:lstStyle/>
+          <a:p>
+            <a:pPr algn="ctr"/>
+            <a:endParaRPr lang="en-US"/>
+          </a:p>
+        </p:txBody>
+      </p:sp>
+      <p:pic>
+        <p:nvPicPr>
+          <p:cNvPr id="6" name="Picture 5">
+            <a:extLst>
+              <a:ext uri="{FF2B5EF4-FFF2-40B4-BE49-F238E27FC236}">
+                <a16:creationId xmlns:a16="http://schemas.microsoft.com/office/drawing/2014/main" id="{7AE99F1D-800D-4B83-B3BD-6D467FF33D0C}"/>
+              </a:ext>
+            </a:extLst>
+          </p:cNvPr>
+          <p:cNvPicPr>
+            <a:picLocks noChangeAspect="1"/>
+          </p:cNvPicPr>
+          <p:nvPr/>
+        </p:nvPicPr>
+        <p:blipFill>
+          <a:blip r:embed="rId2"/>
+          <a:stretch>
+            <a:fillRect/>
+          </a:stretch>
+        </p:blipFill>
+        <p:spPr>
+          <a:xfrm>
+            <a:off x="1365855" y="1904130"/>
+            <a:ext cx="9934606" cy="1192153"/>
+          </a:xfrm>
+          <a:prstGeom prst="rect">
+            <a:avLst/>
+          </a:prstGeom>
+          <a:effectLst>
+            <a:outerShdw blurRad="406400" dist="317500" dir="5400000" sx="89000" sy="89000" rotWithShape="0">
+              <a:prstClr val="black">
+                <a:alpha val="15000"/>
+              </a:prstClr>
+            </a:outerShdw>
+          </a:effectLst>
+        </p:spPr>
+      </p:pic>
+    </p:spTree>
+    <p:extLst>
+      <p:ext uri="{BB962C8B-B14F-4D97-AF65-F5344CB8AC3E}">
+        <p14:creationId xmlns:p14="http://schemas.microsoft.com/office/powerpoint/2010/main" val="955675857"/>
+      </p:ext>
+    </p:extLst>
+  </p:cSld>
+  <p:clrMapOvr>
+    <a:masterClrMapping/>
+  </p:clrMapOvr>
+</p:sld>
+</file>
+
+<file path=ppt/slides/slide22.xml><?xml version="1.0" encoding="utf-8"?>
+<p:sld xmlns:a="http://schemas.openxmlformats.org/drawingml/2006/main" xmlns:r="http://schemas.openxmlformats.org/officeDocument/2006/relationships" xmlns:p="http://schemas.openxmlformats.org/presentationml/2006/main">
+  <p:cSld>
+    <p:bg>
+      <p:bgPr>
+        <a:solidFill>
+          <a:schemeClr val="bg1"/>
+        </a:solidFill>
+        <a:effectLst/>
+      </p:bgPr>
+    </p:bg>
+    <p:spTree>
+      <p:nvGrpSpPr>
+        <p:cNvPr id="1" name=""/>
+        <p:cNvGrpSpPr/>
+        <p:nvPr/>
+      </p:nvGrpSpPr>
+      <p:grpSpPr>
+        <a:xfrm>
+          <a:off x="0" y="0"/>
+          <a:ext cx="0" cy="0"/>
+          <a:chOff x="0" y="0"/>
+          <a:chExt cx="0" cy="0"/>
+        </a:xfrm>
+      </p:grpSpPr>
+      <p:sp useBgFill="1">
+        <p:nvSpPr>
+          <p:cNvPr id="9" name="Rectangle 8">
+            <a:extLst>
+              <a:ext uri="{FF2B5EF4-FFF2-40B4-BE49-F238E27FC236}">
+                <a16:creationId xmlns:a16="http://schemas.microsoft.com/office/drawing/2014/main" id="{EB270761-CC40-4F3F-A916-7E3BC3989348}"/>
+              </a:ext>
+              <a:ext uri="{C183D7F6-B498-43B3-948B-1728B52AA6E4}">
+                <adec:decorative xmlns:adec="http://schemas.microsoft.com/office/drawing/2017/decorative" val="1"/>
+              </a:ext>
+            </a:extLst>
+          </p:cNvPr>
+          <p:cNvSpPr>
+            <a:spLocks noGrp="1" noRot="1" noChangeAspect="1" noMove="1" noResize="1" noEditPoints="1" noAdjustHandles="1" noChangeArrowheads="1" noChangeShapeType="1" noTextEdit="1"/>
+          </p:cNvSpPr>
+          <p:nvPr>
+            <p:extLst>
+              <p:ext uri="{386F3935-93C4-4BCD-93E2-E3B085C9AB24}">
+                <p16:designElem xmlns:p16="http://schemas.microsoft.com/office/powerpoint/2015/main" val="1"/>
+              </p:ext>
+            </p:extLst>
+          </p:nvPr>
+        </p:nvSpPr>
+        <p:spPr>
+          <a:xfrm>
+            <a:off x="-1" y="0"/>
+            <a:ext cx="12191695" cy="6858000"/>
+          </a:xfrm>
+          <a:prstGeom prst="rect">
+            <a:avLst/>
+          </a:prstGeom>
+          <a:ln>
+            <a:noFill/>
+          </a:ln>
+        </p:spPr>
+        <p:style>
+          <a:lnRef idx="2">
+            <a:schemeClr val="accent1">
+              <a:shade val="50000"/>
+            </a:schemeClr>
+          </a:lnRef>
+          <a:fillRef idx="1">
+            <a:schemeClr val="accent1"/>
+          </a:fillRef>
+          <a:effectRef idx="0">
+            <a:schemeClr val="accent1"/>
+          </a:effectRef>
+          <a:fontRef idx="minor">
+            <a:schemeClr val="lt1"/>
+          </a:fontRef>
+        </p:style>
+        <p:txBody>
+          <a:bodyPr rtlCol="0" anchor="ctr"/>
+          <a:lstStyle/>
+          <a:p>
+            <a:pPr algn="ctr"/>
+            <a:endParaRPr lang="en-US"/>
+          </a:p>
+        </p:txBody>
+      </p:sp>
+      <p:sp>
+        <p:nvSpPr>
+          <p:cNvPr id="2" name="Title 1">
+            <a:extLst>
+              <a:ext uri="{FF2B5EF4-FFF2-40B4-BE49-F238E27FC236}">
+                <a16:creationId xmlns:a16="http://schemas.microsoft.com/office/drawing/2014/main" id="{55C4CDE4-E951-449C-A932-89AA243A481C}"/>
+              </a:ext>
+            </a:extLst>
+          </p:cNvPr>
+          <p:cNvSpPr>
+            <a:spLocks noGrp="1"/>
+          </p:cNvSpPr>
+          <p:nvPr>
+            <p:ph type="title"/>
+          </p:nvPr>
+        </p:nvSpPr>
+        <p:spPr>
+          <a:xfrm>
+            <a:off x="1366160" y="4376508"/>
+            <a:ext cx="9623404" cy="1257202"/>
+          </a:xfrm>
+        </p:spPr>
+        <p:txBody>
+          <a:bodyPr vert="horz" lIns="91440" tIns="45720" rIns="91440" bIns="45720" rtlCol="0" anchor="b">
+            <a:normAutofit/>
+          </a:bodyPr>
+          <a:lstStyle/>
+          <a:p>
+            <a:r>
+              <a:rPr lang="en-US" sz="4100" kern="1200" dirty="0">
+                <a:solidFill>
+                  <a:schemeClr val="tx1"/>
+                </a:solidFill>
+                <a:latin typeface="+mj-lt"/>
+                <a:ea typeface="+mj-ea"/>
+                <a:cs typeface="+mj-cs"/>
+              </a:rPr>
+              <a:t>Invertible Linear Transformation and Standard </a:t>
+            </a:r>
+            <a:r>
+              <a:rPr lang="en-US" sz="4100" dirty="0"/>
+              <a:t>M</a:t>
+            </a:r>
+            <a:r>
+              <a:rPr lang="en-US" sz="4100" kern="1200" dirty="0">
+                <a:solidFill>
+                  <a:schemeClr val="tx1"/>
+                </a:solidFill>
+                <a:latin typeface="+mj-lt"/>
+                <a:ea typeface="+mj-ea"/>
+                <a:cs typeface="+mj-cs"/>
+              </a:rPr>
+              <a:t>atrix</a:t>
+            </a:r>
+          </a:p>
+        </p:txBody>
+      </p:sp>
+      <p:sp>
+        <p:nvSpPr>
+          <p:cNvPr id="11" name="Rectangle 10">
+            <a:extLst>
+              <a:ext uri="{FF2B5EF4-FFF2-40B4-BE49-F238E27FC236}">
+                <a16:creationId xmlns:a16="http://schemas.microsoft.com/office/drawing/2014/main" id="{A2555B16-BE1D-4C33-A27C-FF0671B6C94C}"/>
+              </a:ext>
+              <a:ext uri="{C183D7F6-B498-43B3-948B-1728B52AA6E4}">
+                <adec:decorative xmlns:adec="http://schemas.microsoft.com/office/drawing/2017/decorative" val="1"/>
+              </a:ext>
+            </a:extLst>
+          </p:cNvPr>
+          <p:cNvSpPr>
+            <a:spLocks noGrp="1" noRot="1" noChangeAspect="1" noMove="1" noResize="1" noEditPoints="1" noAdjustHandles="1" noChangeArrowheads="1" noChangeShapeType="1" noTextEdit="1"/>
+          </p:cNvSpPr>
+          <p:nvPr>
+            <p:extLst>
+              <p:ext uri="{386F3935-93C4-4BCD-93E2-E3B085C9AB24}">
+                <p16:designElem xmlns:p16="http://schemas.microsoft.com/office/powerpoint/2015/main" val="1"/>
+              </p:ext>
+            </p:extLst>
+          </p:nvPr>
+        </p:nvSpPr>
+        <p:spPr>
+          <a:xfrm>
+            <a:off x="0" y="891540"/>
+            <a:ext cx="722376" cy="5071110"/>
+          </a:xfrm>
+          <a:prstGeom prst="rect">
+            <a:avLst/>
+          </a:prstGeom>
+          <a:solidFill>
+            <a:srgbClr val="4C5254"/>
+          </a:solidFill>
+          <a:ln>
+            <a:noFill/>
+          </a:ln>
+        </p:spPr>
+        <p:style>
+          <a:lnRef idx="2">
+            <a:schemeClr val="accent1">
+              <a:shade val="50000"/>
+            </a:schemeClr>
+          </a:lnRef>
+          <a:fillRef idx="1">
+            <a:schemeClr val="accent1"/>
+          </a:fillRef>
+          <a:effectRef idx="0">
+            <a:schemeClr val="accent1"/>
+          </a:effectRef>
+          <a:fontRef idx="minor">
+            <a:schemeClr val="lt1"/>
+          </a:fontRef>
+        </p:style>
+        <p:txBody>
+          <a:bodyPr rtlCol="0" anchor="ctr"/>
+          <a:lstStyle/>
+          <a:p>
+            <a:pPr algn="ctr"/>
+            <a:endParaRPr lang="en-US"/>
+          </a:p>
+        </p:txBody>
+      </p:sp>
+      <p:pic>
+        <p:nvPicPr>
+          <p:cNvPr id="4" name="Picture 3">
+            <a:extLst>
+              <a:ext uri="{FF2B5EF4-FFF2-40B4-BE49-F238E27FC236}">
+                <a16:creationId xmlns:a16="http://schemas.microsoft.com/office/drawing/2014/main" id="{71397B19-8B36-4F9A-837A-8B9638FAEAC6}"/>
+              </a:ext>
+            </a:extLst>
+          </p:cNvPr>
+          <p:cNvPicPr>
+            <a:picLocks noChangeAspect="1"/>
+          </p:cNvPicPr>
+          <p:nvPr/>
+        </p:nvPicPr>
+        <p:blipFill>
+          <a:blip r:embed="rId2"/>
+          <a:stretch>
+            <a:fillRect/>
+          </a:stretch>
+        </p:blipFill>
+        <p:spPr>
+          <a:xfrm>
+            <a:off x="1365855" y="1941385"/>
+            <a:ext cx="9934606" cy="1117643"/>
+          </a:xfrm>
+          <a:prstGeom prst="rect">
+            <a:avLst/>
+          </a:prstGeom>
+          <a:effectLst>
+            <a:outerShdw blurRad="406400" dist="317500" dir="5400000" sx="89000" sy="89000" rotWithShape="0">
+              <a:prstClr val="black">
+                <a:alpha val="15000"/>
+              </a:prstClr>
+            </a:outerShdw>
+          </a:effectLst>
+        </p:spPr>
+      </p:pic>
+    </p:spTree>
+    <p:extLst>
+      <p:ext uri="{BB962C8B-B14F-4D97-AF65-F5344CB8AC3E}">
+        <p14:creationId xmlns:p14="http://schemas.microsoft.com/office/powerpoint/2010/main" val="1125068611"/>
+      </p:ext>
+    </p:extLst>
+  </p:cSld>
+  <p:clrMapOvr>
+    <a:masterClrMapping/>
+  </p:clrMapOvr>
+</p:sld>
+</file>
+
+<file path=ppt/slides/slide23.xml><?xml version="1.0" encoding="utf-8"?>
+<p:sld xmlns:a="http://schemas.openxmlformats.org/drawingml/2006/main" xmlns:r="http://schemas.openxmlformats.org/officeDocument/2006/relationships" xmlns:p="http://schemas.openxmlformats.org/presentationml/2006/main">
+  <p:cSld>
+    <p:spTree>
+      <p:nvGrpSpPr>
+        <p:cNvPr id="1" name=""/>
+        <p:cNvGrpSpPr/>
+        <p:nvPr/>
+      </p:nvGrpSpPr>
+      <p:grpSpPr>
+        <a:xfrm>
+          <a:off x="0" y="0"/>
+          <a:ext cx="0" cy="0"/>
+          <a:chOff x="0" y="0"/>
+          <a:chExt cx="0" cy="0"/>
+        </a:xfrm>
+      </p:grpSpPr>
+      <p:sp>
+        <p:nvSpPr>
+          <p:cNvPr id="2" name="Title 1">
+            <a:extLst>
+              <a:ext uri="{FF2B5EF4-FFF2-40B4-BE49-F238E27FC236}">
+                <a16:creationId xmlns:a16="http://schemas.microsoft.com/office/drawing/2014/main" id="{888F8FB0-8E20-4D8F-AA61-40944173C802}"/>
+              </a:ext>
+            </a:extLst>
+          </p:cNvPr>
+          <p:cNvSpPr>
+            <a:spLocks noGrp="1"/>
+          </p:cNvSpPr>
+          <p:nvPr>
+            <p:ph type="title"/>
+          </p:nvPr>
+        </p:nvSpPr>
+        <p:spPr/>
+        <p:txBody>
+          <a:bodyPr/>
+          <a:lstStyle/>
+          <a:p>
+            <a:endParaRPr lang="en-US"/>
+          </a:p>
+        </p:txBody>
+      </p:sp>
+    </p:spTree>
+    <p:extLst>
+      <p:ext uri="{BB962C8B-B14F-4D97-AF65-F5344CB8AC3E}">
+        <p14:creationId xmlns:p14="http://schemas.microsoft.com/office/powerpoint/2010/main" val="1070451020"/>
+      </p:ext>
+    </p:extLst>
+  </p:cSld>
+  <p:clrMapOvr>
+    <a:masterClrMapping/>
+  </p:clrMapOvr>
+</p:sld>
+</file>
+
+<file path=ppt/slides/slide24.xml><?xml version="1.0" encoding="utf-8"?>
+<p:sld xmlns:a="http://schemas.openxmlformats.org/drawingml/2006/main" xmlns:r="http://schemas.openxmlformats.org/officeDocument/2006/relationships" xmlns:p="http://schemas.openxmlformats.org/presentationml/2006/main">
+  <p:cSld>
+    <p:spTree>
+      <p:nvGrpSpPr>
+        <p:cNvPr id="1" name=""/>
+        <p:cNvGrpSpPr/>
+        <p:nvPr/>
+      </p:nvGrpSpPr>
+      <p:grpSpPr>
+        <a:xfrm>
+          <a:off x="0" y="0"/>
+          <a:ext cx="0" cy="0"/>
+          <a:chOff x="0" y="0"/>
+          <a:chExt cx="0" cy="0"/>
+        </a:xfrm>
+      </p:grpSpPr>
+      <p:sp>
+        <p:nvSpPr>
+          <p:cNvPr id="2" name="Title 1">
+            <a:extLst>
+              <a:ext uri="{FF2B5EF4-FFF2-40B4-BE49-F238E27FC236}">
+                <a16:creationId xmlns:a16="http://schemas.microsoft.com/office/drawing/2014/main" id="{E2A30878-7531-452D-9EE5-AC3CB34AE565}"/>
+              </a:ext>
+            </a:extLst>
+          </p:cNvPr>
+          <p:cNvSpPr>
+            <a:spLocks noGrp="1"/>
+          </p:cNvSpPr>
+          <p:nvPr>
+            <p:ph type="title"/>
+          </p:nvPr>
+        </p:nvSpPr>
+        <p:spPr/>
+        <p:txBody>
+          <a:bodyPr/>
+          <a:lstStyle/>
+          <a:p>
+            <a:endParaRPr lang="en-US"/>
+          </a:p>
+        </p:txBody>
+      </p:sp>
+    </p:spTree>
+    <p:extLst>
+      <p:ext uri="{BB962C8B-B14F-4D97-AF65-F5344CB8AC3E}">
+        <p14:creationId xmlns:p14="http://schemas.microsoft.com/office/powerpoint/2010/main" val="3924658005"/>
+      </p:ext>
+    </p:extLst>
+  </p:cSld>
+  <p:clrMapOvr>
+    <a:masterClrMapping/>
+  </p:clrMapOvr>
+</p:sld>
+</file>
+
+<file path=ppt/slides/slide25.xml><?xml version="1.0" encoding="utf-8"?>
+<p:sld xmlns:a="http://schemas.openxmlformats.org/drawingml/2006/main" xmlns:r="http://schemas.openxmlformats.org/officeDocument/2006/relationships" xmlns:p="http://schemas.openxmlformats.org/presentationml/2006/main">
+  <p:cSld>
+    <p:spTree>
+      <p:nvGrpSpPr>
+        <p:cNvPr id="1" name=""/>
+        <p:cNvGrpSpPr/>
+        <p:nvPr/>
+      </p:nvGrpSpPr>
+      <p:grpSpPr>
+        <a:xfrm>
+          <a:off x="0" y="0"/>
+          <a:ext cx="0" cy="0"/>
+          <a:chOff x="0" y="0"/>
+          <a:chExt cx="0" cy="0"/>
+        </a:xfrm>
+      </p:grpSpPr>
+      <p:sp>
+        <p:nvSpPr>
+          <p:cNvPr id="2" name="Title 1">
+            <a:extLst>
+              <a:ext uri="{FF2B5EF4-FFF2-40B4-BE49-F238E27FC236}">
+                <a16:creationId xmlns:a16="http://schemas.microsoft.com/office/drawing/2014/main" id="{6EFA2E8B-CA8F-40AD-AC05-3230142BD5E0}"/>
+              </a:ext>
+            </a:extLst>
+          </p:cNvPr>
+          <p:cNvSpPr>
+            <a:spLocks noGrp="1"/>
+          </p:cNvSpPr>
+          <p:nvPr>
+            <p:ph type="title"/>
+          </p:nvPr>
+        </p:nvSpPr>
+        <p:spPr/>
+        <p:txBody>
+          <a:bodyPr/>
+          <a:lstStyle/>
+          <a:p>
+            <a:endParaRPr lang="en-US"/>
+          </a:p>
+        </p:txBody>
+      </p:sp>
+    </p:spTree>
+    <p:extLst>
+      <p:ext uri="{BB962C8B-B14F-4D97-AF65-F5344CB8AC3E}">
+        <p14:creationId xmlns:p14="http://schemas.microsoft.com/office/powerpoint/2010/main" val="2308443354"/>
+      </p:ext>
+    </p:extLst>
+  </p:cSld>
+  <p:clrMapOvr>
+    <a:masterClrMapping/>
+  </p:clrMapOvr>
+</p:sld>
+</file>
+
+<file path=ppt/slides/slide26.xml><?xml version="1.0" encoding="utf-8"?>
+<p:sld xmlns:a="http://schemas.openxmlformats.org/drawingml/2006/main" xmlns:r="http://schemas.openxmlformats.org/officeDocument/2006/relationships" xmlns:p="http://schemas.openxmlformats.org/presentationml/2006/main">
+  <p:cSld>
+    <p:spTree>
+      <p:nvGrpSpPr>
+        <p:cNvPr id="1" name=""/>
+        <p:cNvGrpSpPr/>
+        <p:nvPr/>
+      </p:nvGrpSpPr>
+      <p:grpSpPr>
+        <a:xfrm>
+          <a:off x="0" y="0"/>
+          <a:ext cx="0" cy="0"/>
+          <a:chOff x="0" y="0"/>
+          <a:chExt cx="0" cy="0"/>
+        </a:xfrm>
+      </p:grpSpPr>
+      <p:sp>
+        <p:nvSpPr>
+          <p:cNvPr id="2" name="Title 1">
+            <a:extLst>
+              <a:ext uri="{FF2B5EF4-FFF2-40B4-BE49-F238E27FC236}">
+                <a16:creationId xmlns:a16="http://schemas.microsoft.com/office/drawing/2014/main" id="{27AEA607-A0F9-4168-8DD6-2B5F01670AE9}"/>
+              </a:ext>
+            </a:extLst>
+          </p:cNvPr>
+          <p:cNvSpPr>
+            <a:spLocks noGrp="1"/>
+          </p:cNvSpPr>
+          <p:nvPr>
+            <p:ph type="title"/>
+          </p:nvPr>
+        </p:nvSpPr>
+        <p:spPr/>
+        <p:txBody>
+          <a:bodyPr/>
+          <a:lstStyle/>
+          <a:p>
+            <a:endParaRPr lang="en-US"/>
+          </a:p>
+        </p:txBody>
+      </p:sp>
+    </p:spTree>
+    <p:extLst>
+      <p:ext uri="{BB962C8B-B14F-4D97-AF65-F5344CB8AC3E}">
+        <p14:creationId xmlns:p14="http://schemas.microsoft.com/office/powerpoint/2010/main" val="2063718745"/>
       </p:ext>
     </p:extLst>
   </p:cSld>
@@ -9399,18 +10785,18 @@
 </file>
 
 <file path=customXml/item2.xml><?xml version="1.0" encoding="utf-8"?>
+<p:properties xmlns:p="http://schemas.microsoft.com/office/2006/metadata/properties" xmlns:xsi="http://www.w3.org/2001/XMLSchema-instance" xmlns:pc="http://schemas.microsoft.com/office/infopath/2007/PartnerControls">
+  <documentManagement/>
+</p:properties>
+</file>
+
+<file path=customXml/item3.xml><?xml version="1.0" encoding="utf-8"?>
 <?mso-contentType ?>
 <FormTemplates xmlns="http://schemas.microsoft.com/sharepoint/v3/contenttype/forms">
   <Display>DocumentLibraryForm</Display>
   <Edit>DocumentLibraryForm</Edit>
   <New>DocumentLibraryForm</New>
 </FormTemplates>
-</file>
-
-<file path=customXml/item3.xml><?xml version="1.0" encoding="utf-8"?>
-<p:properties xmlns:p="http://schemas.microsoft.com/office/2006/metadata/properties" xmlns:xsi="http://www.w3.org/2001/XMLSchema-instance" xmlns:pc="http://schemas.microsoft.com/office/infopath/2007/PartnerControls">
-  <documentManagement/>
-</p:properties>
 </file>
 
 <file path=customXml/itemProps1.xml><?xml version="1.0" encoding="utf-8"?>
@@ -9432,14 +10818,6 @@
 </file>
 
 <file path=customXml/itemProps2.xml><?xml version="1.0" encoding="utf-8"?>
-<ds:datastoreItem xmlns:ds="http://schemas.openxmlformats.org/officeDocument/2006/customXml" ds:itemID="{97011689-39C2-4FF2-8A9A-B371DB6366C2}">
-  <ds:schemaRefs>
-    <ds:schemaRef ds:uri="http://schemas.microsoft.com/sharepoint/v3/contenttype/forms"/>
-  </ds:schemaRefs>
-</ds:datastoreItem>
-</file>
-
-<file path=customXml/itemProps3.xml><?xml version="1.0" encoding="utf-8"?>
 <ds:datastoreItem xmlns:ds="http://schemas.openxmlformats.org/officeDocument/2006/customXml" ds:itemID="{B1A9F696-FA5F-4B34-B731-F825EC19C60A}">
   <ds:schemaRefs>
     <ds:schemaRef ds:uri="http://purl.org/dc/dcmitype/"/>
@@ -9453,4 +10831,12 @@
     <ds:schemaRef ds:uri="http://schemas.microsoft.com/office/2006/metadata/properties"/>
   </ds:schemaRefs>
 </ds:datastoreItem>
+</file>
+
+<file path=customXml/itemProps3.xml><?xml version="1.0" encoding="utf-8"?>
+<ds:datastoreItem xmlns:ds="http://schemas.openxmlformats.org/officeDocument/2006/customXml" ds:itemID="{97011689-39C2-4FF2-8A9A-B371DB6366C2}">
+  <ds:schemaRefs>
+    <ds:schemaRef ds:uri="http://schemas.microsoft.com/sharepoint/v3/contenttype/forms"/>
+  </ds:schemaRefs>
+</ds:datastoreItem>
 </file>
</xml_diff>

<commit_message>
Added comments, cheatsheet for eigens added
</commit_message>
<xml_diff>
--- a/Unit 3-4 Theorems.pptx
+++ b/Unit 3-4 Theorems.pptx
@@ -30,15 +30,15 @@
     <p:sldId id="276" r:id="rId24"/>
     <p:sldId id="277" r:id="rId25"/>
     <p:sldId id="278" r:id="rId26"/>
-    <p:sldId id="283" r:id="rId27"/>
-    <p:sldId id="280" r:id="rId28"/>
-    <p:sldId id="284" r:id="rId29"/>
-    <p:sldId id="285" r:id="rId30"/>
-    <p:sldId id="286" r:id="rId31"/>
-    <p:sldId id="287" r:id="rId32"/>
-    <p:sldId id="288" r:id="rId33"/>
-    <p:sldId id="291" r:id="rId34"/>
-    <p:sldId id="292" r:id="rId35"/>
+    <p:sldId id="280" r:id="rId27"/>
+    <p:sldId id="284" r:id="rId28"/>
+    <p:sldId id="285" r:id="rId29"/>
+    <p:sldId id="286" r:id="rId30"/>
+    <p:sldId id="287" r:id="rId31"/>
+    <p:sldId id="288" r:id="rId32"/>
+    <p:sldId id="291" r:id="rId33"/>
+    <p:sldId id="292" r:id="rId34"/>
+    <p:sldId id="294" r:id="rId35"/>
   </p:sldIdLst>
   <p:sldSz cx="12192000" cy="6858000"/>
   <p:notesSz cx="6858000" cy="9144000"/>
@@ -160,7 +160,7 @@
 <file path=ppt/revisionInfo.xml><?xml version="1.0" encoding="utf-8"?>
 <p1510:revInfo xmlns:a="http://schemas.openxmlformats.org/drawingml/2006/main" xmlns:r="http://schemas.openxmlformats.org/officeDocument/2006/relationships" xmlns:p1510="http://schemas.microsoft.com/office/powerpoint/2015/10/main">
   <p1510:revLst>
-    <p1510:client id="{80965980-7CDF-4379-9A6F-B1F09123E494}" v="1022" dt="2021-03-28T17:43:31.568"/>
+    <p1510:client id="{80965980-7CDF-4379-9A6F-B1F09123E494}" v="1130" dt="2021-03-29T18:49:01.888"/>
   </p1510:revLst>
 </p1510:revInfo>
 </file>
@@ -170,12 +170,12 @@
   <pc:docChgLst>
     <pc:chgData name="Chen, Jeff" userId="9a3224f5-9893-4468-acd0-6d03119f890b" providerId="ADAL" clId="{80965980-7CDF-4379-9A6F-B1F09123E494}"/>
     <pc:docChg chg="undo custSel addSld delSld modSld">
-      <pc:chgData name="Chen, Jeff" userId="9a3224f5-9893-4468-acd0-6d03119f890b" providerId="ADAL" clId="{80965980-7CDF-4379-9A6F-B1F09123E494}" dt="2021-03-29T00:23:49.736" v="3646" actId="20577"/>
+      <pc:chgData name="Chen, Jeff" userId="9a3224f5-9893-4468-acd0-6d03119f890b" providerId="ADAL" clId="{80965980-7CDF-4379-9A6F-B1F09123E494}" dt="2021-03-29T18:47:30.852" v="6054"/>
       <pc:docMkLst>
         <pc:docMk/>
       </pc:docMkLst>
       <pc:sldChg chg="addSp delSp modSp mod modNotesTx">
-        <pc:chgData name="Chen, Jeff" userId="9a3224f5-9893-4468-acd0-6d03119f890b" providerId="ADAL" clId="{80965980-7CDF-4379-9A6F-B1F09123E494}" dt="2021-03-20T19:54:20.571" v="2563" actId="478"/>
+        <pc:chgData name="Chen, Jeff" userId="9a3224f5-9893-4468-acd0-6d03119f890b" providerId="ADAL" clId="{80965980-7CDF-4379-9A6F-B1F09123E494}" dt="2021-03-29T17:56:39.849" v="3743" actId="20577"/>
         <pc:sldMkLst>
           <pc:docMk/>
           <pc:sldMk cId="29733914" sldId="256"/>
@@ -197,7 +197,7 @@
         </pc:sldMkLst>
       </pc:sldChg>
       <pc:sldChg chg="delSp modSp mod modNotesTx">
-        <pc:chgData name="Chen, Jeff" userId="9a3224f5-9893-4468-acd0-6d03119f890b" providerId="ADAL" clId="{80965980-7CDF-4379-9A6F-B1F09123E494}" dt="2021-03-20T18:06:38.901" v="770" actId="1076"/>
+        <pc:chgData name="Chen, Jeff" userId="9a3224f5-9893-4468-acd0-6d03119f890b" providerId="ADAL" clId="{80965980-7CDF-4379-9A6F-B1F09123E494}" dt="2021-03-29T17:55:33.762" v="3742" actId="20577"/>
         <pc:sldMkLst>
           <pc:docMk/>
           <pc:sldMk cId="2757558888" sldId="258"/>
@@ -250,7 +250,7 @@
         </pc:spChg>
       </pc:sldChg>
       <pc:sldChg chg="modSp mod modNotesTx">
-        <pc:chgData name="Chen, Jeff" userId="9a3224f5-9893-4468-acd0-6d03119f890b" providerId="ADAL" clId="{80965980-7CDF-4379-9A6F-B1F09123E494}" dt="2021-03-28T17:49:50.658" v="3586" actId="20577"/>
+        <pc:chgData name="Chen, Jeff" userId="9a3224f5-9893-4468-acd0-6d03119f890b" providerId="ADAL" clId="{80965980-7CDF-4379-9A6F-B1F09123E494}" dt="2021-03-29T17:58:40.234" v="3873" actId="20577"/>
         <pc:sldMkLst>
           <pc:docMk/>
           <pc:sldMk cId="1853451456" sldId="261"/>
@@ -280,7 +280,7 @@
         </pc:spChg>
       </pc:sldChg>
       <pc:sldChg chg="modNotesTx">
-        <pc:chgData name="Chen, Jeff" userId="9a3224f5-9893-4468-acd0-6d03119f890b" providerId="ADAL" clId="{80965980-7CDF-4379-9A6F-B1F09123E494}" dt="2021-03-20T18:28:31.658" v="1550" actId="20577"/>
+        <pc:chgData name="Chen, Jeff" userId="9a3224f5-9893-4468-acd0-6d03119f890b" providerId="ADAL" clId="{80965980-7CDF-4379-9A6F-B1F09123E494}" dt="2021-03-29T17:59:35.318" v="3986" actId="20577"/>
         <pc:sldMkLst>
           <pc:docMk/>
           <pc:sldMk cId="1496410469" sldId="263"/>
@@ -308,10 +308,17 @@
         </pc:sldMkLst>
       </pc:sldChg>
       <pc:sldChg chg="modNotesTx">
-        <pc:chgData name="Chen, Jeff" userId="9a3224f5-9893-4468-acd0-6d03119f890b" providerId="ADAL" clId="{80965980-7CDF-4379-9A6F-B1F09123E494}" dt="2021-03-20T19:03:52.315" v="2445" actId="20577"/>
+        <pc:chgData name="Chen, Jeff" userId="9a3224f5-9893-4468-acd0-6d03119f890b" providerId="ADAL" clId="{80965980-7CDF-4379-9A6F-B1F09123E494}" dt="2021-03-29T18:01:55.727" v="4000" actId="20577"/>
         <pc:sldMkLst>
           <pc:docMk/>
           <pc:sldMk cId="770335875" sldId="267"/>
+        </pc:sldMkLst>
+      </pc:sldChg>
+      <pc:sldChg chg="modNotesTx">
+        <pc:chgData name="Chen, Jeff" userId="9a3224f5-9893-4468-acd0-6d03119f890b" providerId="ADAL" clId="{80965980-7CDF-4379-9A6F-B1F09123E494}" dt="2021-03-29T18:02:54.690" v="4074" actId="20577"/>
+        <pc:sldMkLst>
+          <pc:docMk/>
+          <pc:sldMk cId="845806760" sldId="268"/>
         </pc:sldMkLst>
       </pc:sldChg>
       <pc:sldChg chg="modSp mod">
@@ -329,8 +336,8 @@
           </ac:spMkLst>
         </pc:spChg>
       </pc:sldChg>
-      <pc:sldChg chg="addSp modSp mod setBg">
-        <pc:chgData name="Chen, Jeff" userId="9a3224f5-9893-4468-acd0-6d03119f890b" providerId="ADAL" clId="{80965980-7CDF-4379-9A6F-B1F09123E494}" dt="2021-03-09T18:18:22.418" v="60" actId="26606"/>
+      <pc:sldChg chg="addSp modSp mod setBg modNotesTx">
+        <pc:chgData name="Chen, Jeff" userId="9a3224f5-9893-4468-acd0-6d03119f890b" providerId="ADAL" clId="{80965980-7CDF-4379-9A6F-B1F09123E494}" dt="2021-03-29T18:04:26.465" v="4169" actId="20577"/>
         <pc:sldMkLst>
           <pc:docMk/>
           <pc:sldMk cId="1612242428" sldId="271"/>
@@ -421,8 +428,8 @@
           </ac:picMkLst>
         </pc:picChg>
       </pc:sldChg>
-      <pc:sldChg chg="addSp delSp modSp add mod">
-        <pc:chgData name="Chen, Jeff" userId="9a3224f5-9893-4468-acd0-6d03119f890b" providerId="ADAL" clId="{80965980-7CDF-4379-9A6F-B1F09123E494}" dt="2021-03-08T22:43:12.505" v="43" actId="1076"/>
+      <pc:sldChg chg="addSp delSp modSp add mod modNotesTx">
+        <pc:chgData name="Chen, Jeff" userId="9a3224f5-9893-4468-acd0-6d03119f890b" providerId="ADAL" clId="{80965980-7CDF-4379-9A6F-B1F09123E494}" dt="2021-03-29T18:02:45.921" v="4066" actId="20577"/>
         <pc:sldMkLst>
           <pc:docMk/>
           <pc:sldMk cId="2220551215" sldId="275"/>
@@ -452,8 +459,8 @@
           </ac:picMkLst>
         </pc:picChg>
       </pc:sldChg>
-      <pc:sldChg chg="addSp modSp new mod setBg">
-        <pc:chgData name="Chen, Jeff" userId="9a3224f5-9893-4468-acd0-6d03119f890b" providerId="ADAL" clId="{80965980-7CDF-4379-9A6F-B1F09123E494}" dt="2021-03-21T23:50:20.344" v="3392" actId="20577"/>
+      <pc:sldChg chg="addSp modSp new mod setBg modNotesTx">
+        <pc:chgData name="Chen, Jeff" userId="9a3224f5-9893-4468-acd0-6d03119f890b" providerId="ADAL" clId="{80965980-7CDF-4379-9A6F-B1F09123E494}" dt="2021-03-29T18:06:52.208" v="4367" actId="20577"/>
         <pc:sldMkLst>
           <pc:docMk/>
           <pc:sldMk cId="1594308202" sldId="276"/>
@@ -491,8 +498,8 @@
           </ac:picMkLst>
         </pc:picChg>
       </pc:sldChg>
-      <pc:sldChg chg="addSp delSp modSp new mod setBg">
-        <pc:chgData name="Chen, Jeff" userId="9a3224f5-9893-4468-acd0-6d03119f890b" providerId="ADAL" clId="{80965980-7CDF-4379-9A6F-B1F09123E494}" dt="2021-03-09T18:22:57.569" v="140" actId="478"/>
+      <pc:sldChg chg="addSp delSp modSp new mod setBg modNotesTx">
+        <pc:chgData name="Chen, Jeff" userId="9a3224f5-9893-4468-acd0-6d03119f890b" providerId="ADAL" clId="{80965980-7CDF-4379-9A6F-B1F09123E494}" dt="2021-03-29T18:07:41.633" v="4485" actId="20577"/>
         <pc:sldMkLst>
           <pc:docMk/>
           <pc:sldMk cId="955675857" sldId="277"/>
@@ -546,8 +553,8 @@
           </ac:picMkLst>
         </pc:picChg>
       </pc:sldChg>
-      <pc:sldChg chg="addSp modSp new mod setBg addCm modCm">
-        <pc:chgData name="Chen, Jeff" userId="9a3224f5-9893-4468-acd0-6d03119f890b" providerId="ADAL" clId="{80965980-7CDF-4379-9A6F-B1F09123E494}" dt="2021-03-09T18:25:33.935" v="221"/>
+      <pc:sldChg chg="addSp modSp new mod setBg addCm delCm modCm modNotesTx">
+        <pc:chgData name="Chen, Jeff" userId="9a3224f5-9893-4468-acd0-6d03119f890b" providerId="ADAL" clId="{80965980-7CDF-4379-9A6F-B1F09123E494}" dt="2021-03-29T18:08:20.305" v="4489" actId="1592"/>
         <pc:sldMkLst>
           <pc:docMk/>
           <pc:sldMk cId="1125068611" sldId="278"/>
@@ -656,8 +663,8 @@
           </ac:picMkLst>
         </pc:picChg>
       </pc:sldChg>
-      <pc:sldChg chg="addSp delSp modSp new mod setBg">
-        <pc:chgData name="Chen, Jeff" userId="9a3224f5-9893-4468-acd0-6d03119f890b" providerId="ADAL" clId="{80965980-7CDF-4379-9A6F-B1F09123E494}" dt="2021-03-20T19:57:01.427" v="2639" actId="478"/>
+      <pc:sldChg chg="addSp delSp modSp new mod setBg modNotesTx">
+        <pc:chgData name="Chen, Jeff" userId="9a3224f5-9893-4468-acd0-6d03119f890b" providerId="ADAL" clId="{80965980-7CDF-4379-9A6F-B1F09123E494}" dt="2021-03-29T18:21:55.787" v="5297" actId="20577"/>
         <pc:sldMkLst>
           <pc:docMk/>
           <pc:sldMk cId="3924658005" sldId="280"/>
@@ -837,8 +844,8 @@
           </ac:cxnSpMkLst>
         </pc:cxnChg>
       </pc:sldChg>
-      <pc:sldChg chg="addSp delSp modSp add mod">
-        <pc:chgData name="Chen, Jeff" userId="9a3224f5-9893-4468-acd0-6d03119f890b" providerId="ADAL" clId="{80965980-7CDF-4379-9A6F-B1F09123E494}" dt="2021-03-20T19:09:42.704" v="2454" actId="1076"/>
+      <pc:sldChg chg="addSp delSp modSp add del mod">
+        <pc:chgData name="Chen, Jeff" userId="9a3224f5-9893-4468-acd0-6d03119f890b" providerId="ADAL" clId="{80965980-7CDF-4379-9A6F-B1F09123E494}" dt="2021-03-29T18:08:09.545" v="4487" actId="2696"/>
         <pc:sldMkLst>
           <pc:docMk/>
           <pc:sldMk cId="713579245" sldId="283"/>
@@ -868,8 +875,8 @@
           </ac:picMkLst>
         </pc:picChg>
       </pc:sldChg>
-      <pc:sldChg chg="addSp delSp modSp add mod">
-        <pc:chgData name="Chen, Jeff" userId="9a3224f5-9893-4468-acd0-6d03119f890b" providerId="ADAL" clId="{80965980-7CDF-4379-9A6F-B1F09123E494}" dt="2021-03-20T19:57:41.759" v="2674" actId="1076"/>
+      <pc:sldChg chg="addSp delSp modSp add mod modNotesTx">
+        <pc:chgData name="Chen, Jeff" userId="9a3224f5-9893-4468-acd0-6d03119f890b" providerId="ADAL" clId="{80965980-7CDF-4379-9A6F-B1F09123E494}" dt="2021-03-29T18:19:19.459" v="5244" actId="20577"/>
         <pc:sldMkLst>
           <pc:docMk/>
           <pc:sldMk cId="698715463" sldId="284"/>
@@ -924,7 +931,7 @@
         </pc:picChg>
       </pc:sldChg>
       <pc:sldChg chg="addSp modSp new mod setBg modNotesTx">
-        <pc:chgData name="Chen, Jeff" userId="9a3224f5-9893-4468-acd0-6d03119f890b" providerId="ADAL" clId="{80965980-7CDF-4379-9A6F-B1F09123E494}" dt="2021-03-21T23:54:33.637" v="3554" actId="20577"/>
+        <pc:chgData name="Chen, Jeff" userId="9a3224f5-9893-4468-acd0-6d03119f890b" providerId="ADAL" clId="{80965980-7CDF-4379-9A6F-B1F09123E494}" dt="2021-03-29T18:24:52.904" v="5341" actId="20577"/>
         <pc:sldMkLst>
           <pc:docMk/>
           <pc:sldMk cId="1728493956" sldId="285"/>
@@ -1050,7 +1057,7 @@
         </pc:cxnChg>
       </pc:sldChg>
       <pc:sldChg chg="addSp delSp modSp new mod setBg modNotesTx">
-        <pc:chgData name="Chen, Jeff" userId="9a3224f5-9893-4468-acd0-6d03119f890b" providerId="ADAL" clId="{80965980-7CDF-4379-9A6F-B1F09123E494}" dt="2021-03-21T23:54:16.584" v="3526" actId="1076"/>
+        <pc:chgData name="Chen, Jeff" userId="9a3224f5-9893-4468-acd0-6d03119f890b" providerId="ADAL" clId="{80965980-7CDF-4379-9A6F-B1F09123E494}" dt="2021-03-29T18:36:21.026" v="5866" actId="20577"/>
         <pc:sldMkLst>
           <pc:docMk/>
           <pc:sldMk cId="1300920002" sldId="287"/>
@@ -1190,7 +1197,7 @@
         </pc:picChg>
       </pc:sldChg>
       <pc:sldChg chg="addSp delSp modSp add mod modNotesTx">
-        <pc:chgData name="Chen, Jeff" userId="9a3224f5-9893-4468-acd0-6d03119f890b" providerId="ADAL" clId="{80965980-7CDF-4379-9A6F-B1F09123E494}" dt="2021-03-21T23:53:29.394" v="3523" actId="5793"/>
+        <pc:chgData name="Chen, Jeff" userId="9a3224f5-9893-4468-acd0-6d03119f890b" providerId="ADAL" clId="{80965980-7CDF-4379-9A6F-B1F09123E494}" dt="2021-03-29T17:57:28.221" v="3849" actId="20577"/>
         <pc:sldMkLst>
           <pc:docMk/>
           <pc:sldMk cId="543444794" sldId="290"/>
@@ -1447,23 +1454,110 @@
           </ac:picMkLst>
         </pc:picChg>
       </pc:sldChg>
+      <pc:sldChg chg="modSp new del mod">
+        <pc:chgData name="Chen, Jeff" userId="9a3224f5-9893-4468-acd0-6d03119f890b" providerId="ADAL" clId="{80965980-7CDF-4379-9A6F-B1F09123E494}" dt="2021-03-29T18:25:42.935" v="5370" actId="2696"/>
+        <pc:sldMkLst>
+          <pc:docMk/>
+          <pc:sldMk cId="3663761084" sldId="293"/>
+        </pc:sldMkLst>
+        <pc:spChg chg="mod">
+          <ac:chgData name="Chen, Jeff" userId="9a3224f5-9893-4468-acd0-6d03119f890b" providerId="ADAL" clId="{80965980-7CDF-4379-9A6F-B1F09123E494}" dt="2021-03-29T18:25:36.660" v="5368" actId="20577"/>
+          <ac:spMkLst>
+            <pc:docMk/>
+            <pc:sldMk cId="3663761084" sldId="293"/>
+            <ac:spMk id="2" creationId="{356547D2-4772-4CD2-8A94-90B77B2F7FB8}"/>
+          </ac:spMkLst>
+        </pc:spChg>
+      </pc:sldChg>
+      <pc:sldChg chg="addSp delSp modSp add mod modNotesTx">
+        <pc:chgData name="Chen, Jeff" userId="9a3224f5-9893-4468-acd0-6d03119f890b" providerId="ADAL" clId="{80965980-7CDF-4379-9A6F-B1F09123E494}" dt="2021-03-29T18:47:30.852" v="6054"/>
+        <pc:sldMkLst>
+          <pc:docMk/>
+          <pc:sldMk cId="2943352970" sldId="294"/>
+        </pc:sldMkLst>
+        <pc:spChg chg="mod">
+          <ac:chgData name="Chen, Jeff" userId="9a3224f5-9893-4468-acd0-6d03119f890b" providerId="ADAL" clId="{80965980-7CDF-4379-9A6F-B1F09123E494}" dt="2021-03-29T18:25:56.368" v="5416" actId="20577"/>
+          <ac:spMkLst>
+            <pc:docMk/>
+            <pc:sldMk cId="2943352970" sldId="294"/>
+            <ac:spMk id="2" creationId="{E7665C4C-7593-4738-8F3D-0C7D6EB8C2F7}"/>
+          </ac:spMkLst>
+        </pc:spChg>
+        <pc:spChg chg="add mod">
+          <ac:chgData name="Chen, Jeff" userId="9a3224f5-9893-4468-acd0-6d03119f890b" providerId="ADAL" clId="{80965980-7CDF-4379-9A6F-B1F09123E494}" dt="2021-03-29T18:36:32.922" v="5868" actId="255"/>
+          <ac:spMkLst>
+            <pc:docMk/>
+            <pc:sldMk cId="2943352970" sldId="294"/>
+            <ac:spMk id="3" creationId="{400533D0-30BF-4BE0-87B9-3929A09BEC0C}"/>
+          </ac:spMkLst>
+        </pc:spChg>
+        <pc:picChg chg="del">
+          <ac:chgData name="Chen, Jeff" userId="9a3224f5-9893-4468-acd0-6d03119f890b" providerId="ADAL" clId="{80965980-7CDF-4379-9A6F-B1F09123E494}" dt="2021-03-29T18:25:58.331" v="5417" actId="478"/>
+          <ac:picMkLst>
+            <pc:docMk/>
+            <pc:sldMk cId="2943352970" sldId="294"/>
+            <ac:picMk id="4" creationId="{418D9299-54CF-4E1E-9D4B-B58FF7809355}"/>
+          </ac:picMkLst>
+        </pc:picChg>
+      </pc:sldChg>
+      <pc:sldChg chg="addSp delSp modSp new del mod setBg">
+        <pc:chgData name="Chen, Jeff" userId="9a3224f5-9893-4468-acd0-6d03119f890b" providerId="ADAL" clId="{80965980-7CDF-4379-9A6F-B1F09123E494}" dt="2021-03-29T18:35:21.775" v="5739" actId="680"/>
+        <pc:sldMkLst>
+          <pc:docMk/>
+          <pc:sldMk cId="700718416" sldId="295"/>
+        </pc:sldMkLst>
+        <pc:spChg chg="mod">
+          <ac:chgData name="Chen, Jeff" userId="9a3224f5-9893-4468-acd0-6d03119f890b" providerId="ADAL" clId="{80965980-7CDF-4379-9A6F-B1F09123E494}" dt="2021-03-29T18:35:20.190" v="5737" actId="26606"/>
+          <ac:spMkLst>
+            <pc:docMk/>
+            <pc:sldMk cId="700718416" sldId="295"/>
+            <ac:spMk id="2" creationId="{8CC10D23-E39A-4C65-B629-98034891A96B}"/>
+          </ac:spMkLst>
+        </pc:spChg>
+        <pc:spChg chg="add del">
+          <ac:chgData name="Chen, Jeff" userId="9a3224f5-9893-4468-acd0-6d03119f890b" providerId="ADAL" clId="{80965980-7CDF-4379-9A6F-B1F09123E494}" dt="2021-03-29T18:35:20.190" v="5737" actId="26606"/>
+          <ac:spMkLst>
+            <pc:docMk/>
+            <pc:sldMk cId="700718416" sldId="295"/>
+            <ac:spMk id="11" creationId="{7F57BEA8-497D-4AA8-8A18-BDCD696B25FE}"/>
+          </ac:spMkLst>
+        </pc:spChg>
+        <pc:picChg chg="add del mod">
+          <ac:chgData name="Chen, Jeff" userId="9a3224f5-9893-4468-acd0-6d03119f890b" providerId="ADAL" clId="{80965980-7CDF-4379-9A6F-B1F09123E494}" dt="2021-03-29T18:35:21.162" v="5738" actId="22"/>
+          <ac:picMkLst>
+            <pc:docMk/>
+            <pc:sldMk cId="700718416" sldId="295"/>
+            <ac:picMk id="4" creationId="{72AC78B9-6E26-4AE7-938A-5C9B10BC50C3}"/>
+          </ac:picMkLst>
+        </pc:picChg>
+        <pc:cxnChg chg="add del">
+          <ac:chgData name="Chen, Jeff" userId="9a3224f5-9893-4468-acd0-6d03119f890b" providerId="ADAL" clId="{80965980-7CDF-4379-9A6F-B1F09123E494}" dt="2021-03-29T18:35:20.190" v="5737" actId="26606"/>
+          <ac:cxnSpMkLst>
+            <pc:docMk/>
+            <pc:sldMk cId="700718416" sldId="295"/>
+            <ac:cxnSpMk id="9" creationId="{D2E961F1-4A28-4A5F-BBD4-6E400E5E6C75}"/>
+          </ac:cxnSpMkLst>
+        </pc:cxnChg>
+        <pc:cxnChg chg="add del">
+          <ac:chgData name="Chen, Jeff" userId="9a3224f5-9893-4468-acd0-6d03119f890b" providerId="ADAL" clId="{80965980-7CDF-4379-9A6F-B1F09123E494}" dt="2021-03-29T18:35:20.190" v="5737" actId="26606"/>
+          <ac:cxnSpMkLst>
+            <pc:docMk/>
+            <pc:sldMk cId="700718416" sldId="295"/>
+            <ac:cxnSpMk id="13" creationId="{A82415D3-DDE5-4D63-8CB3-23A5EC581B27}"/>
+          </ac:cxnSpMkLst>
+        </pc:cxnChg>
+        <pc:cxnChg chg="add del">
+          <ac:chgData name="Chen, Jeff" userId="9a3224f5-9893-4468-acd0-6d03119f890b" providerId="ADAL" clId="{80965980-7CDF-4379-9A6F-B1F09123E494}" dt="2021-03-29T18:35:20.190" v="5737" actId="26606"/>
+          <ac:cxnSpMkLst>
+            <pc:docMk/>
+            <pc:sldMk cId="700718416" sldId="295"/>
+            <ac:cxnSpMk id="15" creationId="{AD7193FB-6AE6-4B3B-8F89-56B55DD63B4D}"/>
+          </ac:cxnSpMkLst>
+        </pc:cxnChg>
+      </pc:sldChg>
     </pc:docChg>
   </pc:docChgLst>
 </pc:chgInfo>
-</file>
-
-<file path=ppt/comments/comment1.xml><?xml version="1.0" encoding="utf-8"?>
-<p:cmLst xmlns:a="http://schemas.openxmlformats.org/drawingml/2006/main" xmlns:r="http://schemas.openxmlformats.org/officeDocument/2006/relationships" xmlns:p="http://schemas.openxmlformats.org/presentationml/2006/main">
-  <p:cm authorId="1" dt="2021-03-09T13:25:20.796" idx="1">
-    <p:pos x="10" y="10"/>
-    <p:text>Stopped before Eigenvalues</p:text>
-    <p:extLst>
-      <p:ext uri="{C676402C-5697-4E1C-873F-D02D1690AC5C}">
-        <p15:threadingInfo xmlns:p15="http://schemas.microsoft.com/office/powerpoint/2012/main" timeZoneBias="300"/>
-      </p:ext>
-    </p:extLst>
-  </p:cm>
-</p:cmLst>
 </file>
 
 <file path=ppt/notesMasters/notesMaster1.xml><?xml version="1.0" encoding="utf-8"?>
@@ -1548,7 +1642,7 @@
           <a:p>
             <a:fld id="{9A3F3F89-75A5-4264-8D28-B8F9E037C0AE}" type="datetimeFigureOut">
               <a:rPr lang="en-US" smtClean="0"/>
-              <a:t>3/28/2021</a:t>
+              <a:t>3/29/2021</a:t>
             </a:fld>
             <a:endParaRPr lang="en-US"/>
           </a:p>
@@ -1936,13 +2030,6 @@
                   <a:t> B is invertible with inverse A. </a:t>
                 </a:r>
               </a:p>
-              <a:p>
-                <a:r>
-                  <a:rPr lang="en-US" baseline="0" dirty="0"/>
-                  <a:t>Listed another theorem </a:t>
-                </a:r>
-                <a:endParaRPr lang="en-US" dirty="0"/>
-              </a:p>
             </p:txBody>
           </p:sp>
         </mc:Choice>
@@ -2085,6 +2172,12 @@
             <a:r>
               <a:rPr lang="en-US" dirty="0"/>
               <a:t>Basically, how find the basis from a set of vectors. Look at the notes if you forgot how to find basis.</a:t>
+            </a:r>
+          </a:p>
+          <a:p>
+            <a:r>
+              <a:rPr lang="en-US" dirty="0"/>
+              <a:t>Note that you can row reduce the vectors; however, you must use the original vectors in your answer.</a:t>
             </a:r>
           </a:p>
         </p:txBody>
@@ -3208,7 +3301,10 @@
           <a:bodyPr/>
           <a:lstStyle/>
           <a:p>
-            <a:endParaRPr lang="en-US" dirty="0"/>
+            <a:r>
+              <a:rPr lang="en-US" dirty="0"/>
+              <a:t>Memorize this.</a:t>
+            </a:r>
           </a:p>
         </p:txBody>
       </p:sp>
@@ -3292,7 +3388,10 @@
           <a:bodyPr/>
           <a:lstStyle/>
           <a:p>
-            <a:endParaRPr lang="en-US" dirty="0"/>
+            <a:r>
+              <a:rPr lang="en-US" dirty="0"/>
+              <a:t>Null(A) is the subspace at which matrix Ax = 0.</a:t>
+            </a:r>
           </a:p>
         </p:txBody>
       </p:sp>
@@ -3378,7 +3477,7 @@
           <a:p>
             <a:r>
               <a:rPr lang="en-US" dirty="0"/>
-              <a:t>They say the same thing.</a:t>
+              <a:t>Memorize</a:t>
             </a:r>
           </a:p>
         </p:txBody>
@@ -3400,7 +3499,7 @@
           <a:p>
             <a:fld id="{B2AFC0E1-9A48-4B26-9FCC-0F0ED76BE088}" type="slidenum">
               <a:rPr lang="en-US" smtClean="0"/>
-              <a:t>26</a:t>
+              <a:t>16</a:t>
             </a:fld>
             <a:endParaRPr lang="en-US"/>
           </a:p>
@@ -3409,7 +3508,7 @@
     </p:spTree>
     <p:extLst>
       <p:ext uri="{BB962C8B-B14F-4D97-AF65-F5344CB8AC3E}">
-        <p14:creationId xmlns:p14="http://schemas.microsoft.com/office/powerpoint/2010/main" val="1045040207"/>
+        <p14:creationId xmlns:p14="http://schemas.microsoft.com/office/powerpoint/2010/main" val="3433906691"/>
       </p:ext>
     </p:extLst>
   </p:cSld>
@@ -3484,7 +3583,7 @@
           <a:p>
             <a:fld id="{B2AFC0E1-9A48-4B26-9FCC-0F0ED76BE088}" type="slidenum">
               <a:rPr lang="en-US" smtClean="0"/>
-              <a:t>27</a:t>
+              <a:t>17</a:t>
             </a:fld>
             <a:endParaRPr lang="en-US"/>
           </a:p>
@@ -3493,7 +3592,7 @@
     </p:spTree>
     <p:extLst>
       <p:ext uri="{BB962C8B-B14F-4D97-AF65-F5344CB8AC3E}">
-        <p14:creationId xmlns:p14="http://schemas.microsoft.com/office/powerpoint/2010/main" val="822385432"/>
+        <p14:creationId xmlns:p14="http://schemas.microsoft.com/office/powerpoint/2010/main" val="441805558"/>
       </p:ext>
     </p:extLst>
   </p:cSld>
@@ -3547,12 +3646,6 @@
           <a:bodyPr/>
           <a:lstStyle/>
           <a:p>
-            <a:r>
-              <a:rPr lang="en-US" dirty="0"/>
-              <a:t>Remember that nullity(A) = 0 means only the zero vectors makes the homogenous linear system Ax = b = 0.  According to the FTOIM, homogenous linear systems can only have the trivial solution x = 0; therefore, nullity must be zero.</a:t>
-            </a:r>
-          </a:p>
-          <a:p>
             <a:endParaRPr lang="en-US" dirty="0"/>
           </a:p>
         </p:txBody>
@@ -3574,7 +3667,7 @@
           <a:p>
             <a:fld id="{B2AFC0E1-9A48-4B26-9FCC-0F0ED76BE088}" type="slidenum">
               <a:rPr lang="en-US" smtClean="0"/>
-              <a:t>28</a:t>
+              <a:t>18</a:t>
             </a:fld>
             <a:endParaRPr lang="en-US"/>
           </a:p>
@@ -3583,7 +3676,7 @@
     </p:spTree>
     <p:extLst>
       <p:ext uri="{BB962C8B-B14F-4D97-AF65-F5344CB8AC3E}">
-        <p14:creationId xmlns:p14="http://schemas.microsoft.com/office/powerpoint/2010/main" val="1036935033"/>
+        <p14:creationId xmlns:p14="http://schemas.microsoft.com/office/powerpoint/2010/main" val="250395584"/>
       </p:ext>
     </p:extLst>
   </p:cSld>
@@ -3637,10 +3730,10 @@
           <a:bodyPr/>
           <a:lstStyle/>
           <a:p>
-            <a:r>
-              <a:rPr lang="en-US" dirty="0"/>
-              <a:t>Solving the determinant for lambda to find the eigenvalues of matrix A.</a:t>
-            </a:r>
+            <a:endParaRPr lang="en-US" dirty="0"/>
+          </a:p>
+          <a:p>
+            <a:endParaRPr lang="en-US" dirty="0"/>
           </a:p>
         </p:txBody>
       </p:sp>
@@ -3661,7 +3754,7 @@
           <a:p>
             <a:fld id="{B2AFC0E1-9A48-4B26-9FCC-0F0ED76BE088}" type="slidenum">
               <a:rPr lang="en-US" smtClean="0"/>
-              <a:t>29</a:t>
+              <a:t>19</a:t>
             </a:fld>
             <a:endParaRPr lang="en-US"/>
           </a:p>
@@ -3670,7 +3763,7 @@
     </p:spTree>
     <p:extLst>
       <p:ext uri="{BB962C8B-B14F-4D97-AF65-F5344CB8AC3E}">
-        <p14:creationId xmlns:p14="http://schemas.microsoft.com/office/powerpoint/2010/main" val="674072280"/>
+        <p14:creationId xmlns:p14="http://schemas.microsoft.com/office/powerpoint/2010/main" val="3526441860"/>
       </p:ext>
     </p:extLst>
   </p:cSld>
@@ -3758,6 +3851,1344 @@
     <p:extLst>
       <p:ext uri="{BB962C8B-B14F-4D97-AF65-F5344CB8AC3E}">
         <p14:creationId xmlns:p14="http://schemas.microsoft.com/office/powerpoint/2010/main" val="2431700241"/>
+      </p:ext>
+    </p:extLst>
+  </p:cSld>
+  <p:clrMapOvr>
+    <a:masterClrMapping/>
+  </p:clrMapOvr>
+</p:notes>
+</file>
+
+<file path=ppt/notesSlides/notesSlide20.xml><?xml version="1.0" encoding="utf-8"?>
+<p:notes xmlns:a="http://schemas.openxmlformats.org/drawingml/2006/main" xmlns:r="http://schemas.openxmlformats.org/officeDocument/2006/relationships" xmlns:p="http://schemas.openxmlformats.org/presentationml/2006/main">
+  <p:cSld>
+    <p:spTree>
+      <p:nvGrpSpPr>
+        <p:cNvPr id="1" name=""/>
+        <p:cNvGrpSpPr/>
+        <p:nvPr/>
+      </p:nvGrpSpPr>
+      <p:grpSpPr>
+        <a:xfrm>
+          <a:off x="0" y="0"/>
+          <a:ext cx="0" cy="0"/>
+          <a:chOff x="0" y="0"/>
+          <a:chExt cx="0" cy="0"/>
+        </a:xfrm>
+      </p:grpSpPr>
+      <p:sp>
+        <p:nvSpPr>
+          <p:cNvPr id="2" name="Slide Image Placeholder 1"/>
+          <p:cNvSpPr>
+            <a:spLocks noGrp="1" noRot="1" noChangeAspect="1"/>
+          </p:cNvSpPr>
+          <p:nvPr>
+            <p:ph type="sldImg"/>
+          </p:nvPr>
+        </p:nvSpPr>
+        <p:spPr/>
+      </p:sp>
+      <p:sp>
+        <p:nvSpPr>
+          <p:cNvPr id="3" name="Notes Placeholder 2"/>
+          <p:cNvSpPr>
+            <a:spLocks noGrp="1"/>
+          </p:cNvSpPr>
+          <p:nvPr>
+            <p:ph type="body" idx="1"/>
+          </p:nvPr>
+        </p:nvSpPr>
+        <p:spPr/>
+        <p:txBody>
+          <a:bodyPr/>
+          <a:lstStyle/>
+          <a:p>
+            <a:r>
+              <a:rPr lang="en-US" dirty="0"/>
+              <a:t>Think about multiplying matrices: Matrix 2x5 multiplying matrix 5x8 = Matrix size 2x8. In this case, you start off with T and multiply it by S to get Rm to Rp. </a:t>
+            </a:r>
+          </a:p>
+        </p:txBody>
+      </p:sp>
+      <p:sp>
+        <p:nvSpPr>
+          <p:cNvPr id="4" name="Slide Number Placeholder 3"/>
+          <p:cNvSpPr>
+            <a:spLocks noGrp="1"/>
+          </p:cNvSpPr>
+          <p:nvPr>
+            <p:ph type="sldNum" sz="quarter" idx="5"/>
+          </p:nvPr>
+        </p:nvSpPr>
+        <p:spPr/>
+        <p:txBody>
+          <a:bodyPr/>
+          <a:lstStyle/>
+          <a:p>
+            <a:fld id="{B2AFC0E1-9A48-4B26-9FCC-0F0ED76BE088}" type="slidenum">
+              <a:rPr lang="en-US" smtClean="0"/>
+              <a:t>20</a:t>
+            </a:fld>
+            <a:endParaRPr lang="en-US"/>
+          </a:p>
+        </p:txBody>
+      </p:sp>
+    </p:spTree>
+    <p:extLst>
+      <p:ext uri="{BB962C8B-B14F-4D97-AF65-F5344CB8AC3E}">
+        <p14:creationId xmlns:p14="http://schemas.microsoft.com/office/powerpoint/2010/main" val="1732126292"/>
+      </p:ext>
+    </p:extLst>
+  </p:cSld>
+  <p:clrMapOvr>
+    <a:masterClrMapping/>
+  </p:clrMapOvr>
+</p:notes>
+</file>
+
+<file path=ppt/notesSlides/notesSlide21.xml><?xml version="1.0" encoding="utf-8"?>
+<p:notes xmlns:a="http://schemas.openxmlformats.org/drawingml/2006/main" xmlns:r="http://schemas.openxmlformats.org/officeDocument/2006/relationships" xmlns:p="http://schemas.openxmlformats.org/presentationml/2006/main">
+  <p:cSld>
+    <p:spTree>
+      <p:nvGrpSpPr>
+        <p:cNvPr id="1" name=""/>
+        <p:cNvGrpSpPr/>
+        <p:nvPr/>
+      </p:nvGrpSpPr>
+      <p:grpSpPr>
+        <a:xfrm>
+          <a:off x="0" y="0"/>
+          <a:ext cx="0" cy="0"/>
+          <a:chOff x="0" y="0"/>
+          <a:chExt cx="0" cy="0"/>
+        </a:xfrm>
+      </p:grpSpPr>
+      <p:sp>
+        <p:nvSpPr>
+          <p:cNvPr id="2" name="Slide Image Placeholder 1"/>
+          <p:cNvSpPr>
+            <a:spLocks noGrp="1" noRot="1" noChangeAspect="1"/>
+          </p:cNvSpPr>
+          <p:nvPr>
+            <p:ph type="sldImg"/>
+          </p:nvPr>
+        </p:nvSpPr>
+        <p:spPr/>
+      </p:sp>
+      <p:sp>
+        <p:nvSpPr>
+          <p:cNvPr id="3" name="Notes Placeholder 2"/>
+          <p:cNvSpPr>
+            <a:spLocks noGrp="1"/>
+          </p:cNvSpPr>
+          <p:nvPr>
+            <p:ph type="body" idx="1"/>
+          </p:nvPr>
+        </p:nvSpPr>
+        <p:spPr/>
+        <p:txBody>
+          <a:bodyPr/>
+          <a:lstStyle/>
+          <a:p>
+            <a:r>
+              <a:rPr lang="en-US" dirty="0"/>
+              <a:t>This theorem is included on slide 5: Other invertible properties.</a:t>
+            </a:r>
+          </a:p>
+        </p:txBody>
+      </p:sp>
+      <p:sp>
+        <p:nvSpPr>
+          <p:cNvPr id="4" name="Slide Number Placeholder 3"/>
+          <p:cNvSpPr>
+            <a:spLocks noGrp="1"/>
+          </p:cNvSpPr>
+          <p:nvPr>
+            <p:ph type="sldNum" sz="quarter" idx="5"/>
+          </p:nvPr>
+        </p:nvSpPr>
+        <p:spPr/>
+        <p:txBody>
+          <a:bodyPr/>
+          <a:lstStyle/>
+          <a:p>
+            <a:fld id="{B2AFC0E1-9A48-4B26-9FCC-0F0ED76BE088}" type="slidenum">
+              <a:rPr lang="en-US" smtClean="0"/>
+              <a:t>21</a:t>
+            </a:fld>
+            <a:endParaRPr lang="en-US"/>
+          </a:p>
+        </p:txBody>
+      </p:sp>
+    </p:spTree>
+    <p:extLst>
+      <p:ext uri="{BB962C8B-B14F-4D97-AF65-F5344CB8AC3E}">
+        <p14:creationId xmlns:p14="http://schemas.microsoft.com/office/powerpoint/2010/main" val="1619664657"/>
+      </p:ext>
+    </p:extLst>
+  </p:cSld>
+  <p:clrMapOvr>
+    <a:masterClrMapping/>
+  </p:clrMapOvr>
+</p:notes>
+</file>
+
+<file path=ppt/notesSlides/notesSlide22.xml><?xml version="1.0" encoding="utf-8"?>
+<p:notes xmlns:a="http://schemas.openxmlformats.org/drawingml/2006/main" xmlns:r="http://schemas.openxmlformats.org/officeDocument/2006/relationships" xmlns:p="http://schemas.openxmlformats.org/presentationml/2006/main">
+  <p:cSld>
+    <p:spTree>
+      <p:nvGrpSpPr>
+        <p:cNvPr id="1" name=""/>
+        <p:cNvGrpSpPr/>
+        <p:nvPr/>
+      </p:nvGrpSpPr>
+      <p:grpSpPr>
+        <a:xfrm>
+          <a:off x="0" y="0"/>
+          <a:ext cx="0" cy="0"/>
+          <a:chOff x="0" y="0"/>
+          <a:chExt cx="0" cy="0"/>
+        </a:xfrm>
+      </p:grpSpPr>
+      <p:sp>
+        <p:nvSpPr>
+          <p:cNvPr id="2" name="Slide Image Placeholder 1"/>
+          <p:cNvSpPr>
+            <a:spLocks noGrp="1" noRot="1" noChangeAspect="1"/>
+          </p:cNvSpPr>
+          <p:nvPr>
+            <p:ph type="sldImg"/>
+          </p:nvPr>
+        </p:nvSpPr>
+        <p:spPr/>
+      </p:sp>
+      <p:sp>
+        <p:nvSpPr>
+          <p:cNvPr id="3" name="Notes Placeholder 2"/>
+          <p:cNvSpPr>
+            <a:spLocks noGrp="1"/>
+          </p:cNvSpPr>
+          <p:nvPr>
+            <p:ph type="body" idx="1"/>
+          </p:nvPr>
+        </p:nvSpPr>
+        <p:spPr/>
+        <p:txBody>
+          <a:bodyPr/>
+          <a:lstStyle/>
+          <a:p>
+            <a:pPr marL="0" marR="0" lvl="0" indent="0" algn="l" defTabSz="914400" rtl="0" eaLnBrk="1" fontAlgn="auto" latinLnBrk="0" hangingPunct="1">
+              <a:lnSpc>
+                <a:spcPct val="100000"/>
+              </a:lnSpc>
+              <a:spcBef>
+                <a:spcPts val="0"/>
+              </a:spcBef>
+              <a:spcAft>
+                <a:spcPts val="0"/>
+              </a:spcAft>
+              <a:buClrTx/>
+              <a:buSzTx/>
+              <a:buFontTx/>
+              <a:buNone/>
+              <a:tabLst/>
+              <a:defRPr/>
+            </a:pPr>
+            <a:r>
+              <a:rPr lang="en-US" dirty="0"/>
+              <a:t>This theorem is included on slide 5: Other invertible properties. </a:t>
+            </a:r>
+          </a:p>
+          <a:p>
+            <a:endParaRPr lang="en-US" dirty="0"/>
+          </a:p>
+        </p:txBody>
+      </p:sp>
+      <p:sp>
+        <p:nvSpPr>
+          <p:cNvPr id="4" name="Slide Number Placeholder 3"/>
+          <p:cNvSpPr>
+            <a:spLocks noGrp="1"/>
+          </p:cNvSpPr>
+          <p:nvPr>
+            <p:ph type="sldNum" sz="quarter" idx="5"/>
+          </p:nvPr>
+        </p:nvSpPr>
+        <p:spPr/>
+        <p:txBody>
+          <a:bodyPr/>
+          <a:lstStyle/>
+          <a:p>
+            <a:fld id="{B2AFC0E1-9A48-4B26-9FCC-0F0ED76BE088}" type="slidenum">
+              <a:rPr lang="en-US" smtClean="0"/>
+              <a:t>22</a:t>
+            </a:fld>
+            <a:endParaRPr lang="en-US"/>
+          </a:p>
+        </p:txBody>
+      </p:sp>
+    </p:spTree>
+    <p:extLst>
+      <p:ext uri="{BB962C8B-B14F-4D97-AF65-F5344CB8AC3E}">
+        <p14:creationId xmlns:p14="http://schemas.microsoft.com/office/powerpoint/2010/main" val="1183622710"/>
+      </p:ext>
+    </p:extLst>
+  </p:cSld>
+  <p:clrMapOvr>
+    <a:masterClrMapping/>
+  </p:clrMapOvr>
+</p:notes>
+</file>
+
+<file path=ppt/notesSlides/notesSlide23.xml><?xml version="1.0" encoding="utf-8"?>
+<p:notes xmlns:a="http://schemas.openxmlformats.org/drawingml/2006/main" xmlns:r="http://schemas.openxmlformats.org/officeDocument/2006/relationships" xmlns:p="http://schemas.openxmlformats.org/presentationml/2006/main">
+  <p:cSld>
+    <p:spTree>
+      <p:nvGrpSpPr>
+        <p:cNvPr id="1" name=""/>
+        <p:cNvGrpSpPr/>
+        <p:nvPr/>
+      </p:nvGrpSpPr>
+      <p:grpSpPr>
+        <a:xfrm>
+          <a:off x="0" y="0"/>
+          <a:ext cx="0" cy="0"/>
+          <a:chOff x="0" y="0"/>
+          <a:chExt cx="0" cy="0"/>
+        </a:xfrm>
+      </p:grpSpPr>
+      <p:sp>
+        <p:nvSpPr>
+          <p:cNvPr id="2" name="Slide Image Placeholder 1"/>
+          <p:cNvSpPr>
+            <a:spLocks noGrp="1" noRot="1" noChangeAspect="1"/>
+          </p:cNvSpPr>
+          <p:nvPr>
+            <p:ph type="sldImg"/>
+          </p:nvPr>
+        </p:nvSpPr>
+        <p:spPr/>
+      </p:sp>
+      <p:sp>
+        <p:nvSpPr>
+          <p:cNvPr id="3" name="Notes Placeholder 2"/>
+          <p:cNvSpPr>
+            <a:spLocks noGrp="1"/>
+          </p:cNvSpPr>
+          <p:nvPr>
+            <p:ph type="body" idx="1"/>
+          </p:nvPr>
+        </p:nvSpPr>
+        <p:spPr/>
+        <p:txBody>
+          <a:bodyPr/>
+          <a:lstStyle/>
+          <a:p>
+            <a:r>
+              <a:rPr lang="en-US" dirty="0"/>
+              <a:t>For instance, if I wanted to see the probability of raining on Wednesday while it is sunny today (Sunny is S1 and Rainy is S2), I would calculate (P</a:t>
+            </a:r>
+            <a:r>
+              <a:rPr lang="en-US" baseline="30000" dirty="0"/>
+              <a:t>2</a:t>
+            </a:r>
+            <a:r>
+              <a:rPr lang="en-US" baseline="0" dirty="0"/>
+              <a:t>)</a:t>
+            </a:r>
+            <a:r>
+              <a:rPr lang="en-US" baseline="-25000" dirty="0"/>
+              <a:t>21, </a:t>
+            </a:r>
+            <a:r>
+              <a:rPr lang="en-US" baseline="0" dirty="0"/>
+              <a:t>note that the power 2 means in 2 steps or days and from matrix, column 1, row 2. I lose points somehow (reason was wrong) using this method on the homework so you can try P</a:t>
+            </a:r>
+            <a:r>
+              <a:rPr lang="en-US" baseline="30000" dirty="0"/>
+              <a:t>2</a:t>
+            </a:r>
+            <a:r>
+              <a:rPr lang="en-US" baseline="0" dirty="0"/>
+              <a:t>x</a:t>
+            </a:r>
+            <a:r>
+              <a:rPr lang="en-US" baseline="-25000" dirty="0"/>
+              <a:t>0 </a:t>
+            </a:r>
+            <a:r>
+              <a:rPr lang="en-US" baseline="0" dirty="0"/>
+              <a:t>where x</a:t>
+            </a:r>
+            <a:r>
+              <a:rPr lang="en-US" baseline="-25000" dirty="0"/>
+              <a:t>0</a:t>
+            </a:r>
+            <a:r>
+              <a:rPr lang="en-US" baseline="0" dirty="0"/>
+              <a:t> is the initial state vector when it is sunny. Got the same answer either way. You can also do x</a:t>
+            </a:r>
+            <a:r>
+              <a:rPr lang="en-US" baseline="-25000" dirty="0"/>
+              <a:t>n+1</a:t>
+            </a:r>
+            <a:r>
+              <a:rPr lang="en-US" baseline="0" dirty="0"/>
+              <a:t>=</a:t>
+            </a:r>
+            <a:r>
+              <a:rPr lang="en-US" baseline="0" dirty="0" err="1"/>
+              <a:t>Px</a:t>
+            </a:r>
+            <a:r>
+              <a:rPr lang="en-US" baseline="-25000" dirty="0" err="1"/>
+              <a:t>n</a:t>
+            </a:r>
+            <a:r>
+              <a:rPr lang="en-US" baseline="0" dirty="0"/>
+              <a:t> to move one step at a time. </a:t>
+            </a:r>
+            <a:endParaRPr lang="en-US" dirty="0"/>
+          </a:p>
+        </p:txBody>
+      </p:sp>
+      <p:sp>
+        <p:nvSpPr>
+          <p:cNvPr id="4" name="Slide Number Placeholder 3"/>
+          <p:cNvSpPr>
+            <a:spLocks noGrp="1"/>
+          </p:cNvSpPr>
+          <p:nvPr>
+            <p:ph type="sldNum" sz="quarter" idx="5"/>
+          </p:nvPr>
+        </p:nvSpPr>
+        <p:spPr/>
+        <p:txBody>
+          <a:bodyPr/>
+          <a:lstStyle/>
+          <a:p>
+            <a:fld id="{B2AFC0E1-9A48-4B26-9FCC-0F0ED76BE088}" type="slidenum">
+              <a:rPr lang="en-US" smtClean="0"/>
+              <a:t>23</a:t>
+            </a:fld>
+            <a:endParaRPr lang="en-US"/>
+          </a:p>
+        </p:txBody>
+      </p:sp>
+    </p:spTree>
+    <p:extLst>
+      <p:ext uri="{BB962C8B-B14F-4D97-AF65-F5344CB8AC3E}">
+        <p14:creationId xmlns:p14="http://schemas.microsoft.com/office/powerpoint/2010/main" val="341614521"/>
+      </p:ext>
+    </p:extLst>
+  </p:cSld>
+  <p:clrMapOvr>
+    <a:masterClrMapping/>
+  </p:clrMapOvr>
+</p:notes>
+</file>
+
+<file path=ppt/notesSlides/notesSlide24.xml><?xml version="1.0" encoding="utf-8"?>
+<p:notes xmlns:a="http://schemas.openxmlformats.org/drawingml/2006/main" xmlns:r="http://schemas.openxmlformats.org/officeDocument/2006/relationships" xmlns:p="http://schemas.openxmlformats.org/presentationml/2006/main">
+  <p:cSld>
+    <p:spTree>
+      <p:nvGrpSpPr>
+        <p:cNvPr id="1" name=""/>
+        <p:cNvGrpSpPr/>
+        <p:nvPr/>
+      </p:nvGrpSpPr>
+      <p:grpSpPr>
+        <a:xfrm>
+          <a:off x="0" y="0"/>
+          <a:ext cx="0" cy="0"/>
+          <a:chOff x="0" y="0"/>
+          <a:chExt cx="0" cy="0"/>
+        </a:xfrm>
+      </p:grpSpPr>
+      <p:sp>
+        <p:nvSpPr>
+          <p:cNvPr id="2" name="Slide Image Placeholder 1"/>
+          <p:cNvSpPr>
+            <a:spLocks noGrp="1" noRot="1" noChangeAspect="1"/>
+          </p:cNvSpPr>
+          <p:nvPr>
+            <p:ph type="sldImg"/>
+          </p:nvPr>
+        </p:nvSpPr>
+        <p:spPr/>
+      </p:sp>
+      <p:sp>
+        <p:nvSpPr>
+          <p:cNvPr id="3" name="Notes Placeholder 2"/>
+          <p:cNvSpPr>
+            <a:spLocks noGrp="1"/>
+          </p:cNvSpPr>
+          <p:nvPr>
+            <p:ph type="body" idx="1"/>
+          </p:nvPr>
+        </p:nvSpPr>
+        <p:spPr/>
+        <p:txBody>
+          <a:bodyPr/>
+          <a:lstStyle/>
+          <a:p>
+            <a:r>
+              <a:rPr lang="en-US" dirty="0"/>
+              <a:t>Null(P-I</a:t>
+            </a:r>
+            <a:r>
+              <a:rPr lang="en-US" baseline="-25000" dirty="0"/>
+              <a:t>n</a:t>
+            </a:r>
+            <a:r>
+              <a:rPr lang="en-US" dirty="0"/>
+              <a:t>) then solve the resulting x</a:t>
+            </a:r>
+            <a:r>
+              <a:rPr lang="en-US" baseline="-25000" dirty="0"/>
+              <a:t>1</a:t>
+            </a:r>
+            <a:r>
+              <a:rPr lang="en-US" baseline="0" dirty="0"/>
+              <a:t>…</a:t>
+            </a:r>
+            <a:r>
+              <a:rPr lang="en-US" baseline="0" dirty="0" err="1"/>
+              <a:t>x</a:t>
+            </a:r>
+            <a:r>
+              <a:rPr lang="en-US" baseline="-25000" dirty="0" err="1"/>
+              <a:t>n</a:t>
+            </a:r>
+            <a:r>
+              <a:rPr lang="en-US" baseline="0" dirty="0"/>
+              <a:t> for t (for instance, x</a:t>
+            </a:r>
+            <a:r>
+              <a:rPr lang="en-US" baseline="-25000" dirty="0"/>
+              <a:t>1</a:t>
+            </a:r>
+            <a:r>
+              <a:rPr lang="en-US" baseline="0" dirty="0"/>
+              <a:t>+x</a:t>
+            </a:r>
+            <a:r>
+              <a:rPr lang="en-US" baseline="-25000" dirty="0"/>
+              <a:t>2</a:t>
+            </a:r>
+            <a:r>
+              <a:rPr lang="en-US" baseline="0" dirty="0"/>
+              <a:t>+x</a:t>
+            </a:r>
+            <a:r>
+              <a:rPr lang="en-US" baseline="-25000" dirty="0"/>
+              <a:t>3</a:t>
+            </a:r>
+            <a:r>
+              <a:rPr lang="en-US" baseline="0" dirty="0"/>
+              <a:t>=1) to get the steady state probability vector. Your vector must add up to one.</a:t>
+            </a:r>
+          </a:p>
+          <a:p>
+            <a:endParaRPr lang="en-US" dirty="0"/>
+          </a:p>
+        </p:txBody>
+      </p:sp>
+      <p:sp>
+        <p:nvSpPr>
+          <p:cNvPr id="4" name="Slide Number Placeholder 3"/>
+          <p:cNvSpPr>
+            <a:spLocks noGrp="1"/>
+          </p:cNvSpPr>
+          <p:nvPr>
+            <p:ph type="sldNum" sz="quarter" idx="5"/>
+          </p:nvPr>
+        </p:nvSpPr>
+        <p:spPr/>
+        <p:txBody>
+          <a:bodyPr/>
+          <a:lstStyle/>
+          <a:p>
+            <a:fld id="{B2AFC0E1-9A48-4B26-9FCC-0F0ED76BE088}" type="slidenum">
+              <a:rPr lang="en-US" smtClean="0"/>
+              <a:t>24</a:t>
+            </a:fld>
+            <a:endParaRPr lang="en-US"/>
+          </a:p>
+        </p:txBody>
+      </p:sp>
+    </p:spTree>
+    <p:extLst>
+      <p:ext uri="{BB962C8B-B14F-4D97-AF65-F5344CB8AC3E}">
+        <p14:creationId xmlns:p14="http://schemas.microsoft.com/office/powerpoint/2010/main" val="3144259643"/>
+      </p:ext>
+    </p:extLst>
+  </p:cSld>
+  <p:clrMapOvr>
+    <a:masterClrMapping/>
+  </p:clrMapOvr>
+</p:notes>
+</file>
+
+<file path=ppt/notesSlides/notesSlide25.xml><?xml version="1.0" encoding="utf-8"?>
+<p:notes xmlns:a="http://schemas.openxmlformats.org/drawingml/2006/main" xmlns:r="http://schemas.openxmlformats.org/officeDocument/2006/relationships" xmlns:p="http://schemas.openxmlformats.org/presentationml/2006/main">
+  <p:cSld>
+    <p:spTree>
+      <p:nvGrpSpPr>
+        <p:cNvPr id="1" name=""/>
+        <p:cNvGrpSpPr/>
+        <p:nvPr/>
+      </p:nvGrpSpPr>
+      <p:grpSpPr>
+        <a:xfrm>
+          <a:off x="0" y="0"/>
+          <a:ext cx="0" cy="0"/>
+          <a:chOff x="0" y="0"/>
+          <a:chExt cx="0" cy="0"/>
+        </a:xfrm>
+      </p:grpSpPr>
+      <p:sp>
+        <p:nvSpPr>
+          <p:cNvPr id="2" name="Slide Image Placeholder 1"/>
+          <p:cNvSpPr>
+            <a:spLocks noGrp="1" noRot="1" noChangeAspect="1"/>
+          </p:cNvSpPr>
+          <p:nvPr>
+            <p:ph type="sldImg"/>
+          </p:nvPr>
+        </p:nvSpPr>
+        <p:spPr/>
+      </p:sp>
+      <p:sp>
+        <p:nvSpPr>
+          <p:cNvPr id="3" name="Notes Placeholder 2"/>
+          <p:cNvSpPr>
+            <a:spLocks noGrp="1"/>
+          </p:cNvSpPr>
+          <p:nvPr>
+            <p:ph type="body" idx="1"/>
+          </p:nvPr>
+        </p:nvSpPr>
+        <p:spPr/>
+        <p:txBody>
+          <a:bodyPr/>
+          <a:lstStyle/>
+          <a:p>
+            <a:r>
+              <a:rPr lang="en-US" dirty="0"/>
+              <a:t>This theorem is included on slide 5: Other invertible properties. They both mean the same thing.</a:t>
+            </a:r>
+          </a:p>
+        </p:txBody>
+      </p:sp>
+      <p:sp>
+        <p:nvSpPr>
+          <p:cNvPr id="4" name="Slide Number Placeholder 3"/>
+          <p:cNvSpPr>
+            <a:spLocks noGrp="1"/>
+          </p:cNvSpPr>
+          <p:nvPr>
+            <p:ph type="sldNum" sz="quarter" idx="5"/>
+          </p:nvPr>
+        </p:nvSpPr>
+        <p:spPr/>
+        <p:txBody>
+          <a:bodyPr/>
+          <a:lstStyle/>
+          <a:p>
+            <a:fld id="{B2AFC0E1-9A48-4B26-9FCC-0F0ED76BE088}" type="slidenum">
+              <a:rPr lang="en-US" smtClean="0"/>
+              <a:t>25</a:t>
+            </a:fld>
+            <a:endParaRPr lang="en-US"/>
+          </a:p>
+        </p:txBody>
+      </p:sp>
+    </p:spTree>
+    <p:extLst>
+      <p:ext uri="{BB962C8B-B14F-4D97-AF65-F5344CB8AC3E}">
+        <p14:creationId xmlns:p14="http://schemas.microsoft.com/office/powerpoint/2010/main" val="1045040207"/>
+      </p:ext>
+    </p:extLst>
+  </p:cSld>
+  <p:clrMapOvr>
+    <a:masterClrMapping/>
+  </p:clrMapOvr>
+</p:notes>
+</file>
+
+<file path=ppt/notesSlides/notesSlide26.xml><?xml version="1.0" encoding="utf-8"?>
+<p:notes xmlns:a="http://schemas.openxmlformats.org/drawingml/2006/main" xmlns:r="http://schemas.openxmlformats.org/officeDocument/2006/relationships" xmlns:p="http://schemas.openxmlformats.org/presentationml/2006/main">
+  <p:cSld>
+    <p:spTree>
+      <p:nvGrpSpPr>
+        <p:cNvPr id="1" name=""/>
+        <p:cNvGrpSpPr/>
+        <p:nvPr/>
+      </p:nvGrpSpPr>
+      <p:grpSpPr>
+        <a:xfrm>
+          <a:off x="0" y="0"/>
+          <a:ext cx="0" cy="0"/>
+          <a:chOff x="0" y="0"/>
+          <a:chExt cx="0" cy="0"/>
+        </a:xfrm>
+      </p:grpSpPr>
+      <p:sp>
+        <p:nvSpPr>
+          <p:cNvPr id="2" name="Slide Image Placeholder 1"/>
+          <p:cNvSpPr>
+            <a:spLocks noGrp="1" noRot="1" noChangeAspect="1"/>
+          </p:cNvSpPr>
+          <p:nvPr>
+            <p:ph type="sldImg"/>
+          </p:nvPr>
+        </p:nvSpPr>
+        <p:spPr/>
+      </p:sp>
+      <p:sp>
+        <p:nvSpPr>
+          <p:cNvPr id="3" name="Notes Placeholder 2"/>
+          <p:cNvSpPr>
+            <a:spLocks noGrp="1"/>
+          </p:cNvSpPr>
+          <p:nvPr>
+            <p:ph type="body" idx="1"/>
+          </p:nvPr>
+        </p:nvSpPr>
+        <p:spPr/>
+        <p:txBody>
+          <a:bodyPr/>
+          <a:lstStyle/>
+          <a:p>
+            <a:endParaRPr lang="en-US" dirty="0"/>
+          </a:p>
+        </p:txBody>
+      </p:sp>
+      <p:sp>
+        <p:nvSpPr>
+          <p:cNvPr id="4" name="Slide Number Placeholder 3"/>
+          <p:cNvSpPr>
+            <a:spLocks noGrp="1"/>
+          </p:cNvSpPr>
+          <p:nvPr>
+            <p:ph type="sldNum" sz="quarter" idx="5"/>
+          </p:nvPr>
+        </p:nvSpPr>
+        <p:spPr/>
+        <p:txBody>
+          <a:bodyPr/>
+          <a:lstStyle/>
+          <a:p>
+            <a:fld id="{B2AFC0E1-9A48-4B26-9FCC-0F0ED76BE088}" type="slidenum">
+              <a:rPr lang="en-US" smtClean="0"/>
+              <a:t>26</a:t>
+            </a:fld>
+            <a:endParaRPr lang="en-US"/>
+          </a:p>
+        </p:txBody>
+      </p:sp>
+    </p:spTree>
+    <p:extLst>
+      <p:ext uri="{BB962C8B-B14F-4D97-AF65-F5344CB8AC3E}">
+        <p14:creationId xmlns:p14="http://schemas.microsoft.com/office/powerpoint/2010/main" val="822385432"/>
+      </p:ext>
+    </p:extLst>
+  </p:cSld>
+  <p:clrMapOvr>
+    <a:masterClrMapping/>
+  </p:clrMapOvr>
+</p:notes>
+</file>
+
+<file path=ppt/notesSlides/notesSlide27.xml><?xml version="1.0" encoding="utf-8"?>
+<p:notes xmlns:a="http://schemas.openxmlformats.org/drawingml/2006/main" xmlns:r="http://schemas.openxmlformats.org/officeDocument/2006/relationships" xmlns:p="http://schemas.openxmlformats.org/presentationml/2006/main">
+  <p:cSld>
+    <p:spTree>
+      <p:nvGrpSpPr>
+        <p:cNvPr id="1" name=""/>
+        <p:cNvGrpSpPr/>
+        <p:nvPr/>
+      </p:nvGrpSpPr>
+      <p:grpSpPr>
+        <a:xfrm>
+          <a:off x="0" y="0"/>
+          <a:ext cx="0" cy="0"/>
+          <a:chOff x="0" y="0"/>
+          <a:chExt cx="0" cy="0"/>
+        </a:xfrm>
+      </p:grpSpPr>
+      <p:sp>
+        <p:nvSpPr>
+          <p:cNvPr id="2" name="Slide Image Placeholder 1"/>
+          <p:cNvSpPr>
+            <a:spLocks noGrp="1" noRot="1" noChangeAspect="1"/>
+          </p:cNvSpPr>
+          <p:nvPr>
+            <p:ph type="sldImg"/>
+          </p:nvPr>
+        </p:nvSpPr>
+        <p:spPr/>
+      </p:sp>
+      <p:sp>
+        <p:nvSpPr>
+          <p:cNvPr id="3" name="Notes Placeholder 2"/>
+          <p:cNvSpPr>
+            <a:spLocks noGrp="1"/>
+          </p:cNvSpPr>
+          <p:nvPr>
+            <p:ph type="body" idx="1"/>
+          </p:nvPr>
+        </p:nvSpPr>
+        <p:spPr/>
+        <p:txBody>
+          <a:bodyPr/>
+          <a:lstStyle/>
+          <a:p>
+            <a:r>
+              <a:rPr lang="en-US" dirty="0"/>
+              <a:t>Remember that nullity(A) = 0 means only the zero vector makes the homogenous linear system Ax = b = 0.  According to the FTOIM, homogenous linear systems can only have the trivial solution x = 0; therefore, nullity must be zero.</a:t>
+            </a:r>
+          </a:p>
+          <a:p>
+            <a:r>
+              <a:rPr lang="en-US" dirty="0"/>
+              <a:t>Look at the cheat sheet, you need a nonempty null space to find an eigenvalue of a matrix.</a:t>
+            </a:r>
+          </a:p>
+          <a:p>
+            <a:endParaRPr lang="en-US" dirty="0"/>
+          </a:p>
+          <a:p>
+            <a:endParaRPr lang="en-US" dirty="0"/>
+          </a:p>
+        </p:txBody>
+      </p:sp>
+      <p:sp>
+        <p:nvSpPr>
+          <p:cNvPr id="4" name="Slide Number Placeholder 3"/>
+          <p:cNvSpPr>
+            <a:spLocks noGrp="1"/>
+          </p:cNvSpPr>
+          <p:nvPr>
+            <p:ph type="sldNum" sz="quarter" idx="5"/>
+          </p:nvPr>
+        </p:nvSpPr>
+        <p:spPr/>
+        <p:txBody>
+          <a:bodyPr/>
+          <a:lstStyle/>
+          <a:p>
+            <a:fld id="{B2AFC0E1-9A48-4B26-9FCC-0F0ED76BE088}" type="slidenum">
+              <a:rPr lang="en-US" smtClean="0"/>
+              <a:t>27</a:t>
+            </a:fld>
+            <a:endParaRPr lang="en-US"/>
+          </a:p>
+        </p:txBody>
+      </p:sp>
+    </p:spTree>
+    <p:extLst>
+      <p:ext uri="{BB962C8B-B14F-4D97-AF65-F5344CB8AC3E}">
+        <p14:creationId xmlns:p14="http://schemas.microsoft.com/office/powerpoint/2010/main" val="1036935033"/>
+      </p:ext>
+    </p:extLst>
+  </p:cSld>
+  <p:clrMapOvr>
+    <a:masterClrMapping/>
+  </p:clrMapOvr>
+</p:notes>
+</file>
+
+<file path=ppt/notesSlides/notesSlide28.xml><?xml version="1.0" encoding="utf-8"?>
+<p:notes xmlns:a="http://schemas.openxmlformats.org/drawingml/2006/main" xmlns:r="http://schemas.openxmlformats.org/officeDocument/2006/relationships" xmlns:p="http://schemas.openxmlformats.org/presentationml/2006/main">
+  <p:cSld>
+    <p:spTree>
+      <p:nvGrpSpPr>
+        <p:cNvPr id="1" name=""/>
+        <p:cNvGrpSpPr/>
+        <p:nvPr/>
+      </p:nvGrpSpPr>
+      <p:grpSpPr>
+        <a:xfrm>
+          <a:off x="0" y="0"/>
+          <a:ext cx="0" cy="0"/>
+          <a:chOff x="0" y="0"/>
+          <a:chExt cx="0" cy="0"/>
+        </a:xfrm>
+      </p:grpSpPr>
+      <p:sp>
+        <p:nvSpPr>
+          <p:cNvPr id="2" name="Slide Image Placeholder 1"/>
+          <p:cNvSpPr>
+            <a:spLocks noGrp="1" noRot="1" noChangeAspect="1"/>
+          </p:cNvSpPr>
+          <p:nvPr>
+            <p:ph type="sldImg"/>
+          </p:nvPr>
+        </p:nvSpPr>
+        <p:spPr/>
+      </p:sp>
+      <p:sp>
+        <p:nvSpPr>
+          <p:cNvPr id="3" name="Notes Placeholder 2"/>
+          <p:cNvSpPr>
+            <a:spLocks noGrp="1"/>
+          </p:cNvSpPr>
+          <p:nvPr>
+            <p:ph type="body" idx="1"/>
+          </p:nvPr>
+        </p:nvSpPr>
+        <p:spPr/>
+        <p:txBody>
+          <a:bodyPr/>
+          <a:lstStyle/>
+          <a:p>
+            <a:r>
+              <a:rPr lang="en-US" dirty="0"/>
+              <a:t>Solving the determinant for lambda to find the eigenvalues of matrix A.</a:t>
+            </a:r>
+          </a:p>
+        </p:txBody>
+      </p:sp>
+      <p:sp>
+        <p:nvSpPr>
+          <p:cNvPr id="4" name="Slide Number Placeholder 3"/>
+          <p:cNvSpPr>
+            <a:spLocks noGrp="1"/>
+          </p:cNvSpPr>
+          <p:nvPr>
+            <p:ph type="sldNum" sz="quarter" idx="5"/>
+          </p:nvPr>
+        </p:nvSpPr>
+        <p:spPr/>
+        <p:txBody>
+          <a:bodyPr/>
+          <a:lstStyle/>
+          <a:p>
+            <a:fld id="{B2AFC0E1-9A48-4B26-9FCC-0F0ED76BE088}" type="slidenum">
+              <a:rPr lang="en-US" smtClean="0"/>
+              <a:t>28</a:t>
+            </a:fld>
+            <a:endParaRPr lang="en-US"/>
+          </a:p>
+        </p:txBody>
+      </p:sp>
+    </p:spTree>
+    <p:extLst>
+      <p:ext uri="{BB962C8B-B14F-4D97-AF65-F5344CB8AC3E}">
+        <p14:creationId xmlns:p14="http://schemas.microsoft.com/office/powerpoint/2010/main" val="674072280"/>
+      </p:ext>
+    </p:extLst>
+  </p:cSld>
+  <p:clrMapOvr>
+    <a:masterClrMapping/>
+  </p:clrMapOvr>
+</p:notes>
+</file>
+
+<file path=ppt/notesSlides/notesSlide29.xml><?xml version="1.0" encoding="utf-8"?>
+<p:notes xmlns:a="http://schemas.openxmlformats.org/drawingml/2006/main" xmlns:r="http://schemas.openxmlformats.org/officeDocument/2006/relationships" xmlns:p="http://schemas.openxmlformats.org/presentationml/2006/main">
+  <p:cSld>
+    <p:spTree>
+      <p:nvGrpSpPr>
+        <p:cNvPr id="1" name=""/>
+        <p:cNvGrpSpPr/>
+        <p:nvPr/>
+      </p:nvGrpSpPr>
+      <p:grpSpPr>
+        <a:xfrm>
+          <a:off x="0" y="0"/>
+          <a:ext cx="0" cy="0"/>
+          <a:chOff x="0" y="0"/>
+          <a:chExt cx="0" cy="0"/>
+        </a:xfrm>
+      </p:grpSpPr>
+      <p:sp>
+        <p:nvSpPr>
+          <p:cNvPr id="2" name="Slide Image Placeholder 1"/>
+          <p:cNvSpPr>
+            <a:spLocks noGrp="1" noRot="1" noChangeAspect="1"/>
+          </p:cNvSpPr>
+          <p:nvPr>
+            <p:ph type="sldImg"/>
+          </p:nvPr>
+        </p:nvSpPr>
+        <p:spPr/>
+      </p:sp>
+      <mc:AlternateContent xmlns:mc="http://schemas.openxmlformats.org/markup-compatibility/2006">
+        <mc:Choice xmlns:a14="http://schemas.microsoft.com/office/drawing/2010/main" Requires="a14">
+          <p:sp>
+            <p:nvSpPr>
+              <p:cNvPr id="3" name="Notes Placeholder 2"/>
+              <p:cNvSpPr>
+                <a:spLocks noGrp="1"/>
+              </p:cNvSpPr>
+              <p:nvPr>
+                <p:ph type="body" idx="1"/>
+              </p:nvPr>
+            </p:nvSpPr>
+            <p:spPr/>
+            <p:txBody>
+              <a:bodyPr/>
+              <a:lstStyle/>
+              <a:p>
+                <a:r>
+                  <a:rPr lang="en-US" dirty="0"/>
+                  <a:t>Note that </a:t>
+                </a:r>
+                <a14:m>
+                  <m:oMath xmlns:m="http://schemas.openxmlformats.org/officeDocument/2006/math">
+                    <m:sSub>
+                      <m:sSubPr>
+                        <m:ctrlPr>
+                          <a:rPr lang="en-US" sz="1200" i="1" smtClean="0">
+                            <a:solidFill>
+                              <a:srgbClr val="202124"/>
+                            </a:solidFill>
+                            <a:latin typeface="Cambria Math" panose="02040503050406030204" pitchFamily="18" charset="0"/>
+                          </a:rPr>
+                        </m:ctrlPr>
+                      </m:sSubPr>
+                      <m:e>
+                        <m:r>
+                          <a:rPr lang="en-US" sz="1200" b="0" i="1" smtClean="0">
+                            <a:solidFill>
+                              <a:srgbClr val="202124"/>
+                            </a:solidFill>
+                            <a:latin typeface="Cambria Math" panose="02040503050406030204" pitchFamily="18" charset="0"/>
+                          </a:rPr>
+                          <m:t>𝐸</m:t>
+                        </m:r>
+                      </m:e>
+                      <m:sub>
+                        <m:r>
+                          <m:rPr>
+                            <m:nor/>
+                          </m:rPr>
+                          <a:rPr lang="el-GR" sz="1200" b="1" dirty="0">
+                            <a:solidFill>
+                              <a:srgbClr val="202124"/>
+                            </a:solidFill>
+                          </a:rPr>
+                          <m:t>λ</m:t>
+                        </m:r>
+                      </m:sub>
+                    </m:sSub>
+                  </m:oMath>
+                </a14:m>
+                <a:r>
+                  <a:rPr lang="en-US" sz="1200" b="1" i="0" dirty="0">
+                    <a:solidFill>
+                      <a:srgbClr val="202124"/>
+                    </a:solidFill>
+                    <a:effectLst/>
+                  </a:rPr>
+                  <a:t>=</a:t>
+                </a:r>
+                <a:r>
+                  <a:rPr lang="en-US" dirty="0"/>
+                  <a:t>null(A-</a:t>
+                </a:r>
+                <a:r>
+                  <a:rPr lang="el-GR" sz="1200" b="1" dirty="0">
+                    <a:solidFill>
+                      <a:srgbClr val="202124"/>
+                    </a:solidFill>
+                  </a:rPr>
+                  <a:t>λ</a:t>
+                </a:r>
+                <a:r>
+                  <a:rPr lang="en-US" sz="1200" dirty="0">
+                    <a:solidFill>
+                      <a:srgbClr val="202124"/>
+                    </a:solidFill>
+                  </a:rPr>
+                  <a:t>I</a:t>
+                </a:r>
+                <a:r>
+                  <a:rPr lang="en-US" sz="1200" baseline="-25000" dirty="0">
+                    <a:solidFill>
+                      <a:srgbClr val="202124"/>
+                    </a:solidFill>
+                  </a:rPr>
+                  <a:t>n</a:t>
+                </a:r>
+                <a:r>
+                  <a:rPr lang="en-US" sz="1200" baseline="0" dirty="0">
+                    <a:solidFill>
+                      <a:srgbClr val="202124"/>
+                    </a:solidFill>
+                  </a:rPr>
+                  <a:t>) is </a:t>
+                </a:r>
+                <a:r>
+                  <a:rPr lang="en-US" sz="1200" baseline="0">
+                    <a:solidFill>
+                      <a:srgbClr val="202124"/>
+                    </a:solidFill>
+                  </a:rPr>
+                  <a:t>a subspace of R</a:t>
+                </a:r>
+                <a:r>
+                  <a:rPr lang="en-US" sz="1200" baseline="30000">
+                    <a:solidFill>
+                      <a:srgbClr val="202124"/>
+                    </a:solidFill>
+                  </a:rPr>
+                  <a:t>n</a:t>
+                </a:r>
+                <a:r>
+                  <a:rPr lang="en-US" sz="1200" baseline="0">
+                    <a:solidFill>
+                      <a:srgbClr val="202124"/>
+                    </a:solidFill>
+                  </a:rPr>
+                  <a:t>, </a:t>
+                </a:r>
+                <a:r>
+                  <a:rPr lang="en-US" sz="1200" baseline="0" dirty="0">
+                    <a:solidFill>
+                      <a:srgbClr val="202124"/>
+                    </a:solidFill>
+                  </a:rPr>
+                  <a:t>therefore, </a:t>
+                </a:r>
+                <a:r>
+                  <a:rPr lang="en-US" sz="1200" baseline="0">
+                    <a:solidFill>
+                      <a:srgbClr val="202124"/>
+                    </a:solidFill>
+                  </a:rPr>
+                  <a:t>(A-2I</a:t>
+                </a:r>
+                <a:r>
+                  <a:rPr lang="en-US" sz="1200" baseline="-25000" dirty="0">
+                    <a:solidFill>
+                      <a:srgbClr val="202124"/>
+                    </a:solidFill>
+                  </a:rPr>
+                  <a:t>3</a:t>
+                </a:r>
+                <a:r>
+                  <a:rPr lang="en-US" sz="1200" baseline="0">
+                    <a:solidFill>
+                      <a:srgbClr val="202124"/>
+                    </a:solidFill>
+                  </a:rPr>
+                  <a:t>)[</a:t>
+                </a:r>
+                <a:r>
+                  <a:rPr lang="en-US" sz="1200" baseline="0" dirty="0">
+                    <a:solidFill>
+                      <a:srgbClr val="202124"/>
+                    </a:solidFill>
+                  </a:rPr>
+                  <a:t>1,1,1]=[0,0,0] will have eigenvalue equal to 2 for all linear combinations of eigenvector [1,1,1] but [0,0,0]</a:t>
+                </a:r>
+                <a:endParaRPr lang="en-US" dirty="0"/>
+              </a:p>
+            </p:txBody>
+          </p:sp>
+        </mc:Choice>
+        <mc:Fallback>
+          <p:sp>
+            <p:nvSpPr>
+              <p:cNvPr id="3" name="Notes Placeholder 2"/>
+              <p:cNvSpPr>
+                <a:spLocks noGrp="1"/>
+              </p:cNvSpPr>
+              <p:nvPr>
+                <p:ph type="body" idx="1"/>
+              </p:nvPr>
+            </p:nvSpPr>
+            <p:spPr/>
+            <p:txBody>
+              <a:bodyPr/>
+              <a:lstStyle/>
+              <a:p>
+                <a:r>
+                  <a:rPr lang="en-US" dirty="0"/>
+                  <a:t>Note that </a:t>
+                </a:r>
+                <a:r>
+                  <a:rPr lang="en-US" sz="1200" b="0" i="0">
+                    <a:solidFill>
+                      <a:srgbClr val="202124"/>
+                    </a:solidFill>
+                    <a:latin typeface="Cambria Math" panose="02040503050406030204" pitchFamily="18" charset="0"/>
+                  </a:rPr>
+                  <a:t>𝐸_</a:t>
+                </a:r>
+                <a:r>
+                  <a:rPr lang="el-GR" sz="1200" b="1" i="0" dirty="0">
+                    <a:solidFill>
+                      <a:srgbClr val="202124"/>
+                    </a:solidFill>
+                    <a:latin typeface="Cambria Math" panose="02040503050406030204" pitchFamily="18" charset="0"/>
+                  </a:rPr>
+                  <a:t>"</a:t>
+                </a:r>
+                <a:r>
+                  <a:rPr lang="el-GR" sz="1200" b="1" i="0" dirty="0">
+                    <a:solidFill>
+                      <a:srgbClr val="202124"/>
+                    </a:solidFill>
+                  </a:rPr>
+                  <a:t>λ</a:t>
+                </a:r>
+                <a:r>
+                  <a:rPr lang="el-GR" sz="1200" b="1" i="0" dirty="0">
+                    <a:solidFill>
+                      <a:srgbClr val="202124"/>
+                    </a:solidFill>
+                    <a:latin typeface="Cambria Math" panose="02040503050406030204" pitchFamily="18" charset="0"/>
+                  </a:rPr>
+                  <a:t>" </a:t>
+                </a:r>
+                <a:r>
+                  <a:rPr lang="en-US" sz="1200" b="1" i="0" dirty="0">
+                    <a:solidFill>
+                      <a:srgbClr val="202124"/>
+                    </a:solidFill>
+                    <a:effectLst/>
+                  </a:rPr>
+                  <a:t>=</a:t>
+                </a:r>
+                <a:r>
+                  <a:rPr lang="en-US" dirty="0"/>
+                  <a:t>null(A-</a:t>
+                </a:r>
+                <a:r>
+                  <a:rPr lang="el-GR" sz="1200" b="1" dirty="0">
+                    <a:solidFill>
+                      <a:srgbClr val="202124"/>
+                    </a:solidFill>
+                  </a:rPr>
+                  <a:t>λ</a:t>
+                </a:r>
+                <a:r>
+                  <a:rPr lang="en-US" sz="1200" dirty="0">
+                    <a:solidFill>
+                      <a:srgbClr val="202124"/>
+                    </a:solidFill>
+                  </a:rPr>
+                  <a:t>I</a:t>
+                </a:r>
+                <a:r>
+                  <a:rPr lang="en-US" sz="1200" baseline="-25000" dirty="0">
+                    <a:solidFill>
+                      <a:srgbClr val="202124"/>
+                    </a:solidFill>
+                  </a:rPr>
+                  <a:t>n</a:t>
+                </a:r>
+                <a:r>
+                  <a:rPr lang="en-US" sz="1200" baseline="0" dirty="0">
+                    <a:solidFill>
+                      <a:srgbClr val="202124"/>
+                    </a:solidFill>
+                  </a:rPr>
+                  <a:t>) is </a:t>
+                </a:r>
+                <a:r>
+                  <a:rPr lang="en-US" sz="1200" baseline="0">
+                    <a:solidFill>
+                      <a:srgbClr val="202124"/>
+                    </a:solidFill>
+                  </a:rPr>
+                  <a:t>a subspace of R</a:t>
+                </a:r>
+                <a:r>
+                  <a:rPr lang="en-US" sz="1200" baseline="30000">
+                    <a:solidFill>
+                      <a:srgbClr val="202124"/>
+                    </a:solidFill>
+                  </a:rPr>
+                  <a:t>n</a:t>
+                </a:r>
+                <a:r>
+                  <a:rPr lang="en-US" sz="1200" baseline="0">
+                    <a:solidFill>
+                      <a:srgbClr val="202124"/>
+                    </a:solidFill>
+                  </a:rPr>
+                  <a:t>, </a:t>
+                </a:r>
+                <a:r>
+                  <a:rPr lang="en-US" sz="1200" baseline="0" dirty="0">
+                    <a:solidFill>
+                      <a:srgbClr val="202124"/>
+                    </a:solidFill>
+                  </a:rPr>
+                  <a:t>therefore, </a:t>
+                </a:r>
+                <a:r>
+                  <a:rPr lang="en-US" sz="1200" baseline="0">
+                    <a:solidFill>
+                      <a:srgbClr val="202124"/>
+                    </a:solidFill>
+                  </a:rPr>
+                  <a:t>(A-2I</a:t>
+                </a:r>
+                <a:r>
+                  <a:rPr lang="en-US" sz="1200" baseline="-25000" dirty="0">
+                    <a:solidFill>
+                      <a:srgbClr val="202124"/>
+                    </a:solidFill>
+                  </a:rPr>
+                  <a:t>3</a:t>
+                </a:r>
+                <a:r>
+                  <a:rPr lang="en-US" sz="1200" baseline="0">
+                    <a:solidFill>
+                      <a:srgbClr val="202124"/>
+                    </a:solidFill>
+                  </a:rPr>
+                  <a:t>)[</a:t>
+                </a:r>
+                <a:r>
+                  <a:rPr lang="en-US" sz="1200" baseline="0" dirty="0">
+                    <a:solidFill>
+                      <a:srgbClr val="202124"/>
+                    </a:solidFill>
+                  </a:rPr>
+                  <a:t>1,1,1]=[0,0,0] will have eigenvalue equal to 2 for all linear combinations of eigenvector [1,1,1] but [0,0,0]</a:t>
+                </a:r>
+                <a:endParaRPr lang="en-US" dirty="0"/>
+              </a:p>
+            </p:txBody>
+          </p:sp>
+        </mc:Fallback>
+      </mc:AlternateContent>
+      <p:sp>
+        <p:nvSpPr>
+          <p:cNvPr id="4" name="Slide Number Placeholder 3"/>
+          <p:cNvSpPr>
+            <a:spLocks noGrp="1"/>
+          </p:cNvSpPr>
+          <p:nvPr>
+            <p:ph type="sldNum" sz="quarter" idx="5"/>
+          </p:nvPr>
+        </p:nvSpPr>
+        <p:spPr/>
+        <p:txBody>
+          <a:bodyPr/>
+          <a:lstStyle/>
+          <a:p>
+            <a:fld id="{B2AFC0E1-9A48-4B26-9FCC-0F0ED76BE088}" type="slidenum">
+              <a:rPr lang="en-US" smtClean="0"/>
+              <a:t>31</a:t>
+            </a:fld>
+            <a:endParaRPr lang="en-US"/>
+          </a:p>
+        </p:txBody>
+      </p:sp>
+    </p:spTree>
+    <p:extLst>
+      <p:ext uri="{BB962C8B-B14F-4D97-AF65-F5344CB8AC3E}">
+        <p14:creationId xmlns:p14="http://schemas.microsoft.com/office/powerpoint/2010/main" val="3413696427"/>
       </p:ext>
     </p:extLst>
   </p:cSld>
@@ -3971,6 +5402,15 @@
             <p:txBody>
               <a:bodyPr/>
               <a:lstStyle/>
+              <a:p>
+                <a:pPr marL="0" indent="0">
+                  <a:buNone/>
+                </a:pPr>
+                <a:r>
+                  <a:rPr lang="en-US" b="1" dirty="0"/>
+                  <a:t>Memorize this, is pretty much used in most of this unit</a:t>
+                </a:r>
+              </a:p>
               <a:p>
                 <a:pPr marL="228600" indent="-228600">
                   <a:buAutoNum type="arabicParenR"/>
@@ -4211,7 +5651,10 @@
             <a:pPr marL="0" indent="0">
               <a:buNone/>
             </a:pPr>
-            <a:endParaRPr lang="en-US" dirty="0"/>
+            <a:r>
+              <a:rPr lang="en-US" dirty="0"/>
+              <a:t>Theorem 7 must be memorized. The previous slide can be used for Theorem 1’s case.</a:t>
+            </a:r>
           </a:p>
         </p:txBody>
       </p:sp>
@@ -4599,7 +6042,7 @@
           <a:p>
             <a:r>
               <a:rPr lang="en-US" dirty="0"/>
-              <a:t>Basis is the set of linearly independent vectors that represent subspace W which is not an empty set.  (refer to slide 6)</a:t>
+              <a:t>Basis is the set of linearly independent vectors that represent subspace W which is not an empty set.  (refer to slide 6 for info on subspaces)</a:t>
             </a:r>
           </a:p>
         </p:txBody>
@@ -4961,7 +6404,7 @@
           <a:p>
             <a:fld id="{C868AB9E-4FA6-4C7D-A415-A317424E55FE}" type="datetimeFigureOut">
               <a:rPr lang="en-US" smtClean="0"/>
-              <a:t>3/28/2021</a:t>
+              <a:t>3/29/2021</a:t>
             </a:fld>
             <a:endParaRPr lang="en-US"/>
           </a:p>
@@ -5159,7 +6602,7 @@
           <a:p>
             <a:fld id="{C868AB9E-4FA6-4C7D-A415-A317424E55FE}" type="datetimeFigureOut">
               <a:rPr lang="en-US" smtClean="0"/>
-              <a:t>3/28/2021</a:t>
+              <a:t>3/29/2021</a:t>
             </a:fld>
             <a:endParaRPr lang="en-US"/>
           </a:p>
@@ -5367,7 +6810,7 @@
           <a:p>
             <a:fld id="{C868AB9E-4FA6-4C7D-A415-A317424E55FE}" type="datetimeFigureOut">
               <a:rPr lang="en-US" smtClean="0"/>
-              <a:t>3/28/2021</a:t>
+              <a:t>3/29/2021</a:t>
             </a:fld>
             <a:endParaRPr lang="en-US"/>
           </a:p>
@@ -5565,7 +7008,7 @@
           <a:p>
             <a:fld id="{C868AB9E-4FA6-4C7D-A415-A317424E55FE}" type="datetimeFigureOut">
               <a:rPr lang="en-US" smtClean="0"/>
-              <a:t>3/28/2021</a:t>
+              <a:t>3/29/2021</a:t>
             </a:fld>
             <a:endParaRPr lang="en-US"/>
           </a:p>
@@ -5840,7 +7283,7 @@
           <a:p>
             <a:fld id="{C868AB9E-4FA6-4C7D-A415-A317424E55FE}" type="datetimeFigureOut">
               <a:rPr lang="en-US" smtClean="0"/>
-              <a:t>3/28/2021</a:t>
+              <a:t>3/29/2021</a:t>
             </a:fld>
             <a:endParaRPr lang="en-US"/>
           </a:p>
@@ -6105,7 +7548,7 @@
           <a:p>
             <a:fld id="{C868AB9E-4FA6-4C7D-A415-A317424E55FE}" type="datetimeFigureOut">
               <a:rPr lang="en-US" smtClean="0"/>
-              <a:t>3/28/2021</a:t>
+              <a:t>3/29/2021</a:t>
             </a:fld>
             <a:endParaRPr lang="en-US"/>
           </a:p>
@@ -6517,7 +7960,7 @@
           <a:p>
             <a:fld id="{C868AB9E-4FA6-4C7D-A415-A317424E55FE}" type="datetimeFigureOut">
               <a:rPr lang="en-US" smtClean="0"/>
-              <a:t>3/28/2021</a:t>
+              <a:t>3/29/2021</a:t>
             </a:fld>
             <a:endParaRPr lang="en-US"/>
           </a:p>
@@ -6658,7 +8101,7 @@
           <a:p>
             <a:fld id="{C868AB9E-4FA6-4C7D-A415-A317424E55FE}" type="datetimeFigureOut">
               <a:rPr lang="en-US" smtClean="0"/>
-              <a:t>3/28/2021</a:t>
+              <a:t>3/29/2021</a:t>
             </a:fld>
             <a:endParaRPr lang="en-US"/>
           </a:p>
@@ -6771,7 +8214,7 @@
           <a:p>
             <a:fld id="{C868AB9E-4FA6-4C7D-A415-A317424E55FE}" type="datetimeFigureOut">
               <a:rPr lang="en-US" smtClean="0"/>
-              <a:t>3/28/2021</a:t>
+              <a:t>3/29/2021</a:t>
             </a:fld>
             <a:endParaRPr lang="en-US"/>
           </a:p>
@@ -7082,7 +8525,7 @@
           <a:p>
             <a:fld id="{C868AB9E-4FA6-4C7D-A415-A317424E55FE}" type="datetimeFigureOut">
               <a:rPr lang="en-US" smtClean="0"/>
-              <a:t>3/28/2021</a:t>
+              <a:t>3/29/2021</a:t>
             </a:fld>
             <a:endParaRPr lang="en-US"/>
           </a:p>
@@ -7370,7 +8813,7 @@
           <a:p>
             <a:fld id="{C868AB9E-4FA6-4C7D-A415-A317424E55FE}" type="datetimeFigureOut">
               <a:rPr lang="en-US" smtClean="0"/>
-              <a:t>3/28/2021</a:t>
+              <a:t>3/29/2021</a:t>
             </a:fld>
             <a:endParaRPr lang="en-US"/>
           </a:p>
@@ -7611,7 +9054,7 @@
           <a:p>
             <a:fld id="{C868AB9E-4FA6-4C7D-A415-A317424E55FE}" type="datetimeFigureOut">
               <a:rPr lang="en-US" smtClean="0"/>
-              <a:t>3/28/2021</a:t>
+              <a:t>3/29/2021</a:t>
             </a:fld>
             <a:endParaRPr lang="en-US"/>
           </a:p>
@@ -10204,7 +11647,7 @@
           <p:nvPr/>
         </p:nvPicPr>
         <p:blipFill>
-          <a:blip r:embed="rId2"/>
+          <a:blip r:embed="rId3"/>
           <a:stretch>
             <a:fillRect/>
           </a:stretch>
@@ -10503,7 +11946,7 @@
           <p:nvPr/>
         </p:nvPicPr>
         <p:blipFill>
-          <a:blip r:embed="rId2"/>
+          <a:blip r:embed="rId3"/>
           <a:stretch>
             <a:fillRect/>
           </a:stretch>
@@ -10704,7 +12147,7 @@
           <p:nvPr/>
         </p:nvPicPr>
         <p:blipFill>
-          <a:blip r:embed="rId3"/>
+          <a:blip r:embed="rId4"/>
           <a:stretch>
             <a:fillRect/>
           </a:stretch>
@@ -10734,7 +12177,7 @@
           <p:nvPr/>
         </p:nvPicPr>
         <p:blipFill>
-          <a:blip r:embed="rId4"/>
+          <a:blip r:embed="rId5"/>
           <a:stretch>
             <a:fillRect/>
           </a:stretch>
@@ -10862,7 +12305,7 @@
           <p:nvPr/>
         </p:nvPicPr>
         <p:blipFill>
-          <a:blip r:embed="rId2"/>
+          <a:blip r:embed="rId3"/>
           <a:stretch>
             <a:fillRect/>
           </a:stretch>
@@ -11266,7 +12709,7 @@
           <p:nvPr/>
         </p:nvPicPr>
         <p:blipFill>
-          <a:blip r:embed="rId2"/>
+          <a:blip r:embed="rId3"/>
           <a:stretch>
             <a:fillRect/>
           </a:stretch>
@@ -11805,7 +13248,7 @@
           <p:nvPr/>
         </p:nvPicPr>
         <p:blipFill>
-          <a:blip r:embed="rId2"/>
+          <a:blip r:embed="rId3"/>
           <a:stretch>
             <a:fillRect/>
           </a:stretch>
@@ -12045,7 +13488,7 @@
           <p:nvPr/>
         </p:nvPicPr>
         <p:blipFill>
-          <a:blip r:embed="rId2"/>
+          <a:blip r:embed="rId3"/>
           <a:stretch>
             <a:fillRect/>
           </a:stretch>
@@ -12300,7 +13743,7 @@
           <p:nvPr/>
         </p:nvPicPr>
         <p:blipFill>
-          <a:blip r:embed="rId2"/>
+          <a:blip r:embed="rId3"/>
           <a:stretch>
             <a:fillRect/>
           </a:stretch>
@@ -12365,7 +13808,7 @@
           <p:cNvPr id="9" name="Rectangle 8">
             <a:extLst>
               <a:ext uri="{FF2B5EF4-FFF2-40B4-BE49-F238E27FC236}">
-                <a16:creationId xmlns:a16="http://schemas.microsoft.com/office/drawing/2014/main" id="{EB270761-CC40-4F3F-A916-7E3BC3989348}"/>
+                <a16:creationId xmlns:a16="http://schemas.microsoft.com/office/drawing/2014/main" id="{D17A94B4-8121-4ED6-AB0D-69EE9A6332E6}"/>
               </a:ext>
               <a:ext uri="{C183D7F6-B498-43B3-948B-1728B52AA6E4}">
                 <adec:decorative xmlns:adec="http://schemas.microsoft.com/office/drawing/2017/decorative" val="1"/>
@@ -12386,7 +13829,7 @@
         <p:spPr>
           <a:xfrm>
             <a:off x="-1" y="0"/>
-            <a:ext cx="12191695" cy="6858000"/>
+            <a:ext cx="12188952" cy="6858000"/>
           </a:xfrm>
           <a:prstGeom prst="rect">
             <a:avLst/>
@@ -12420,78 +13863,21 @@
           </a:p>
         </p:txBody>
       </p:sp>
-      <p:sp>
-        <p:nvSpPr>
-          <p:cNvPr id="2" name="Title 1">
-            <a:extLst>
-              <a:ext uri="{FF2B5EF4-FFF2-40B4-BE49-F238E27FC236}">
-                <a16:creationId xmlns:a16="http://schemas.microsoft.com/office/drawing/2014/main" id="{55C4CDE4-E951-449C-A932-89AA243A481C}"/>
-              </a:ext>
-            </a:extLst>
-          </p:cNvPr>
-          <p:cNvSpPr>
-            <a:spLocks noGrp="1"/>
-          </p:cNvSpPr>
-          <p:nvPr>
-            <p:ph type="title"/>
-          </p:nvPr>
-        </p:nvSpPr>
-        <p:spPr>
-          <a:xfrm>
-            <a:off x="1366160" y="4376508"/>
-            <a:ext cx="9623404" cy="1257202"/>
-          </a:xfrm>
-        </p:spPr>
-        <p:txBody>
-          <a:bodyPr vert="horz" lIns="91440" tIns="45720" rIns="91440" bIns="45720" rtlCol="0" anchor="b">
-            <a:normAutofit/>
-          </a:bodyPr>
-          <a:lstStyle/>
-          <a:p>
-            <a:r>
-              <a:rPr lang="en-US" sz="4100" kern="1200" dirty="0">
-                <a:solidFill>
-                  <a:schemeClr val="tx1"/>
-                </a:solidFill>
-                <a:latin typeface="+mj-lt"/>
-                <a:ea typeface="+mj-ea"/>
-                <a:cs typeface="+mj-cs"/>
-              </a:rPr>
-              <a:t>Invertible Linear Transformation and Standard </a:t>
-            </a:r>
-            <a:r>
-              <a:rPr lang="en-US" sz="4100" dirty="0"/>
-              <a:t>M</a:t>
-            </a:r>
-            <a:r>
-              <a:rPr lang="en-US" sz="4100" kern="1200" dirty="0">
-                <a:solidFill>
-                  <a:schemeClr val="tx1"/>
-                </a:solidFill>
-                <a:latin typeface="+mj-lt"/>
-                <a:ea typeface="+mj-ea"/>
-                <a:cs typeface="+mj-cs"/>
-              </a:rPr>
-              <a:t>atrix</a:t>
-            </a:r>
-          </a:p>
-        </p:txBody>
-      </p:sp>
-      <p:sp>
-        <p:nvSpPr>
-          <p:cNvPr id="11" name="Rectangle 10">
-            <a:extLst>
-              <a:ext uri="{FF2B5EF4-FFF2-40B4-BE49-F238E27FC236}">
-                <a16:creationId xmlns:a16="http://schemas.microsoft.com/office/drawing/2014/main" id="{A2555B16-BE1D-4C33-A27C-FF0671B6C94C}"/>
+      <p:pic>
+        <p:nvPicPr>
+          <p:cNvPr id="11" name="Graphic 10">
+            <a:extLst>
+              <a:ext uri="{FF2B5EF4-FFF2-40B4-BE49-F238E27FC236}">
+                <a16:creationId xmlns:a16="http://schemas.microsoft.com/office/drawing/2014/main" id="{4741521E-DC76-41B9-8A47-448CD4F9FA46}"/>
               </a:ext>
               <a:ext uri="{C183D7F6-B498-43B3-948B-1728B52AA6E4}">
                 <adec:decorative xmlns:adec="http://schemas.microsoft.com/office/drawing/2017/decorative" val="1"/>
               </a:ext>
             </a:extLst>
           </p:cNvPr>
-          <p:cNvSpPr>
-            <a:spLocks noGrp="1" noRot="1" noChangeAspect="1" noMove="1" noResize="1" noEditPoints="1" noAdjustHandles="1" noChangeArrowheads="1" noChangeShapeType="1" noTextEdit="1"/>
-          </p:cNvSpPr>
+          <p:cNvPicPr>
+            <a:picLocks noGrp="1" noRot="1" noChangeAspect="1" noMove="1" noResize="1" noEditPoints="1" noAdjustHandles="1" noChangeArrowheads="1" noChangeShapeType="1" noCrop="1"/>
+          </p:cNvPicPr>
           <p:nvPr>
             <p:extLst>
               <p:ext uri="{386F3935-93C4-4BCD-93E2-E3B085C9AB24}">
@@ -12499,17 +13885,109 @@
               </p:ext>
             </p:extLst>
           </p:nvPr>
+        </p:nvPicPr>
+        <p:blipFill>
+          <a:blip r:embed="rId3">
+            <a:extLst>
+              <a:ext uri="{28A0092B-C50C-407E-A947-70E740481C1C}">
+                <a14:useLocalDpi xmlns:a14="http://schemas.microsoft.com/office/drawing/2010/main" val="0"/>
+              </a:ext>
+              <a:ext uri="{96DAC541-7B7A-43D3-8B79-37D633B846F1}">
+                <asvg:svgBlip xmlns:asvg="http://schemas.microsoft.com/office/drawing/2016/SVG/main" r:embed="rId4"/>
+              </a:ext>
+            </a:extLst>
+          </a:blip>
+          <a:stretch>
+            <a:fillRect/>
+          </a:stretch>
+        </p:blipFill>
+        <p:spPr>
+          <a:xfrm rot="5400000">
+            <a:off x="3372661" y="-3359290"/>
+            <a:ext cx="5470372" cy="12188952"/>
+          </a:xfrm>
+          <a:prstGeom prst="rect">
+            <a:avLst/>
+          </a:prstGeom>
+        </p:spPr>
+      </p:pic>
+      <p:sp>
+        <p:nvSpPr>
+          <p:cNvPr id="2" name="Title 1">
+            <a:extLst>
+              <a:ext uri="{FF2B5EF4-FFF2-40B4-BE49-F238E27FC236}">
+                <a16:creationId xmlns:a16="http://schemas.microsoft.com/office/drawing/2014/main" id="{E2A30878-7531-452D-9EE5-AC3CB34AE565}"/>
+              </a:ext>
+            </a:extLst>
+          </p:cNvPr>
+          <p:cNvSpPr>
+            <a:spLocks noGrp="1"/>
+          </p:cNvSpPr>
+          <p:nvPr>
+            <p:ph type="title"/>
+          </p:nvPr>
         </p:nvSpPr>
         <p:spPr>
           <a:xfrm>
-            <a:off x="0" y="891540"/>
-            <a:ext cx="722376" cy="5071110"/>
+            <a:off x="1403632" y="184336"/>
+            <a:ext cx="9283781" cy="1405965"/>
+          </a:xfrm>
+        </p:spPr>
+        <p:txBody>
+          <a:bodyPr vert="horz" lIns="91440" tIns="45720" rIns="91440" bIns="45720" rtlCol="0" anchor="b">
+            <a:normAutofit/>
+          </a:bodyPr>
+          <a:lstStyle/>
+          <a:p>
+            <a:pPr algn="ctr"/>
+            <a:r>
+              <a:rPr lang="en-US" sz="5000" dirty="0"/>
+              <a:t>Probability of State change</a:t>
+            </a:r>
+            <a:endParaRPr lang="en-US" sz="5000" kern="1200" dirty="0">
+              <a:solidFill>
+                <a:schemeClr val="tx1"/>
+              </a:solidFill>
+              <a:latin typeface="+mj-lt"/>
+              <a:ea typeface="+mj-ea"/>
+              <a:cs typeface="+mj-cs"/>
+            </a:endParaRPr>
+          </a:p>
+        </p:txBody>
+      </p:sp>
+      <p:sp>
+        <p:nvSpPr>
+          <p:cNvPr id="13" name="Rectangle 12">
+            <a:extLst>
+              <a:ext uri="{FF2B5EF4-FFF2-40B4-BE49-F238E27FC236}">
+                <a16:creationId xmlns:a16="http://schemas.microsoft.com/office/drawing/2014/main" id="{53FD85F6-ECDC-4124-9916-6444E142C663}"/>
+              </a:ext>
+              <a:ext uri="{C183D7F6-B498-43B3-948B-1728B52AA6E4}">
+                <adec:decorative xmlns:adec="http://schemas.microsoft.com/office/drawing/2017/decorative" val="1"/>
+              </a:ext>
+            </a:extLst>
+          </p:cNvPr>
+          <p:cNvSpPr>
+            <a:spLocks noGrp="1" noRot="1" noChangeAspect="1" noMove="1" noResize="1" noEditPoints="1" noAdjustHandles="1" noChangeArrowheads="1" noChangeShapeType="1" noTextEdit="1"/>
+          </p:cNvSpPr>
+          <p:nvPr>
+            <p:extLst>
+              <p:ext uri="{386F3935-93C4-4BCD-93E2-E3B085C9AB24}">
+                <p16:designElem xmlns:p16="http://schemas.microsoft.com/office/powerpoint/2015/main" val="1"/>
+              </p:ext>
+            </p:extLst>
+          </p:nvPr>
+        </p:nvSpPr>
+        <p:spPr>
+          <a:xfrm>
+            <a:off x="-1078" y="685797"/>
+            <a:ext cx="118872" cy="1550455"/>
           </a:xfrm>
           <a:prstGeom prst="rect">
             <a:avLst/>
           </a:prstGeom>
           <a:solidFill>
-            <a:srgbClr val="4C5254"/>
+            <a:schemeClr val="accent2"/>
           </a:solidFill>
           <a:ln>
             <a:noFill/>
@@ -12540,12 +14018,75 @@
           </a:p>
         </p:txBody>
       </p:sp>
+      <p:sp>
+        <p:nvSpPr>
+          <p:cNvPr id="15" name="Rectangle 14">
+            <a:extLst>
+              <a:ext uri="{FF2B5EF4-FFF2-40B4-BE49-F238E27FC236}">
+                <a16:creationId xmlns:a16="http://schemas.microsoft.com/office/drawing/2014/main" id="{FB5D26B4-74AD-4118-8F13-7051DA3BFA87}"/>
+              </a:ext>
+              <a:ext uri="{C183D7F6-B498-43B3-948B-1728B52AA6E4}">
+                <adec:decorative xmlns:adec="http://schemas.microsoft.com/office/drawing/2017/decorative" val="1"/>
+              </a:ext>
+            </a:extLst>
+          </p:cNvPr>
+          <p:cNvSpPr>
+            <a:spLocks noGrp="1" noRot="1" noChangeAspect="1" noMove="1" noResize="1" noEditPoints="1" noAdjustHandles="1" noChangeArrowheads="1" noChangeShapeType="1" noTextEdit="1"/>
+          </p:cNvSpPr>
+          <p:nvPr>
+            <p:extLst>
+              <p:ext uri="{386F3935-93C4-4BCD-93E2-E3B085C9AB24}">
+                <p16:designElem xmlns:p16="http://schemas.microsoft.com/office/powerpoint/2015/main" val="1"/>
+              </p:ext>
+            </p:extLst>
+          </p:nvPr>
+        </p:nvSpPr>
+        <p:spPr>
+          <a:xfrm>
+            <a:off x="12073128" y="6172201"/>
+            <a:ext cx="118872" cy="685800"/>
+          </a:xfrm>
+          <a:prstGeom prst="rect">
+            <a:avLst/>
+          </a:prstGeom>
+          <a:solidFill>
+            <a:schemeClr val="accent2"/>
+          </a:solidFill>
+          <a:ln>
+            <a:noFill/>
+          </a:ln>
+        </p:spPr>
+        <p:style>
+          <a:lnRef idx="2">
+            <a:schemeClr val="accent1">
+              <a:shade val="50000"/>
+            </a:schemeClr>
+          </a:lnRef>
+          <a:fillRef idx="1">
+            <a:schemeClr val="accent1"/>
+          </a:fillRef>
+          <a:effectRef idx="0">
+            <a:schemeClr val="accent1"/>
+          </a:effectRef>
+          <a:fontRef idx="minor">
+            <a:schemeClr val="lt1"/>
+          </a:fontRef>
+        </p:style>
+        <p:txBody>
+          <a:bodyPr rtlCol="0" anchor="ctr"/>
+          <a:lstStyle/>
+          <a:p>
+            <a:pPr algn="ctr"/>
+            <a:endParaRPr lang="en-US"/>
+          </a:p>
+        </p:txBody>
+      </p:sp>
       <p:pic>
         <p:nvPicPr>
-          <p:cNvPr id="5" name="Picture 4">
-            <a:extLst>
-              <a:ext uri="{FF2B5EF4-FFF2-40B4-BE49-F238E27FC236}">
-                <a16:creationId xmlns:a16="http://schemas.microsoft.com/office/drawing/2014/main" id="{14ABC56A-927A-4952-B432-56A0FE916C19}"/>
+          <p:cNvPr id="10" name="Picture 9">
+            <a:extLst>
+              <a:ext uri="{FF2B5EF4-FFF2-40B4-BE49-F238E27FC236}">
+                <a16:creationId xmlns:a16="http://schemas.microsoft.com/office/drawing/2014/main" id="{3C69FA36-1F89-4934-8185-252156F16280}"/>
               </a:ext>
             </a:extLst>
           </p:cNvPr>
@@ -12555,55 +14096,155 @@
           <p:nvPr/>
         </p:nvPicPr>
         <p:blipFill>
-          <a:blip r:embed="rId2"/>
+          <a:blip r:embed="rId5"/>
           <a:stretch>
             <a:fillRect/>
           </a:stretch>
         </p:blipFill>
         <p:spPr>
           <a:xfrm>
-            <a:off x="1361921" y="2106953"/>
-            <a:ext cx="9467850" cy="1028700"/>
+            <a:off x="1483131" y="3803724"/>
+            <a:ext cx="9629775" cy="714375"/>
           </a:xfrm>
           <a:prstGeom prst="rect">
             <a:avLst/>
           </a:prstGeom>
         </p:spPr>
       </p:pic>
-      <p:pic>
-        <p:nvPicPr>
-          <p:cNvPr id="7" name="Picture 6">
-            <a:extLst>
-              <a:ext uri="{FF2B5EF4-FFF2-40B4-BE49-F238E27FC236}">
-                <a16:creationId xmlns:a16="http://schemas.microsoft.com/office/drawing/2014/main" id="{4355A3DC-94E3-469F-9904-99CA9F73E02E}"/>
-              </a:ext>
-            </a:extLst>
-          </p:cNvPr>
-          <p:cNvPicPr>
-            <a:picLocks noChangeAspect="1"/>
-          </p:cNvPicPr>
+      <p:sp>
+        <p:nvSpPr>
+          <p:cNvPr id="14" name="TextBox 13">
+            <a:extLst>
+              <a:ext uri="{FF2B5EF4-FFF2-40B4-BE49-F238E27FC236}">
+                <a16:creationId xmlns:a16="http://schemas.microsoft.com/office/drawing/2014/main" id="{043C79A1-3B38-4867-A5F1-1A6716FF29DF}"/>
+              </a:ext>
+            </a:extLst>
+          </p:cNvPr>
+          <p:cNvSpPr txBox="1"/>
           <p:nvPr/>
-        </p:nvPicPr>
-        <p:blipFill>
-          <a:blip r:embed="rId3"/>
-          <a:stretch>
-            <a:fillRect/>
-          </a:stretch>
-        </p:blipFill>
+        </p:nvSpPr>
         <p:spPr>
           <a:xfrm>
-            <a:off x="1312164" y="3041332"/>
-            <a:ext cx="9677400" cy="771525"/>
+            <a:off x="6772940" y="3791579"/>
+            <a:ext cx="770339" cy="369332"/>
           </a:xfrm>
           <a:prstGeom prst="rect">
             <a:avLst/>
           </a:prstGeom>
+          <a:noFill/>
         </p:spPr>
-      </p:pic>
+        <p:txBody>
+          <a:bodyPr wrap="none" rtlCol="0">
+            <a:spAutoFit/>
+          </a:bodyPr>
+          <a:lstStyle/>
+          <a:p>
+            <a:r>
+              <a:rPr lang="en-US" dirty="0">
+                <a:solidFill>
+                  <a:srgbClr val="FF0000"/>
+                </a:solidFill>
+              </a:rPr>
+              <a:t>State j</a:t>
+            </a:r>
+          </a:p>
+        </p:txBody>
+      </p:sp>
+      <p:sp>
+        <p:nvSpPr>
+          <p:cNvPr id="16" name="TextBox 15">
+            <a:extLst>
+              <a:ext uri="{FF2B5EF4-FFF2-40B4-BE49-F238E27FC236}">
+                <a16:creationId xmlns:a16="http://schemas.microsoft.com/office/drawing/2014/main" id="{EA08A5BC-E6C9-471E-BA2C-980B57AC91C7}"/>
+              </a:ext>
+            </a:extLst>
+          </p:cNvPr>
+          <p:cNvSpPr txBox="1"/>
+          <p:nvPr/>
+        </p:nvSpPr>
+        <p:spPr>
+          <a:xfrm>
+            <a:off x="9189983" y="3803724"/>
+            <a:ext cx="768737" cy="369332"/>
+          </a:xfrm>
+          <a:prstGeom prst="rect">
+            <a:avLst/>
+          </a:prstGeom>
+          <a:noFill/>
+        </p:spPr>
+        <p:txBody>
+          <a:bodyPr wrap="none" rtlCol="0">
+            <a:spAutoFit/>
+          </a:bodyPr>
+          <a:lstStyle/>
+          <a:p>
+            <a:r>
+              <a:rPr lang="en-US" dirty="0">
+                <a:solidFill>
+                  <a:srgbClr val="FF0000"/>
+                </a:solidFill>
+              </a:rPr>
+              <a:t>State </a:t>
+            </a:r>
+            <a:r>
+              <a:rPr lang="en-US" dirty="0" err="1">
+                <a:solidFill>
+                  <a:srgbClr val="FF0000"/>
+                </a:solidFill>
+              </a:rPr>
+              <a:t>i</a:t>
+            </a:r>
+            <a:endParaRPr lang="en-US" dirty="0">
+              <a:solidFill>
+                <a:srgbClr val="FF0000"/>
+              </a:solidFill>
+            </a:endParaRPr>
+          </a:p>
+        </p:txBody>
+      </p:sp>
+      <p:sp>
+        <p:nvSpPr>
+          <p:cNvPr id="17" name="TextBox 16">
+            <a:extLst>
+              <a:ext uri="{FF2B5EF4-FFF2-40B4-BE49-F238E27FC236}">
+                <a16:creationId xmlns:a16="http://schemas.microsoft.com/office/drawing/2014/main" id="{AE080991-D627-4E71-8643-B4DDF1CD8C46}"/>
+              </a:ext>
+            </a:extLst>
+          </p:cNvPr>
+          <p:cNvSpPr txBox="1"/>
+          <p:nvPr/>
+        </p:nvSpPr>
+        <p:spPr>
+          <a:xfrm>
+            <a:off x="2504881" y="4102524"/>
+            <a:ext cx="829266" cy="369332"/>
+          </a:xfrm>
+          <a:prstGeom prst="rect">
+            <a:avLst/>
+          </a:prstGeom>
+          <a:noFill/>
+        </p:spPr>
+        <p:txBody>
+          <a:bodyPr wrap="none" rtlCol="0">
+            <a:spAutoFit/>
+          </a:bodyPr>
+          <a:lstStyle/>
+          <a:p>
+            <a:r>
+              <a:rPr lang="en-US" dirty="0">
+                <a:solidFill>
+                  <a:srgbClr val="FF0000"/>
+                </a:solidFill>
+              </a:rPr>
+              <a:t>k steps</a:t>
+            </a:r>
+          </a:p>
+        </p:txBody>
+      </p:sp>
     </p:spTree>
     <p:extLst>
       <p:ext uri="{BB962C8B-B14F-4D97-AF65-F5344CB8AC3E}">
-        <p14:creationId xmlns:p14="http://schemas.microsoft.com/office/powerpoint/2010/main" val="713579245"/>
+        <p14:creationId xmlns:p14="http://schemas.microsoft.com/office/powerpoint/2010/main" val="3924658005"/>
       </p:ext>
     </p:extLst>
   </p:cSld>
@@ -12722,13 +14363,13 @@
           </p:nvPr>
         </p:nvPicPr>
         <p:blipFill>
-          <a:blip r:embed="rId2">
+          <a:blip r:embed="rId3">
             <a:extLst>
               <a:ext uri="{28A0092B-C50C-407E-A947-70E740481C1C}">
                 <a14:useLocalDpi xmlns:a14="http://schemas.microsoft.com/office/drawing/2010/main" val="0"/>
               </a:ext>
               <a:ext uri="{96DAC541-7B7A-43D3-8B79-37D633B846F1}">
-                <asvg:svgBlip xmlns:asvg="http://schemas.microsoft.com/office/drawing/2016/SVG/main" r:embed="rId3"/>
+                <asvg:svgBlip xmlns:asvg="http://schemas.microsoft.com/office/drawing/2016/SVG/main" r:embed="rId4"/>
               </a:ext>
             </a:extLst>
           </a:blip>
@@ -12777,7 +14418,7 @@
             <a:pPr algn="ctr"/>
             <a:r>
               <a:rPr lang="en-US" sz="5000" dirty="0"/>
-              <a:t>Probability of State change</a:t>
+              <a:t>Infinite State change</a:t>
             </a:r>
             <a:endParaRPr lang="en-US" sz="5000" kern="1200" dirty="0">
               <a:solidFill>
@@ -12918,10 +14559,10 @@
       </p:sp>
       <p:pic>
         <p:nvPicPr>
-          <p:cNvPr id="10" name="Picture 9">
-            <a:extLst>
-              <a:ext uri="{FF2B5EF4-FFF2-40B4-BE49-F238E27FC236}">
-                <a16:creationId xmlns:a16="http://schemas.microsoft.com/office/drawing/2014/main" id="{3C69FA36-1F89-4934-8185-252156F16280}"/>
+          <p:cNvPr id="12" name="Picture 11">
+            <a:extLst>
+              <a:ext uri="{FF2B5EF4-FFF2-40B4-BE49-F238E27FC236}">
+                <a16:creationId xmlns:a16="http://schemas.microsoft.com/office/drawing/2014/main" id="{97D501FF-BDD6-4B5A-AB25-7F40E129DDB1}"/>
               </a:ext>
             </a:extLst>
           </p:cNvPr>
@@ -12931,155 +14572,25 @@
           <p:nvPr/>
         </p:nvPicPr>
         <p:blipFill>
-          <a:blip r:embed="rId4"/>
+          <a:blip r:embed="rId5"/>
           <a:stretch>
             <a:fillRect/>
           </a:stretch>
         </p:blipFill>
         <p:spPr>
           <a:xfrm>
-            <a:off x="1483131" y="3803724"/>
-            <a:ext cx="9629775" cy="714375"/>
+            <a:off x="1826359" y="3809445"/>
+            <a:ext cx="8562975" cy="723900"/>
           </a:xfrm>
           <a:prstGeom prst="rect">
             <a:avLst/>
           </a:prstGeom>
         </p:spPr>
       </p:pic>
-      <p:sp>
-        <p:nvSpPr>
-          <p:cNvPr id="14" name="TextBox 13">
-            <a:extLst>
-              <a:ext uri="{FF2B5EF4-FFF2-40B4-BE49-F238E27FC236}">
-                <a16:creationId xmlns:a16="http://schemas.microsoft.com/office/drawing/2014/main" id="{043C79A1-3B38-4867-A5F1-1A6716FF29DF}"/>
-              </a:ext>
-            </a:extLst>
-          </p:cNvPr>
-          <p:cNvSpPr txBox="1"/>
-          <p:nvPr/>
-        </p:nvSpPr>
-        <p:spPr>
-          <a:xfrm>
-            <a:off x="6772940" y="3791579"/>
-            <a:ext cx="770339" cy="369332"/>
-          </a:xfrm>
-          <a:prstGeom prst="rect">
-            <a:avLst/>
-          </a:prstGeom>
-          <a:noFill/>
-        </p:spPr>
-        <p:txBody>
-          <a:bodyPr wrap="none" rtlCol="0">
-            <a:spAutoFit/>
-          </a:bodyPr>
-          <a:lstStyle/>
-          <a:p>
-            <a:r>
-              <a:rPr lang="en-US" dirty="0">
-                <a:solidFill>
-                  <a:srgbClr val="FF0000"/>
-                </a:solidFill>
-              </a:rPr>
-              <a:t>State j</a:t>
-            </a:r>
-          </a:p>
-        </p:txBody>
-      </p:sp>
-      <p:sp>
-        <p:nvSpPr>
-          <p:cNvPr id="16" name="TextBox 15">
-            <a:extLst>
-              <a:ext uri="{FF2B5EF4-FFF2-40B4-BE49-F238E27FC236}">
-                <a16:creationId xmlns:a16="http://schemas.microsoft.com/office/drawing/2014/main" id="{EA08A5BC-E6C9-471E-BA2C-980B57AC91C7}"/>
-              </a:ext>
-            </a:extLst>
-          </p:cNvPr>
-          <p:cNvSpPr txBox="1"/>
-          <p:nvPr/>
-        </p:nvSpPr>
-        <p:spPr>
-          <a:xfrm>
-            <a:off x="9189983" y="3803724"/>
-            <a:ext cx="768737" cy="369332"/>
-          </a:xfrm>
-          <a:prstGeom prst="rect">
-            <a:avLst/>
-          </a:prstGeom>
-          <a:noFill/>
-        </p:spPr>
-        <p:txBody>
-          <a:bodyPr wrap="none" rtlCol="0">
-            <a:spAutoFit/>
-          </a:bodyPr>
-          <a:lstStyle/>
-          <a:p>
-            <a:r>
-              <a:rPr lang="en-US" dirty="0">
-                <a:solidFill>
-                  <a:srgbClr val="FF0000"/>
-                </a:solidFill>
-              </a:rPr>
-              <a:t>State </a:t>
-            </a:r>
-            <a:r>
-              <a:rPr lang="en-US" dirty="0" err="1">
-                <a:solidFill>
-                  <a:srgbClr val="FF0000"/>
-                </a:solidFill>
-              </a:rPr>
-              <a:t>i</a:t>
-            </a:r>
-            <a:endParaRPr lang="en-US" dirty="0">
-              <a:solidFill>
-                <a:srgbClr val="FF0000"/>
-              </a:solidFill>
-            </a:endParaRPr>
-          </a:p>
-        </p:txBody>
-      </p:sp>
-      <p:sp>
-        <p:nvSpPr>
-          <p:cNvPr id="17" name="TextBox 16">
-            <a:extLst>
-              <a:ext uri="{FF2B5EF4-FFF2-40B4-BE49-F238E27FC236}">
-                <a16:creationId xmlns:a16="http://schemas.microsoft.com/office/drawing/2014/main" id="{AE080991-D627-4E71-8643-B4DDF1CD8C46}"/>
-              </a:ext>
-            </a:extLst>
-          </p:cNvPr>
-          <p:cNvSpPr txBox="1"/>
-          <p:nvPr/>
-        </p:nvSpPr>
-        <p:spPr>
-          <a:xfrm>
-            <a:off x="2504881" y="4102524"/>
-            <a:ext cx="829266" cy="369332"/>
-          </a:xfrm>
-          <a:prstGeom prst="rect">
-            <a:avLst/>
-          </a:prstGeom>
-          <a:noFill/>
-        </p:spPr>
-        <p:txBody>
-          <a:bodyPr wrap="none" rtlCol="0">
-            <a:spAutoFit/>
-          </a:bodyPr>
-          <a:lstStyle/>
-          <a:p>
-            <a:r>
-              <a:rPr lang="en-US" dirty="0">
-                <a:solidFill>
-                  <a:srgbClr val="FF0000"/>
-                </a:solidFill>
-              </a:rPr>
-              <a:t>k steps</a:t>
-            </a:r>
-          </a:p>
-        </p:txBody>
-      </p:sp>
     </p:spTree>
     <p:extLst>
       <p:ext uri="{BB962C8B-B14F-4D97-AF65-F5344CB8AC3E}">
-        <p14:creationId xmlns:p14="http://schemas.microsoft.com/office/powerpoint/2010/main" val="3924658005"/>
+        <p14:creationId xmlns:p14="http://schemas.microsoft.com/office/powerpoint/2010/main" val="698715463"/>
       </p:ext>
     </p:extLst>
   </p:cSld>
@@ -13114,21 +14625,21 @@
           <a:chExt cx="0" cy="0"/>
         </a:xfrm>
       </p:grpSpPr>
-      <p:sp useBgFill="1">
-        <p:nvSpPr>
-          <p:cNvPr id="9" name="Rectangle 8">
-            <a:extLst>
-              <a:ext uri="{FF2B5EF4-FFF2-40B4-BE49-F238E27FC236}">
-                <a16:creationId xmlns:a16="http://schemas.microsoft.com/office/drawing/2014/main" id="{D17A94B4-8121-4ED6-AB0D-69EE9A6332E6}"/>
+      <p:cxnSp>
+        <p:nvCxnSpPr>
+          <p:cNvPr id="9" name="Straight Connector 8">
+            <a:extLst>
+              <a:ext uri="{FF2B5EF4-FFF2-40B4-BE49-F238E27FC236}">
+                <a16:creationId xmlns:a16="http://schemas.microsoft.com/office/drawing/2014/main" id="{D2E961F1-4A28-4A5F-BBD4-6E400E5E6C75}"/>
               </a:ext>
               <a:ext uri="{C183D7F6-B498-43B3-948B-1728B52AA6E4}">
                 <adec:decorative xmlns:adec="http://schemas.microsoft.com/office/drawing/2017/decorative" val="1"/>
               </a:ext>
             </a:extLst>
           </p:cNvPr>
-          <p:cNvSpPr>
-            <a:spLocks noGrp="1" noRot="1" noChangeAspect="1" noMove="1" noResize="1" noEditPoints="1" noAdjustHandles="1" noChangeArrowheads="1" noChangeShapeType="1" noTextEdit="1"/>
-          </p:cNvSpPr>
+          <p:cNvCxnSpPr>
+            <a:cxnSpLocks noGrp="1" noRot="1" noChangeAspect="1" noMove="1" noResize="1" noEditPoints="1" noAdjustHandles="1" noChangeArrowheads="1" noChangeShapeType="1"/>
+          </p:cNvCxnSpPr>
           <p:nvPr>
             <p:extLst>
               <p:ext uri="{386F3935-93C4-4BCD-93E2-E3B085C9AB24}">
@@ -13136,59 +14647,54 @@
               </p:ext>
             </p:extLst>
           </p:nvPr>
-        </p:nvSpPr>
-        <p:spPr>
+        </p:nvCxnSpPr>
+        <p:spPr bwMode="white">
           <a:xfrm>
-            <a:off x="-1" y="0"/>
-            <a:ext cx="12188952" cy="6858000"/>
+            <a:off x="0" y="272357"/>
+            <a:ext cx="12188824" cy="0"/>
           </a:xfrm>
-          <a:prstGeom prst="rect">
+          <a:prstGeom prst="line">
             <a:avLst/>
           </a:prstGeom>
-          <a:ln>
-            <a:noFill/>
+          <a:ln w="50800">
+            <a:solidFill>
+              <a:schemeClr val="tx1">
+                <a:lumMod val="75000"/>
+                <a:lumOff val="25000"/>
+              </a:schemeClr>
+            </a:solidFill>
           </a:ln>
         </p:spPr>
         <p:style>
-          <a:lnRef idx="2">
-            <a:schemeClr val="accent1">
-              <a:shade val="50000"/>
-            </a:schemeClr>
+          <a:lnRef idx="1">
+            <a:schemeClr val="accent1"/>
           </a:lnRef>
-          <a:fillRef idx="1">
+          <a:fillRef idx="0">
             <a:schemeClr val="accent1"/>
           </a:fillRef>
           <a:effectRef idx="0">
             <a:schemeClr val="accent1"/>
           </a:effectRef>
           <a:fontRef idx="minor">
-            <a:schemeClr val="lt1"/>
+            <a:schemeClr val="tx1"/>
           </a:fontRef>
         </p:style>
-        <p:txBody>
-          <a:bodyPr rtlCol="0" anchor="ctr"/>
-          <a:lstStyle/>
-          <a:p>
-            <a:pPr algn="ctr"/>
-            <a:endParaRPr lang="en-US"/>
-          </a:p>
-        </p:txBody>
-      </p:sp>
-      <p:pic>
-        <p:nvPicPr>
-          <p:cNvPr id="11" name="Graphic 10">
-            <a:extLst>
-              <a:ext uri="{FF2B5EF4-FFF2-40B4-BE49-F238E27FC236}">
-                <a16:creationId xmlns:a16="http://schemas.microsoft.com/office/drawing/2014/main" id="{4741521E-DC76-41B9-8A47-448CD4F9FA46}"/>
+      </p:cxnSp>
+      <p:sp>
+        <p:nvSpPr>
+          <p:cNvPr id="11" name="Rectangle 10">
+            <a:extLst>
+              <a:ext uri="{FF2B5EF4-FFF2-40B4-BE49-F238E27FC236}">
+                <a16:creationId xmlns:a16="http://schemas.microsoft.com/office/drawing/2014/main" id="{7F57BEA8-497D-4AA8-8A18-BDCD696B25FE}"/>
               </a:ext>
               <a:ext uri="{C183D7F6-B498-43B3-948B-1728B52AA6E4}">
                 <adec:decorative xmlns:adec="http://schemas.microsoft.com/office/drawing/2017/decorative" val="1"/>
               </a:ext>
             </a:extLst>
           </p:cNvPr>
-          <p:cNvPicPr>
-            <a:picLocks noGrp="1" noRot="1" noChangeAspect="1" noMove="1" noResize="1" noEditPoints="1" noAdjustHandles="1" noChangeArrowheads="1" noChangeShapeType="1" noCrop="1"/>
-          </p:cNvPicPr>
+          <p:cNvSpPr>
+            <a:spLocks noGrp="1" noRot="1" noChangeAspect="1" noMove="1" noResize="1" noEditPoints="1" noAdjustHandles="1" noChangeArrowheads="1" noChangeShapeType="1" noTextEdit="1"/>
+          </p:cNvSpPr>
           <p:nvPr>
             <p:extLst>
               <p:ext uri="{386F3935-93C4-4BCD-93E2-E3B085C9AB24}">
@@ -13196,109 +14702,20 @@
               </p:ext>
             </p:extLst>
           </p:nvPr>
-        </p:nvPicPr>
-        <p:blipFill>
-          <a:blip r:embed="rId2">
-            <a:extLst>
-              <a:ext uri="{28A0092B-C50C-407E-A947-70E740481C1C}">
-                <a14:useLocalDpi xmlns:a14="http://schemas.microsoft.com/office/drawing/2010/main" val="0"/>
-              </a:ext>
-              <a:ext uri="{96DAC541-7B7A-43D3-8B79-37D633B846F1}">
-                <asvg:svgBlip xmlns:asvg="http://schemas.microsoft.com/office/drawing/2016/SVG/main" r:embed="rId3"/>
-              </a:ext>
-            </a:extLst>
-          </a:blip>
-          <a:stretch>
-            <a:fillRect/>
-          </a:stretch>
-        </p:blipFill>
-        <p:spPr>
-          <a:xfrm rot="5400000">
-            <a:off x="3372661" y="-3359290"/>
-            <a:ext cx="5470372" cy="12188952"/>
-          </a:xfrm>
-          <a:prstGeom prst="rect">
-            <a:avLst/>
-          </a:prstGeom>
-        </p:spPr>
-      </p:pic>
-      <p:sp>
-        <p:nvSpPr>
-          <p:cNvPr id="2" name="Title 1">
-            <a:extLst>
-              <a:ext uri="{FF2B5EF4-FFF2-40B4-BE49-F238E27FC236}">
-                <a16:creationId xmlns:a16="http://schemas.microsoft.com/office/drawing/2014/main" id="{E2A30878-7531-452D-9EE5-AC3CB34AE565}"/>
-              </a:ext>
-            </a:extLst>
-          </p:cNvPr>
-          <p:cNvSpPr>
-            <a:spLocks noGrp="1"/>
-          </p:cNvSpPr>
-          <p:nvPr>
-            <p:ph type="title"/>
-          </p:nvPr>
         </p:nvSpPr>
         <p:spPr>
           <a:xfrm>
-            <a:off x="1403632" y="184336"/>
-            <a:ext cx="9283781" cy="1405965"/>
-          </a:xfrm>
-        </p:spPr>
-        <p:txBody>
-          <a:bodyPr vert="horz" lIns="91440" tIns="45720" rIns="91440" bIns="45720" rtlCol="0" anchor="b">
-            <a:normAutofit/>
-          </a:bodyPr>
-          <a:lstStyle/>
-          <a:p>
-            <a:pPr algn="ctr"/>
-            <a:r>
-              <a:rPr lang="en-US" sz="5000" dirty="0"/>
-              <a:t>Infinite State change</a:t>
-            </a:r>
-            <a:endParaRPr lang="en-US" sz="5000" kern="1200" dirty="0">
-              <a:solidFill>
-                <a:schemeClr val="tx1"/>
-              </a:solidFill>
-              <a:latin typeface="+mj-lt"/>
-              <a:ea typeface="+mj-ea"/>
-              <a:cs typeface="+mj-cs"/>
-            </a:endParaRPr>
-          </a:p>
-        </p:txBody>
-      </p:sp>
-      <p:sp>
-        <p:nvSpPr>
-          <p:cNvPr id="13" name="Rectangle 12">
-            <a:extLst>
-              <a:ext uri="{FF2B5EF4-FFF2-40B4-BE49-F238E27FC236}">
-                <a16:creationId xmlns:a16="http://schemas.microsoft.com/office/drawing/2014/main" id="{53FD85F6-ECDC-4124-9916-6444E142C663}"/>
-              </a:ext>
-              <a:ext uri="{C183D7F6-B498-43B3-948B-1728B52AA6E4}">
-                <adec:decorative xmlns:adec="http://schemas.microsoft.com/office/drawing/2017/decorative" val="1"/>
-              </a:ext>
-            </a:extLst>
-          </p:cNvPr>
-          <p:cNvSpPr>
-            <a:spLocks noGrp="1" noRot="1" noChangeAspect="1" noMove="1" noResize="1" noEditPoints="1" noAdjustHandles="1" noChangeArrowheads="1" noChangeShapeType="1" noTextEdit="1"/>
-          </p:cNvSpPr>
-          <p:nvPr>
-            <p:extLst>
-              <p:ext uri="{386F3935-93C4-4BCD-93E2-E3B085C9AB24}">
-                <p16:designElem xmlns:p16="http://schemas.microsoft.com/office/powerpoint/2015/main" val="1"/>
-              </p:ext>
-            </p:extLst>
-          </p:nvPr>
-        </p:nvSpPr>
-        <p:spPr>
-          <a:xfrm>
-            <a:off x="-1078" y="685797"/>
-            <a:ext cx="118872" cy="1550455"/>
+            <a:off x="0" y="368596"/>
+            <a:ext cx="12192000" cy="1735555"/>
           </a:xfrm>
           <a:prstGeom prst="rect">
             <a:avLst/>
           </a:prstGeom>
           <a:solidFill>
-            <a:schemeClr val="accent2"/>
+            <a:schemeClr val="tx1">
+              <a:lumMod val="75000"/>
+              <a:lumOff val="25000"/>
+            </a:schemeClr>
           </a:solidFill>
           <a:ln>
             <a:noFill/>
@@ -13331,19 +14748,62 @@
       </p:sp>
       <p:sp>
         <p:nvSpPr>
-          <p:cNvPr id="15" name="Rectangle 14">
-            <a:extLst>
-              <a:ext uri="{FF2B5EF4-FFF2-40B4-BE49-F238E27FC236}">
-                <a16:creationId xmlns:a16="http://schemas.microsoft.com/office/drawing/2014/main" id="{FB5D26B4-74AD-4118-8F13-7051DA3BFA87}"/>
+          <p:cNvPr id="2" name="Title 1">
+            <a:extLst>
+              <a:ext uri="{FF2B5EF4-FFF2-40B4-BE49-F238E27FC236}">
+                <a16:creationId xmlns:a16="http://schemas.microsoft.com/office/drawing/2014/main" id="{7E3F400C-8895-434A-8D30-FF206CC53F01}"/>
+              </a:ext>
+            </a:extLst>
+          </p:cNvPr>
+          <p:cNvSpPr>
+            <a:spLocks noGrp="1"/>
+          </p:cNvSpPr>
+          <p:nvPr>
+            <p:ph type="title"/>
+          </p:nvPr>
+        </p:nvSpPr>
+        <p:spPr>
+          <a:xfrm>
+            <a:off x="526073" y="489439"/>
+            <a:ext cx="11139854" cy="930447"/>
+          </a:xfrm>
+        </p:spPr>
+        <p:txBody>
+          <a:bodyPr vert="horz" lIns="91440" tIns="45720" rIns="91440" bIns="45720" rtlCol="0" anchor="b">
+            <a:normAutofit/>
+          </a:bodyPr>
+          <a:lstStyle/>
+          <a:p>
+            <a:pPr algn="ctr"/>
+            <a:r>
+              <a:rPr lang="en-US" sz="5400" kern="1200" dirty="0">
+                <a:solidFill>
+                  <a:schemeClr val="bg1"/>
+                </a:solidFill>
+                <a:latin typeface="+mj-lt"/>
+                <a:ea typeface="+mj-ea"/>
+                <a:cs typeface="+mj-cs"/>
+              </a:rPr>
+              <a:t>Determinant Invertibility Test</a:t>
+            </a:r>
+          </a:p>
+        </p:txBody>
+      </p:sp>
+      <p:cxnSp>
+        <p:nvCxnSpPr>
+          <p:cNvPr id="13" name="Straight Connector 12">
+            <a:extLst>
+              <a:ext uri="{FF2B5EF4-FFF2-40B4-BE49-F238E27FC236}">
+                <a16:creationId xmlns:a16="http://schemas.microsoft.com/office/drawing/2014/main" id="{A82415D3-DDE5-4D63-8CB3-23A5EC581B27}"/>
               </a:ext>
               <a:ext uri="{C183D7F6-B498-43B3-948B-1728B52AA6E4}">
                 <adec:decorative xmlns:adec="http://schemas.microsoft.com/office/drawing/2017/decorative" val="1"/>
               </a:ext>
             </a:extLst>
           </p:cNvPr>
-          <p:cNvSpPr>
-            <a:spLocks noGrp="1" noRot="1" noChangeAspect="1" noMove="1" noResize="1" noEditPoints="1" noAdjustHandles="1" noChangeArrowheads="1" noChangeShapeType="1" noTextEdit="1"/>
-          </p:cNvSpPr>
+          <p:cNvCxnSpPr>
+            <a:cxnSpLocks noGrp="1" noRot="1" noChangeAspect="1" noMove="1" noResize="1" noEditPoints="1" noAdjustHandles="1" noChangeArrowheads="1" noChangeShapeType="1"/>
+          </p:cNvCxnSpPr>
           <p:nvPr>
             <p:extLst>
               <p:ext uri="{386F3935-93C4-4BCD-93E2-E3B085C9AB24}">
@@ -13351,53 +14811,129 @@
               </p:ext>
             </p:extLst>
           </p:nvPr>
-        </p:nvSpPr>
+        </p:nvCxnSpPr>
         <p:spPr>
           <a:xfrm>
-            <a:off x="12073128" y="6172201"/>
-            <a:ext cx="118872" cy="685800"/>
+            <a:off x="4724400" y="1479733"/>
+            <a:ext cx="2743200" cy="0"/>
+          </a:xfrm>
+          <a:prstGeom prst="line">
+            <a:avLst/>
+          </a:prstGeom>
+          <a:ln w="19050">
+            <a:solidFill>
+              <a:schemeClr val="bg1">
+                <a:alpha val="75000"/>
+              </a:schemeClr>
+            </a:solidFill>
+          </a:ln>
+        </p:spPr>
+        <p:style>
+          <a:lnRef idx="1">
+            <a:schemeClr val="accent1"/>
+          </a:lnRef>
+          <a:fillRef idx="0">
+            <a:schemeClr val="accent1"/>
+          </a:fillRef>
+          <a:effectRef idx="0">
+            <a:schemeClr val="accent1"/>
+          </a:effectRef>
+          <a:fontRef idx="minor">
+            <a:schemeClr val="tx1"/>
+          </a:fontRef>
+        </p:style>
+      </p:cxnSp>
+      <p:cxnSp>
+        <p:nvCxnSpPr>
+          <p:cNvPr id="15" name="Straight Connector 14">
+            <a:extLst>
+              <a:ext uri="{FF2B5EF4-FFF2-40B4-BE49-F238E27FC236}">
+                <a16:creationId xmlns:a16="http://schemas.microsoft.com/office/drawing/2014/main" id="{AD7193FB-6AE6-4B3B-8F89-56B55DD63B4D}"/>
+              </a:ext>
+              <a:ext uri="{C183D7F6-B498-43B3-948B-1728B52AA6E4}">
+                <adec:decorative xmlns:adec="http://schemas.microsoft.com/office/drawing/2017/decorative" val="1"/>
+              </a:ext>
+            </a:extLst>
+          </p:cNvPr>
+          <p:cNvCxnSpPr>
+            <a:cxnSpLocks noGrp="1" noRot="1" noChangeAspect="1" noMove="1" noResize="1" noEditPoints="1" noAdjustHandles="1" noChangeArrowheads="1" noChangeShapeType="1"/>
+          </p:cNvCxnSpPr>
+          <p:nvPr>
+            <p:extLst>
+              <p:ext uri="{386F3935-93C4-4BCD-93E2-E3B085C9AB24}">
+                <p16:designElem xmlns:p16="http://schemas.microsoft.com/office/powerpoint/2015/main" val="1"/>
+              </p:ext>
+            </p:extLst>
+          </p:nvPr>
+        </p:nvCxnSpPr>
+        <p:spPr bwMode="white">
+          <a:xfrm>
+            <a:off x="0" y="2201402"/>
+            <a:ext cx="12188824" cy="0"/>
+          </a:xfrm>
+          <a:prstGeom prst="line">
+            <a:avLst/>
+          </a:prstGeom>
+          <a:ln w="50800">
+            <a:solidFill>
+              <a:schemeClr val="tx1">
+                <a:lumMod val="75000"/>
+                <a:lumOff val="25000"/>
+              </a:schemeClr>
+            </a:solidFill>
+          </a:ln>
+        </p:spPr>
+        <p:style>
+          <a:lnRef idx="1">
+            <a:schemeClr val="accent1"/>
+          </a:lnRef>
+          <a:fillRef idx="0">
+            <a:schemeClr val="accent1"/>
+          </a:fillRef>
+          <a:effectRef idx="0">
+            <a:schemeClr val="accent1"/>
+          </a:effectRef>
+          <a:fontRef idx="minor">
+            <a:schemeClr val="tx1"/>
+          </a:fontRef>
+        </p:style>
+      </p:cxnSp>
+      <p:pic>
+        <p:nvPicPr>
+          <p:cNvPr id="4" name="Picture 3">
+            <a:extLst>
+              <a:ext uri="{FF2B5EF4-FFF2-40B4-BE49-F238E27FC236}">
+                <a16:creationId xmlns:a16="http://schemas.microsoft.com/office/drawing/2014/main" id="{67363577-34DB-4E92-84EE-E901E4279454}"/>
+              </a:ext>
+            </a:extLst>
+          </p:cNvPr>
+          <p:cNvPicPr>
+            <a:picLocks noChangeAspect="1"/>
+          </p:cNvPicPr>
+          <p:nvPr/>
+        </p:nvPicPr>
+        <p:blipFill>
+          <a:blip r:embed="rId3"/>
+          <a:stretch>
+            <a:fillRect/>
+          </a:stretch>
+        </p:blipFill>
+        <p:spPr>
+          <a:xfrm>
+            <a:off x="526073" y="2681707"/>
+            <a:ext cx="11496821" cy="1494586"/>
           </a:xfrm>
           <a:prstGeom prst="rect">
             <a:avLst/>
           </a:prstGeom>
-          <a:solidFill>
-            <a:schemeClr val="accent2"/>
-          </a:solidFill>
-          <a:ln>
-            <a:noFill/>
-          </a:ln>
         </p:spPr>
-        <p:style>
-          <a:lnRef idx="2">
-            <a:schemeClr val="accent1">
-              <a:shade val="50000"/>
-            </a:schemeClr>
-          </a:lnRef>
-          <a:fillRef idx="1">
-            <a:schemeClr val="accent1"/>
-          </a:fillRef>
-          <a:effectRef idx="0">
-            <a:schemeClr val="accent1"/>
-          </a:effectRef>
-          <a:fontRef idx="minor">
-            <a:schemeClr val="lt1"/>
-          </a:fontRef>
-        </p:style>
-        <p:txBody>
-          <a:bodyPr rtlCol="0" anchor="ctr"/>
-          <a:lstStyle/>
-          <a:p>
-            <a:pPr algn="ctr"/>
-            <a:endParaRPr lang="en-US"/>
-          </a:p>
-        </p:txBody>
-      </p:sp>
+      </p:pic>
       <p:pic>
         <p:nvPicPr>
-          <p:cNvPr id="12" name="Picture 11">
-            <a:extLst>
-              <a:ext uri="{FF2B5EF4-FFF2-40B4-BE49-F238E27FC236}">
-                <a16:creationId xmlns:a16="http://schemas.microsoft.com/office/drawing/2014/main" id="{97D501FF-BDD6-4B5A-AB25-7F40E129DDB1}"/>
+          <p:cNvPr id="8" name="Picture 7">
+            <a:extLst>
+              <a:ext uri="{FF2B5EF4-FFF2-40B4-BE49-F238E27FC236}">
+                <a16:creationId xmlns:a16="http://schemas.microsoft.com/office/drawing/2014/main" id="{B88F157C-148E-4883-9B2F-44FC88EEFB3C}"/>
               </a:ext>
             </a:extLst>
           </p:cNvPr>
@@ -13414,8 +14950,8 @@
         </p:blipFill>
         <p:spPr>
           <a:xfrm>
-            <a:off x="1826359" y="3809445"/>
-            <a:ext cx="8562975" cy="723900"/>
+            <a:off x="526072" y="4176294"/>
+            <a:ext cx="11139855" cy="1420332"/>
           </a:xfrm>
           <a:prstGeom prst="rect">
             <a:avLst/>
@@ -13425,7 +14961,7 @@
     </p:spTree>
     <p:extLst>
       <p:ext uri="{BB962C8B-B14F-4D97-AF65-F5344CB8AC3E}">
-        <p14:creationId xmlns:p14="http://schemas.microsoft.com/office/powerpoint/2010/main" val="698715463"/>
+        <p14:creationId xmlns:p14="http://schemas.microsoft.com/office/powerpoint/2010/main" val="1728493956"/>
       </p:ext>
     </p:extLst>
   </p:cSld>
@@ -13586,7 +15122,7 @@
           <p:cNvPr id="2" name="Title 1">
             <a:extLst>
               <a:ext uri="{FF2B5EF4-FFF2-40B4-BE49-F238E27FC236}">
-                <a16:creationId xmlns:a16="http://schemas.microsoft.com/office/drawing/2014/main" id="{7E3F400C-8895-434A-8D30-FF206CC53F01}"/>
+                <a16:creationId xmlns:a16="http://schemas.microsoft.com/office/drawing/2014/main" id="{1003F869-A95F-4608-A9DC-20E07D627945}"/>
               </a:ext>
             </a:extLst>
           </p:cNvPr>
@@ -13619,7 +15155,7 @@
                 <a:ea typeface="+mj-ea"/>
                 <a:cs typeface="+mj-cs"/>
               </a:rPr>
-              <a:t>Determinant Invertibility Test</a:t>
+              <a:t>Eigenvalue and Eigenvectors</a:t>
             </a:r>
           </a:p>
         </p:txBody>
@@ -13738,7 +15274,7 @@
           <p:cNvPr id="4" name="Picture 3">
             <a:extLst>
               <a:ext uri="{FF2B5EF4-FFF2-40B4-BE49-F238E27FC236}">
-                <a16:creationId xmlns:a16="http://schemas.microsoft.com/office/drawing/2014/main" id="{67363577-34DB-4E92-84EE-E901E4279454}"/>
+                <a16:creationId xmlns:a16="http://schemas.microsoft.com/office/drawing/2014/main" id="{99B82CFC-FACE-49C4-A77E-36F8697C3565}"/>
               </a:ext>
             </a:extLst>
           </p:cNvPr>
@@ -13755,8 +15291,8 @@
         </p:blipFill>
         <p:spPr>
           <a:xfrm>
-            <a:off x="526073" y="2681707"/>
-            <a:ext cx="11496821" cy="1494586"/>
+            <a:off x="346001" y="2437399"/>
+            <a:ext cx="11496821" cy="1983202"/>
           </a:xfrm>
           <a:prstGeom prst="rect">
             <a:avLst/>
@@ -13765,10 +15301,10 @@
       </p:pic>
       <p:pic>
         <p:nvPicPr>
-          <p:cNvPr id="8" name="Picture 7">
-            <a:extLst>
-              <a:ext uri="{FF2B5EF4-FFF2-40B4-BE49-F238E27FC236}">
-                <a16:creationId xmlns:a16="http://schemas.microsoft.com/office/drawing/2014/main" id="{B88F157C-148E-4883-9B2F-44FC88EEFB3C}"/>
+          <p:cNvPr id="6" name="Picture 5">
+            <a:extLst>
+              <a:ext uri="{FF2B5EF4-FFF2-40B4-BE49-F238E27FC236}">
+                <a16:creationId xmlns:a16="http://schemas.microsoft.com/office/drawing/2014/main" id="{16C7B570-3C5D-4F25-B1DD-889C049A8650}"/>
               </a:ext>
             </a:extLst>
           </p:cNvPr>
@@ -13785,8 +15321,8 @@
         </p:blipFill>
         <p:spPr>
           <a:xfrm>
-            <a:off x="526072" y="4176294"/>
-            <a:ext cx="11139855" cy="1420332"/>
+            <a:off x="437625" y="4550012"/>
+            <a:ext cx="11316749" cy="1988385"/>
           </a:xfrm>
           <a:prstGeom prst="rect">
             <a:avLst/>
@@ -13796,7 +15332,7 @@
     </p:spTree>
     <p:extLst>
       <p:ext uri="{BB962C8B-B14F-4D97-AF65-F5344CB8AC3E}">
-        <p14:creationId xmlns:p14="http://schemas.microsoft.com/office/powerpoint/2010/main" val="1728493956"/>
+        <p14:creationId xmlns:p14="http://schemas.microsoft.com/office/powerpoint/2010/main" val="3826916255"/>
       </p:ext>
     </p:extLst>
   </p:cSld>
@@ -13957,7 +15493,7 @@
           <p:cNvPr id="2" name="Title 1">
             <a:extLst>
               <a:ext uri="{FF2B5EF4-FFF2-40B4-BE49-F238E27FC236}">
-                <a16:creationId xmlns:a16="http://schemas.microsoft.com/office/drawing/2014/main" id="{1003F869-A95F-4608-A9DC-20E07D627945}"/>
+                <a16:creationId xmlns:a16="http://schemas.microsoft.com/office/drawing/2014/main" id="{00B64DEF-7056-4013-B7B8-7EB06E3FFE23}"/>
               </a:ext>
             </a:extLst>
           </p:cNvPr>
@@ -13990,7 +15526,7 @@
                 <a:ea typeface="+mj-ea"/>
                 <a:cs typeface="+mj-cs"/>
               </a:rPr>
-              <a:t>Eigenvalue and Eigenvectors</a:t>
+              <a:t>Rule For Eigenvalue</a:t>
             </a:r>
           </a:p>
         </p:txBody>
@@ -14109,7 +15645,7 @@
           <p:cNvPr id="4" name="Picture 3">
             <a:extLst>
               <a:ext uri="{FF2B5EF4-FFF2-40B4-BE49-F238E27FC236}">
-                <a16:creationId xmlns:a16="http://schemas.microsoft.com/office/drawing/2014/main" id="{99B82CFC-FACE-49C4-A77E-36F8697C3565}"/>
+                <a16:creationId xmlns:a16="http://schemas.microsoft.com/office/drawing/2014/main" id="{D61DBCCB-9568-4F1B-9183-1E109200B6B7}"/>
               </a:ext>
             </a:extLst>
           </p:cNvPr>
@@ -14126,38 +15662,8 @@
         </p:blipFill>
         <p:spPr>
           <a:xfrm>
-            <a:off x="346001" y="2437399"/>
-            <a:ext cx="11496821" cy="1983202"/>
-          </a:xfrm>
-          <a:prstGeom prst="rect">
-            <a:avLst/>
-          </a:prstGeom>
-        </p:spPr>
-      </p:pic>
-      <p:pic>
-        <p:nvPicPr>
-          <p:cNvPr id="6" name="Picture 5">
-            <a:extLst>
-              <a:ext uri="{FF2B5EF4-FFF2-40B4-BE49-F238E27FC236}">
-                <a16:creationId xmlns:a16="http://schemas.microsoft.com/office/drawing/2014/main" id="{16C7B570-3C5D-4F25-B1DD-889C049A8650}"/>
-              </a:ext>
-            </a:extLst>
-          </p:cNvPr>
-          <p:cNvPicPr>
-            <a:picLocks noChangeAspect="1"/>
-          </p:cNvPicPr>
-          <p:nvPr/>
-        </p:nvPicPr>
-        <p:blipFill>
-          <a:blip r:embed="rId4"/>
-          <a:stretch>
-            <a:fillRect/>
-          </a:stretch>
-        </p:blipFill>
-        <p:spPr>
-          <a:xfrm>
-            <a:off x="437625" y="4550012"/>
-            <a:ext cx="11316749" cy="1988385"/>
+            <a:off x="346001" y="2298654"/>
+            <a:ext cx="11496821" cy="2816720"/>
           </a:xfrm>
           <a:prstGeom prst="rect">
             <a:avLst/>
@@ -14167,7 +15673,7 @@
     </p:spTree>
     <p:extLst>
       <p:ext uri="{BB962C8B-B14F-4D97-AF65-F5344CB8AC3E}">
-        <p14:creationId xmlns:p14="http://schemas.microsoft.com/office/powerpoint/2010/main" val="3826916255"/>
+        <p14:creationId xmlns:p14="http://schemas.microsoft.com/office/powerpoint/2010/main" val="1300920002"/>
       </p:ext>
     </p:extLst>
   </p:cSld>
@@ -14204,7 +15710,7 @@
       </p:grpSpPr>
       <p:cxnSp>
         <p:nvCxnSpPr>
-          <p:cNvPr id="9" name="Straight Connector 8">
+          <p:cNvPr id="8" name="Straight Connector 7">
             <a:extLst>
               <a:ext uri="{FF2B5EF4-FFF2-40B4-BE49-F238E27FC236}">
                 <a16:creationId xmlns:a16="http://schemas.microsoft.com/office/drawing/2014/main" id="{D2E961F1-4A28-4A5F-BBD4-6E400E5E6C75}"/>
@@ -14259,7 +15765,7 @@
       </p:cxnSp>
       <p:sp>
         <p:nvSpPr>
-          <p:cNvPr id="11" name="Rectangle 10">
+          <p:cNvPr id="10" name="Rectangle 9">
             <a:extLst>
               <a:ext uri="{FF2B5EF4-FFF2-40B4-BE49-F238E27FC236}">
                 <a16:creationId xmlns:a16="http://schemas.microsoft.com/office/drawing/2014/main" id="{7F57BEA8-497D-4AA8-8A18-BDCD696B25FE}"/>
@@ -14328,7 +15834,7 @@
           <p:cNvPr id="2" name="Title 1">
             <a:extLst>
               <a:ext uri="{FF2B5EF4-FFF2-40B4-BE49-F238E27FC236}">
-                <a16:creationId xmlns:a16="http://schemas.microsoft.com/office/drawing/2014/main" id="{00B64DEF-7056-4013-B7B8-7EB06E3FFE23}"/>
+                <a16:creationId xmlns:a16="http://schemas.microsoft.com/office/drawing/2014/main" id="{2472C947-0BE8-4C8A-A6B3-34AD6FEFCC80}"/>
               </a:ext>
             </a:extLst>
           </p:cNvPr>
@@ -14361,14 +15867,14 @@
                 <a:ea typeface="+mj-ea"/>
                 <a:cs typeface="+mj-cs"/>
               </a:rPr>
-              <a:t>Rule For Eigenvalue</a:t>
+              <a:t>Finding Eigenvalues</a:t>
             </a:r>
           </a:p>
         </p:txBody>
       </p:sp>
       <p:cxnSp>
         <p:nvCxnSpPr>
-          <p:cNvPr id="13" name="Straight Connector 12">
+          <p:cNvPr id="12" name="Straight Connector 11">
             <a:extLst>
               <a:ext uri="{FF2B5EF4-FFF2-40B4-BE49-F238E27FC236}">
                 <a16:creationId xmlns:a16="http://schemas.microsoft.com/office/drawing/2014/main" id="{A82415D3-DDE5-4D63-8CB3-23A5EC581B27}"/>
@@ -14422,7 +15928,7 @@
       </p:cxnSp>
       <p:cxnSp>
         <p:nvCxnSpPr>
-          <p:cNvPr id="15" name="Straight Connector 14">
+          <p:cNvPr id="14" name="Straight Connector 13">
             <a:extLst>
               <a:ext uri="{FF2B5EF4-FFF2-40B4-BE49-F238E27FC236}">
                 <a16:creationId xmlns:a16="http://schemas.microsoft.com/office/drawing/2014/main" id="{AD7193FB-6AE6-4B3B-8F89-56B55DD63B4D}"/>
@@ -14477,10 +15983,10 @@
       </p:cxnSp>
       <p:pic>
         <p:nvPicPr>
-          <p:cNvPr id="4" name="Picture 3">
-            <a:extLst>
-              <a:ext uri="{FF2B5EF4-FFF2-40B4-BE49-F238E27FC236}">
-                <a16:creationId xmlns:a16="http://schemas.microsoft.com/office/drawing/2014/main" id="{D61DBCCB-9568-4F1B-9183-1E109200B6B7}"/>
+          <p:cNvPr id="3" name="Picture 2">
+            <a:extLst>
+              <a:ext uri="{FF2B5EF4-FFF2-40B4-BE49-F238E27FC236}">
+                <a16:creationId xmlns:a16="http://schemas.microsoft.com/office/drawing/2014/main" id="{161BDCA6-0B65-47C2-A345-ED5DBF96A124}"/>
               </a:ext>
             </a:extLst>
           </p:cNvPr>
@@ -14497,8 +16003,8 @@
         </p:blipFill>
         <p:spPr>
           <a:xfrm>
-            <a:off x="346001" y="2298654"/>
-            <a:ext cx="11496821" cy="2816720"/>
+            <a:off x="320040" y="3693437"/>
+            <a:ext cx="11496821" cy="1465845"/>
           </a:xfrm>
           <a:prstGeom prst="rect">
             <a:avLst/>
@@ -14508,7 +16014,7 @@
     </p:spTree>
     <p:extLst>
       <p:ext uri="{BB962C8B-B14F-4D97-AF65-F5344CB8AC3E}">
-        <p14:creationId xmlns:p14="http://schemas.microsoft.com/office/powerpoint/2010/main" val="1300920002"/>
+        <p14:creationId xmlns:p14="http://schemas.microsoft.com/office/powerpoint/2010/main" val="238407052"/>
       </p:ext>
     </p:extLst>
   </p:cSld>
@@ -14545,7 +16051,7 @@
       </p:grpSpPr>
       <p:cxnSp>
         <p:nvCxnSpPr>
-          <p:cNvPr id="8" name="Straight Connector 7">
+          <p:cNvPr id="9" name="Straight Connector 8">
             <a:extLst>
               <a:ext uri="{FF2B5EF4-FFF2-40B4-BE49-F238E27FC236}">
                 <a16:creationId xmlns:a16="http://schemas.microsoft.com/office/drawing/2014/main" id="{D2E961F1-4A28-4A5F-BBD4-6E400E5E6C75}"/>
@@ -14600,7 +16106,7 @@
       </p:cxnSp>
       <p:sp>
         <p:nvSpPr>
-          <p:cNvPr id="10" name="Rectangle 9">
+          <p:cNvPr id="11" name="Rectangle 10">
             <a:extLst>
               <a:ext uri="{FF2B5EF4-FFF2-40B4-BE49-F238E27FC236}">
                 <a16:creationId xmlns:a16="http://schemas.microsoft.com/office/drawing/2014/main" id="{7F57BEA8-497D-4AA8-8A18-BDCD696B25FE}"/>
@@ -14669,7 +16175,7 @@
           <p:cNvPr id="2" name="Title 1">
             <a:extLst>
               <a:ext uri="{FF2B5EF4-FFF2-40B4-BE49-F238E27FC236}">
-                <a16:creationId xmlns:a16="http://schemas.microsoft.com/office/drawing/2014/main" id="{2472C947-0BE8-4C8A-A6B3-34AD6FEFCC80}"/>
+                <a16:creationId xmlns:a16="http://schemas.microsoft.com/office/drawing/2014/main" id="{86E22EB3-3CE5-4203-93F3-8F613DC9F1E5}"/>
               </a:ext>
             </a:extLst>
           </p:cNvPr>
@@ -14702,14 +16208,14 @@
                 <a:ea typeface="+mj-ea"/>
                 <a:cs typeface="+mj-cs"/>
               </a:rPr>
-              <a:t>Finding Eigenvalues</a:t>
+              <a:t>Complex Number Shortcuts</a:t>
             </a:r>
           </a:p>
         </p:txBody>
       </p:sp>
       <p:cxnSp>
         <p:nvCxnSpPr>
-          <p:cNvPr id="12" name="Straight Connector 11">
+          <p:cNvPr id="13" name="Straight Connector 12">
             <a:extLst>
               <a:ext uri="{FF2B5EF4-FFF2-40B4-BE49-F238E27FC236}">
                 <a16:creationId xmlns:a16="http://schemas.microsoft.com/office/drawing/2014/main" id="{A82415D3-DDE5-4D63-8CB3-23A5EC581B27}"/>
@@ -14763,7 +16269,7 @@
       </p:cxnSp>
       <p:cxnSp>
         <p:nvCxnSpPr>
-          <p:cNvPr id="14" name="Straight Connector 13">
+          <p:cNvPr id="15" name="Straight Connector 14">
             <a:extLst>
               <a:ext uri="{FF2B5EF4-FFF2-40B4-BE49-F238E27FC236}">
                 <a16:creationId xmlns:a16="http://schemas.microsoft.com/office/drawing/2014/main" id="{AD7193FB-6AE6-4B3B-8F89-56B55DD63B4D}"/>
@@ -14818,10 +16324,10 @@
       </p:cxnSp>
       <p:pic>
         <p:nvPicPr>
-          <p:cNvPr id="3" name="Picture 2">
-            <a:extLst>
-              <a:ext uri="{FF2B5EF4-FFF2-40B4-BE49-F238E27FC236}">
-                <a16:creationId xmlns:a16="http://schemas.microsoft.com/office/drawing/2014/main" id="{161BDCA6-0B65-47C2-A345-ED5DBF96A124}"/>
+          <p:cNvPr id="4" name="Picture 3">
+            <a:extLst>
+              <a:ext uri="{FF2B5EF4-FFF2-40B4-BE49-F238E27FC236}">
+                <a16:creationId xmlns:a16="http://schemas.microsoft.com/office/drawing/2014/main" id="{CD2E47CE-515E-4CA0-977F-DCEA1B8EB8E2}"/>
               </a:ext>
             </a:extLst>
           </p:cNvPr>
@@ -14831,15 +16337,15 @@
           <p:nvPr/>
         </p:nvPicPr>
         <p:blipFill>
-          <a:blip r:embed="rId3"/>
+          <a:blip r:embed="rId2"/>
           <a:stretch>
             <a:fillRect/>
           </a:stretch>
         </p:blipFill>
         <p:spPr>
           <a:xfrm>
-            <a:off x="320040" y="3693437"/>
-            <a:ext cx="11496821" cy="1465845"/>
+            <a:off x="320040" y="3650324"/>
+            <a:ext cx="11496821" cy="1552071"/>
           </a:xfrm>
           <a:prstGeom prst="rect">
             <a:avLst/>
@@ -14849,7 +16355,7 @@
     </p:spTree>
     <p:extLst>
       <p:ext uri="{BB962C8B-B14F-4D97-AF65-F5344CB8AC3E}">
-        <p14:creationId xmlns:p14="http://schemas.microsoft.com/office/powerpoint/2010/main" val="238407052"/>
+        <p14:creationId xmlns:p14="http://schemas.microsoft.com/office/powerpoint/2010/main" val="2018740186"/>
       </p:ext>
     </p:extLst>
   </p:cSld>
@@ -15309,7 +16815,7 @@
           <p:cNvPr id="2" name="Title 1">
             <a:extLst>
               <a:ext uri="{FF2B5EF4-FFF2-40B4-BE49-F238E27FC236}">
-                <a16:creationId xmlns:a16="http://schemas.microsoft.com/office/drawing/2014/main" id="{86E22EB3-3CE5-4203-93F3-8F613DC9F1E5}"/>
+                <a16:creationId xmlns:a16="http://schemas.microsoft.com/office/drawing/2014/main" id="{E7665C4C-7593-4738-8F3D-0C7D6EB8C2F7}"/>
               </a:ext>
             </a:extLst>
           </p:cNvPr>
@@ -15461,7 +16967,7 @@
           <p:cNvPr id="4" name="Picture 3">
             <a:extLst>
               <a:ext uri="{FF2B5EF4-FFF2-40B4-BE49-F238E27FC236}">
-                <a16:creationId xmlns:a16="http://schemas.microsoft.com/office/drawing/2014/main" id="{CD2E47CE-515E-4CA0-977F-DCEA1B8EB8E2}"/>
+                <a16:creationId xmlns:a16="http://schemas.microsoft.com/office/drawing/2014/main" id="{418D9299-54CF-4E1E-9D4B-B58FF7809355}"/>
               </a:ext>
             </a:extLst>
           </p:cNvPr>
@@ -15478,8 +16984,8 @@
         </p:blipFill>
         <p:spPr>
           <a:xfrm>
-            <a:off x="320040" y="3650324"/>
-            <a:ext cx="11496821" cy="1552071"/>
+            <a:off x="320040" y="3607211"/>
+            <a:ext cx="11496821" cy="1638297"/>
           </a:xfrm>
           <a:prstGeom prst="rect">
             <a:avLst/>
@@ -15489,7 +16995,7 @@
     </p:spTree>
     <p:extLst>
       <p:ext uri="{BB962C8B-B14F-4D97-AF65-F5344CB8AC3E}">
-        <p14:creationId xmlns:p14="http://schemas.microsoft.com/office/powerpoint/2010/main" val="2018740186"/>
+        <p14:creationId xmlns:p14="http://schemas.microsoft.com/office/powerpoint/2010/main" val="1679726043"/>
       </p:ext>
     </p:extLst>
   </p:cSld>
@@ -15683,7 +17189,7 @@
                 <a:ea typeface="+mj-ea"/>
                 <a:cs typeface="+mj-cs"/>
               </a:rPr>
-              <a:t>Complex Number Shortcuts</a:t>
+              <a:t>Eigenvalue and Eigenvector cheat sheet</a:t>
             </a:r>
           </a:p>
         </p:txBody>
@@ -15797,40 +17303,275 @@
           </a:fontRef>
         </p:style>
       </p:cxnSp>
-      <p:pic>
-        <p:nvPicPr>
-          <p:cNvPr id="4" name="Picture 3">
-            <a:extLst>
-              <a:ext uri="{FF2B5EF4-FFF2-40B4-BE49-F238E27FC236}">
-                <a16:creationId xmlns:a16="http://schemas.microsoft.com/office/drawing/2014/main" id="{418D9299-54CF-4E1E-9D4B-B58FF7809355}"/>
-              </a:ext>
-            </a:extLst>
-          </p:cNvPr>
-          <p:cNvPicPr>
-            <a:picLocks noChangeAspect="1"/>
-          </p:cNvPicPr>
-          <p:nvPr/>
-        </p:nvPicPr>
-        <p:blipFill>
-          <a:blip r:embed="rId2"/>
-          <a:stretch>
-            <a:fillRect/>
-          </a:stretch>
-        </p:blipFill>
-        <p:spPr>
-          <a:xfrm>
-            <a:off x="320040" y="3607211"/>
-            <a:ext cx="11496821" cy="1638297"/>
-          </a:xfrm>
-          <a:prstGeom prst="rect">
-            <a:avLst/>
-          </a:prstGeom>
-        </p:spPr>
-      </p:pic>
+      <mc:AlternateContent xmlns:mc="http://schemas.openxmlformats.org/markup-compatibility/2006">
+        <mc:Choice xmlns:a14="http://schemas.microsoft.com/office/drawing/2010/main" Requires="a14">
+          <p:sp>
+            <p:nvSpPr>
+              <p:cNvPr id="3" name="TextBox 2">
+                <a:extLst>
+                  <a:ext uri="{FF2B5EF4-FFF2-40B4-BE49-F238E27FC236}">
+                    <a16:creationId xmlns:a16="http://schemas.microsoft.com/office/drawing/2014/main" id="{400533D0-30BF-4BE0-87B9-3929A09BEC0C}"/>
+                  </a:ext>
+                </a:extLst>
+              </p:cNvPr>
+              <p:cNvSpPr txBox="1"/>
+              <p:nvPr/>
+            </p:nvSpPr>
+            <p:spPr>
+              <a:xfrm>
+                <a:off x="526073" y="2775097"/>
+                <a:ext cx="11139854" cy="1404359"/>
+              </a:xfrm>
+              <a:prstGeom prst="rect">
+                <a:avLst/>
+              </a:prstGeom>
+              <a:noFill/>
+            </p:spPr>
+            <p:txBody>
+              <a:bodyPr wrap="square" rtlCol="0">
+                <a:spAutoFit/>
+              </a:bodyPr>
+              <a:lstStyle/>
+              <a:p>
+                <a:r>
+                  <a:rPr lang="en-US" sz="2100" dirty="0"/>
+                  <a:t>Eigenvalues of matrix: det(A-</a:t>
+                </a:r>
+                <a:r>
+                  <a:rPr lang="el-GR" sz="2100" b="1" i="0" dirty="0">
+                    <a:solidFill>
+                      <a:srgbClr val="202124"/>
+                    </a:solidFill>
+                    <a:effectLst/>
+                  </a:rPr>
+                  <a:t>λ</a:t>
+                </a:r>
+                <a:r>
+                  <a:rPr lang="en-US" sz="2100" i="0" dirty="0">
+                    <a:solidFill>
+                      <a:srgbClr val="202124"/>
+                    </a:solidFill>
+                    <a:effectLst/>
+                  </a:rPr>
+                  <a:t>I</a:t>
+                </a:r>
+                <a:r>
+                  <a:rPr lang="en-US" sz="2100" i="0" baseline="-25000" dirty="0">
+                    <a:solidFill>
+                      <a:srgbClr val="202124"/>
+                    </a:solidFill>
+                    <a:effectLst/>
+                  </a:rPr>
+                  <a:t>n</a:t>
+                </a:r>
+                <a:r>
+                  <a:rPr lang="en-US" sz="2100" i="0" dirty="0">
+                    <a:solidFill>
+                      <a:srgbClr val="202124"/>
+                    </a:solidFill>
+                    <a:effectLst/>
+                  </a:rPr>
+                  <a:t>) solve for </a:t>
+                </a:r>
+                <a:r>
+                  <a:rPr lang="el-GR" sz="2100" b="1" i="0" dirty="0">
+                    <a:solidFill>
+                      <a:srgbClr val="202124"/>
+                    </a:solidFill>
+                    <a:effectLst/>
+                  </a:rPr>
+                  <a:t>λ</a:t>
+                </a:r>
+                <a:endParaRPr lang="en-US" sz="2100" b="1" i="0" dirty="0">
+                  <a:solidFill>
+                    <a:srgbClr val="202124"/>
+                  </a:solidFill>
+                  <a:effectLst/>
+                </a:endParaRPr>
+              </a:p>
+              <a:p>
+                <a:r>
+                  <a:rPr lang="en-US" sz="2100" dirty="0">
+                    <a:solidFill>
+                      <a:srgbClr val="202124"/>
+                    </a:solidFill>
+                  </a:rPr>
+                  <a:t>Eigenvalue of an Eigenvector: Av = </a:t>
+                </a:r>
+                <a:r>
+                  <a:rPr lang="el-GR" sz="2100" b="1" i="0" dirty="0">
+                    <a:solidFill>
+                      <a:srgbClr val="202124"/>
+                    </a:solidFill>
+                    <a:effectLst/>
+                  </a:rPr>
+                  <a:t>λ</a:t>
+                </a:r>
+                <a:r>
+                  <a:rPr lang="en-US" sz="2100" i="0" dirty="0">
+                    <a:solidFill>
+                      <a:srgbClr val="202124"/>
+                    </a:solidFill>
+                    <a:effectLst/>
+                  </a:rPr>
+                  <a:t>v</a:t>
+                </a:r>
+              </a:p>
+              <a:p>
+                <a:r>
+                  <a:rPr lang="en-US" sz="2100" dirty="0">
+                    <a:solidFill>
+                      <a:srgbClr val="202124"/>
+                    </a:solidFill>
+                  </a:rPr>
+                  <a:t>Eigenvector with an Eigenvalue: </a:t>
+                </a:r>
+                <a14:m>
+                  <m:oMath xmlns:m="http://schemas.openxmlformats.org/officeDocument/2006/math">
+                    <m:sSub>
+                      <m:sSubPr>
+                        <m:ctrlPr>
+                          <a:rPr lang="en-US" sz="2100" i="1" smtClean="0">
+                            <a:solidFill>
+                              <a:srgbClr val="202124"/>
+                            </a:solidFill>
+                            <a:latin typeface="Cambria Math" panose="02040503050406030204" pitchFamily="18" charset="0"/>
+                          </a:rPr>
+                        </m:ctrlPr>
+                      </m:sSubPr>
+                      <m:e>
+                        <m:r>
+                          <a:rPr lang="en-US" sz="2100" b="0" i="1" smtClean="0">
+                            <a:solidFill>
+                              <a:srgbClr val="202124"/>
+                            </a:solidFill>
+                            <a:latin typeface="Cambria Math" panose="02040503050406030204" pitchFamily="18" charset="0"/>
+                          </a:rPr>
+                          <m:t>𝐸</m:t>
+                        </m:r>
+                      </m:e>
+                      <m:sub>
+                        <m:r>
+                          <m:rPr>
+                            <m:nor/>
+                          </m:rPr>
+                          <a:rPr lang="el-GR" sz="2100" b="1" dirty="0">
+                            <a:solidFill>
+                              <a:srgbClr val="202124"/>
+                            </a:solidFill>
+                          </a:rPr>
+                          <m:t>λ</m:t>
+                        </m:r>
+                      </m:sub>
+                    </m:sSub>
+                  </m:oMath>
+                </a14:m>
+                <a:r>
+                  <a:rPr lang="en-US" sz="2100" b="1" i="0" dirty="0">
+                    <a:solidFill>
+                      <a:srgbClr val="202124"/>
+                    </a:solidFill>
+                    <a:effectLst/>
+                  </a:rPr>
+                  <a:t> </a:t>
+                </a:r>
+                <a:r>
+                  <a:rPr lang="en-US" sz="2100" i="0" dirty="0">
+                    <a:solidFill>
+                      <a:srgbClr val="202124"/>
+                    </a:solidFill>
+                    <a:effectLst/>
+                  </a:rPr>
+                  <a:t>= null(A- </a:t>
+                </a:r>
+                <a:r>
+                  <a:rPr lang="el-GR" sz="2100" b="1" dirty="0">
+                    <a:solidFill>
+                      <a:srgbClr val="202124"/>
+                    </a:solidFill>
+                  </a:rPr>
+                  <a:t>λ</a:t>
+                </a:r>
+                <a:r>
+                  <a:rPr lang="en-US" sz="2100" dirty="0">
+                    <a:solidFill>
+                      <a:srgbClr val="202124"/>
+                    </a:solidFill>
+                  </a:rPr>
+                  <a:t>I</a:t>
+                </a:r>
+                <a:r>
+                  <a:rPr lang="en-US" sz="2100" baseline="-25000" dirty="0">
+                    <a:solidFill>
+                      <a:srgbClr val="202124"/>
+                    </a:solidFill>
+                  </a:rPr>
+                  <a:t>n</a:t>
+                </a:r>
+                <a:r>
+                  <a:rPr lang="en-US" sz="2100" dirty="0">
+                    <a:solidFill>
+                      <a:srgbClr val="202124"/>
+                    </a:solidFill>
+                  </a:rPr>
+                  <a:t>), find the basis and choose an eigenvector from that</a:t>
+                </a:r>
+              </a:p>
+              <a:p>
+                <a:endParaRPr lang="en-US" sz="2100" dirty="0"/>
+              </a:p>
+            </p:txBody>
+          </p:sp>
+        </mc:Choice>
+        <mc:Fallback>
+          <p:sp>
+            <p:nvSpPr>
+              <p:cNvPr id="3" name="TextBox 2">
+                <a:extLst>
+                  <a:ext uri="{FF2B5EF4-FFF2-40B4-BE49-F238E27FC236}">
+                    <a16:creationId xmlns:a16="http://schemas.microsoft.com/office/drawing/2014/main" id="{400533D0-30BF-4BE0-87B9-3929A09BEC0C}"/>
+                  </a:ext>
+                </a:extLst>
+              </p:cNvPr>
+              <p:cNvSpPr txBox="1">
+                <a:spLocks noRot="1" noChangeAspect="1" noMove="1" noResize="1" noEditPoints="1" noAdjustHandles="1" noChangeArrowheads="1" noChangeShapeType="1" noTextEdit="1"/>
+              </p:cNvSpPr>
+              <p:nvPr/>
+            </p:nvSpPr>
+            <p:spPr>
+              <a:xfrm>
+                <a:off x="526073" y="2775097"/>
+                <a:ext cx="11139854" cy="1404359"/>
+              </a:xfrm>
+              <a:prstGeom prst="rect">
+                <a:avLst/>
+              </a:prstGeom>
+              <a:blipFill>
+                <a:blip r:embed="rId3"/>
+                <a:stretch>
+                  <a:fillRect l="-656" t="-2597"/>
+                </a:stretch>
+              </a:blipFill>
+            </p:spPr>
+            <p:txBody>
+              <a:bodyPr/>
+              <a:lstStyle/>
+              <a:p>
+                <a:r>
+                  <a:rPr lang="en-US">
+                    <a:noFill/>
+                  </a:rPr>
+                  <a:t> </a:t>
+                </a:r>
+              </a:p>
+            </p:txBody>
+          </p:sp>
+        </mc:Fallback>
+      </mc:AlternateContent>
     </p:spTree>
     <p:extLst>
       <p:ext uri="{BB962C8B-B14F-4D97-AF65-F5344CB8AC3E}">
-        <p14:creationId xmlns:p14="http://schemas.microsoft.com/office/powerpoint/2010/main" val="1679726043"/>
+        <p14:creationId xmlns:p14="http://schemas.microsoft.com/office/powerpoint/2010/main" val="2943352970"/>
       </p:ext>
     </p:extLst>
   </p:cSld>
@@ -18439,18 +20180,18 @@
 </file>
 
 <file path=customXml/item2.xml><?xml version="1.0" encoding="utf-8"?>
+<p:properties xmlns:p="http://schemas.microsoft.com/office/2006/metadata/properties" xmlns:xsi="http://www.w3.org/2001/XMLSchema-instance" xmlns:pc="http://schemas.microsoft.com/office/infopath/2007/PartnerControls">
+  <documentManagement/>
+</p:properties>
+</file>
+
+<file path=customXml/item3.xml><?xml version="1.0" encoding="utf-8"?>
 <?mso-contentType ?>
 <FormTemplates xmlns="http://schemas.microsoft.com/sharepoint/v3/contenttype/forms">
   <Display>DocumentLibraryForm</Display>
   <Edit>DocumentLibraryForm</Edit>
   <New>DocumentLibraryForm</New>
 </FormTemplates>
-</file>
-
-<file path=customXml/item3.xml><?xml version="1.0" encoding="utf-8"?>
-<p:properties xmlns:p="http://schemas.microsoft.com/office/2006/metadata/properties" xmlns:xsi="http://www.w3.org/2001/XMLSchema-instance" xmlns:pc="http://schemas.microsoft.com/office/infopath/2007/PartnerControls">
-  <documentManagement/>
-</p:properties>
 </file>
 
 <file path=customXml/itemProps1.xml><?xml version="1.0" encoding="utf-8"?>
@@ -18472,14 +20213,6 @@
 </file>
 
 <file path=customXml/itemProps2.xml><?xml version="1.0" encoding="utf-8"?>
-<ds:datastoreItem xmlns:ds="http://schemas.openxmlformats.org/officeDocument/2006/customXml" ds:itemID="{97011689-39C2-4FF2-8A9A-B371DB6366C2}">
-  <ds:schemaRefs>
-    <ds:schemaRef ds:uri="http://schemas.microsoft.com/sharepoint/v3/contenttype/forms"/>
-  </ds:schemaRefs>
-</ds:datastoreItem>
-</file>
-
-<file path=customXml/itemProps3.xml><?xml version="1.0" encoding="utf-8"?>
 <ds:datastoreItem xmlns:ds="http://schemas.openxmlformats.org/officeDocument/2006/customXml" ds:itemID="{B1A9F696-FA5F-4B34-B731-F825EC19C60A}">
   <ds:schemaRefs>
     <ds:schemaRef ds:uri="http://purl.org/dc/dcmitype/"/>
@@ -18493,4 +20226,12 @@
     <ds:schemaRef ds:uri="http://schemas.microsoft.com/office/2006/metadata/properties"/>
   </ds:schemaRefs>
 </ds:datastoreItem>
+</file>
+
+<file path=customXml/itemProps3.xml><?xml version="1.0" encoding="utf-8"?>
+<ds:datastoreItem xmlns:ds="http://schemas.openxmlformats.org/officeDocument/2006/customXml" ds:itemID="{97011689-39C2-4FF2-8A9A-B371DB6366C2}">
+  <ds:schemaRefs>
+    <ds:schemaRef ds:uri="http://schemas.microsoft.com/sharepoint/v3/contenttype/forms"/>
+  </ds:schemaRefs>
+</ds:datastoreItem>
 </file>
</xml_diff>